<commit_message>
Versione finale power point
</commit_message>
<xml_diff>
--- a/Presentazione.pptx
+++ b/Presentazione.pptx
@@ -5,10 +5,10 @@
     <p:sldMasterId id="2147483660" r:id="rId4"/>
   </p:sldMasterIdLst>
   <p:notesMasterIdLst>
-    <p:notesMasterId r:id="rId16"/>
+    <p:notesMasterId r:id="rId23"/>
   </p:notesMasterIdLst>
   <p:handoutMasterIdLst>
-    <p:handoutMasterId r:id="rId17"/>
+    <p:handoutMasterId r:id="rId24"/>
   </p:handoutMasterIdLst>
   <p:sldIdLst>
     <p:sldId id="257" r:id="rId5"/>
@@ -18,10 +18,17 @@
     <p:sldId id="267" r:id="rId9"/>
     <p:sldId id="272" r:id="rId10"/>
     <p:sldId id="261" r:id="rId11"/>
-    <p:sldId id="262" r:id="rId12"/>
-    <p:sldId id="263" r:id="rId13"/>
-    <p:sldId id="271" r:id="rId14"/>
-    <p:sldId id="265" r:id="rId15"/>
+    <p:sldId id="273" r:id="rId12"/>
+    <p:sldId id="274" r:id="rId13"/>
+    <p:sldId id="275" r:id="rId14"/>
+    <p:sldId id="276" r:id="rId15"/>
+    <p:sldId id="277" r:id="rId16"/>
+    <p:sldId id="278" r:id="rId17"/>
+    <p:sldId id="279" r:id="rId18"/>
+    <p:sldId id="280" r:id="rId19"/>
+    <p:sldId id="281" r:id="rId20"/>
+    <p:sldId id="282" r:id="rId21"/>
+    <p:sldId id="283" r:id="rId22"/>
   </p:sldIdLst>
   <p:sldSz cx="12188825" cy="6858000"/>
   <p:notesSz cx="6858000" cy="9144000"/>
@@ -5585,7 +5592,7 @@
     </p:spTree>
     <p:extLst>
       <p:ext uri="{BB962C8B-B14F-4D97-AF65-F5344CB8AC3E}">
-        <p14:creationId xmlns:p14="http://schemas.microsoft.com/office/powerpoint/2010/main" val="703812679"/>
+        <p14:creationId xmlns:p14="http://schemas.microsoft.com/office/powerpoint/2010/main" val="319604097"/>
       </p:ext>
     </p:extLst>
   </p:cSld>
@@ -5658,9 +5665,9 @@
           <a:bodyPr/>
           <a:lstStyle/>
           <a:p>
+            <a:pPr rtl="0"/>
             <a:fld id="{3EBA5BD7-F043-4D1B-AA17-CD412FC534DE}" type="slidenum">
               <a:rPr lang="it-IT" smtClean="0"/>
-              <a:pPr/>
               <a:t>11</a:t>
             </a:fld>
             <a:endParaRPr lang="it-IT" dirty="0"/>
@@ -5670,7 +5677,517 @@
     </p:spTree>
     <p:extLst>
       <p:ext uri="{BB962C8B-B14F-4D97-AF65-F5344CB8AC3E}">
-        <p14:creationId xmlns:p14="http://schemas.microsoft.com/office/powerpoint/2010/main" val="477831474"/>
+        <p14:creationId xmlns:p14="http://schemas.microsoft.com/office/powerpoint/2010/main" val="1049108184"/>
+      </p:ext>
+    </p:extLst>
+  </p:cSld>
+  <p:clrMapOvr>
+    <a:masterClrMapping/>
+  </p:clrMapOvr>
+</p:notes>
+</file>
+
+<file path=ppt/notesSlides/notesSlide12.xml><?xml version="1.0" encoding="utf-8"?>
+<p:notes xmlns:a="http://schemas.openxmlformats.org/drawingml/2006/main" xmlns:r="http://schemas.openxmlformats.org/officeDocument/2006/relationships" xmlns:p="http://schemas.openxmlformats.org/presentationml/2006/main">
+  <p:cSld>
+    <p:spTree>
+      <p:nvGrpSpPr>
+        <p:cNvPr id="1" name=""/>
+        <p:cNvGrpSpPr/>
+        <p:nvPr/>
+      </p:nvGrpSpPr>
+      <p:grpSpPr>
+        <a:xfrm>
+          <a:off x="0" y="0"/>
+          <a:ext cx="0" cy="0"/>
+          <a:chOff x="0" y="0"/>
+          <a:chExt cx="0" cy="0"/>
+        </a:xfrm>
+      </p:grpSpPr>
+      <p:sp>
+        <p:nvSpPr>
+          <p:cNvPr id="2" name="Segnaposto immagine diapositiva 1"/>
+          <p:cNvSpPr>
+            <a:spLocks noGrp="1" noRot="1" noChangeAspect="1"/>
+          </p:cNvSpPr>
+          <p:nvPr>
+            <p:ph type="sldImg"/>
+          </p:nvPr>
+        </p:nvSpPr>
+        <p:spPr/>
+      </p:sp>
+      <p:sp>
+        <p:nvSpPr>
+          <p:cNvPr id="3" name="Segnaposto note 2"/>
+          <p:cNvSpPr>
+            <a:spLocks noGrp="1"/>
+          </p:cNvSpPr>
+          <p:nvPr>
+            <p:ph type="body" idx="1"/>
+          </p:nvPr>
+        </p:nvSpPr>
+        <p:spPr/>
+        <p:txBody>
+          <a:bodyPr/>
+          <a:lstStyle/>
+          <a:p>
+            <a:endParaRPr lang="it-IT" dirty="0"/>
+          </a:p>
+        </p:txBody>
+      </p:sp>
+      <p:sp>
+        <p:nvSpPr>
+          <p:cNvPr id="4" name="Segnaposto numero diapositiva 3"/>
+          <p:cNvSpPr>
+            <a:spLocks noGrp="1"/>
+          </p:cNvSpPr>
+          <p:nvPr>
+            <p:ph type="sldNum" sz="quarter" idx="10"/>
+          </p:nvPr>
+        </p:nvSpPr>
+        <p:spPr/>
+        <p:txBody>
+          <a:bodyPr/>
+          <a:lstStyle/>
+          <a:p>
+            <a:fld id="{3EBA5BD7-F043-4D1B-AA17-CD412FC534DE}" type="slidenum">
+              <a:rPr lang="it-IT" smtClean="0"/>
+              <a:pPr/>
+              <a:t>12</a:t>
+            </a:fld>
+            <a:endParaRPr lang="it-IT" dirty="0"/>
+          </a:p>
+        </p:txBody>
+      </p:sp>
+    </p:spTree>
+    <p:extLst>
+      <p:ext uri="{BB962C8B-B14F-4D97-AF65-F5344CB8AC3E}">
+        <p14:creationId xmlns:p14="http://schemas.microsoft.com/office/powerpoint/2010/main" val="3540824400"/>
+      </p:ext>
+    </p:extLst>
+  </p:cSld>
+  <p:clrMapOvr>
+    <a:masterClrMapping/>
+  </p:clrMapOvr>
+</p:notes>
+</file>
+
+<file path=ppt/notesSlides/notesSlide13.xml><?xml version="1.0" encoding="utf-8"?>
+<p:notes xmlns:a="http://schemas.openxmlformats.org/drawingml/2006/main" xmlns:r="http://schemas.openxmlformats.org/officeDocument/2006/relationships" xmlns:p="http://schemas.openxmlformats.org/presentationml/2006/main">
+  <p:cSld>
+    <p:spTree>
+      <p:nvGrpSpPr>
+        <p:cNvPr id="1" name=""/>
+        <p:cNvGrpSpPr/>
+        <p:nvPr/>
+      </p:nvGrpSpPr>
+      <p:grpSpPr>
+        <a:xfrm>
+          <a:off x="0" y="0"/>
+          <a:ext cx="0" cy="0"/>
+          <a:chOff x="0" y="0"/>
+          <a:chExt cx="0" cy="0"/>
+        </a:xfrm>
+      </p:grpSpPr>
+      <p:sp>
+        <p:nvSpPr>
+          <p:cNvPr id="2" name="Segnaposto immagine diapositiva 1"/>
+          <p:cNvSpPr>
+            <a:spLocks noGrp="1" noRot="1" noChangeAspect="1"/>
+          </p:cNvSpPr>
+          <p:nvPr>
+            <p:ph type="sldImg"/>
+          </p:nvPr>
+        </p:nvSpPr>
+        <p:spPr/>
+      </p:sp>
+      <p:sp>
+        <p:nvSpPr>
+          <p:cNvPr id="3" name="Segnaposto note 2"/>
+          <p:cNvSpPr>
+            <a:spLocks noGrp="1"/>
+          </p:cNvSpPr>
+          <p:nvPr>
+            <p:ph type="body" idx="1"/>
+          </p:nvPr>
+        </p:nvSpPr>
+        <p:spPr/>
+        <p:txBody>
+          <a:bodyPr/>
+          <a:lstStyle/>
+          <a:p>
+            <a:endParaRPr lang="it-IT" dirty="0"/>
+          </a:p>
+        </p:txBody>
+      </p:sp>
+      <p:sp>
+        <p:nvSpPr>
+          <p:cNvPr id="4" name="Segnaposto numero diapositiva 3"/>
+          <p:cNvSpPr>
+            <a:spLocks noGrp="1"/>
+          </p:cNvSpPr>
+          <p:nvPr>
+            <p:ph type="sldNum" sz="quarter" idx="10"/>
+          </p:nvPr>
+        </p:nvSpPr>
+        <p:spPr/>
+        <p:txBody>
+          <a:bodyPr/>
+          <a:lstStyle/>
+          <a:p>
+            <a:pPr rtl="0"/>
+            <a:fld id="{3EBA5BD7-F043-4D1B-AA17-CD412FC534DE}" type="slidenum">
+              <a:rPr lang="it-IT" smtClean="0"/>
+              <a:t>13</a:t>
+            </a:fld>
+            <a:endParaRPr lang="it-IT" dirty="0"/>
+          </a:p>
+        </p:txBody>
+      </p:sp>
+    </p:spTree>
+    <p:extLst>
+      <p:ext uri="{BB962C8B-B14F-4D97-AF65-F5344CB8AC3E}">
+        <p14:creationId xmlns:p14="http://schemas.microsoft.com/office/powerpoint/2010/main" val="3076310290"/>
+      </p:ext>
+    </p:extLst>
+  </p:cSld>
+  <p:clrMapOvr>
+    <a:masterClrMapping/>
+  </p:clrMapOvr>
+</p:notes>
+</file>
+
+<file path=ppt/notesSlides/notesSlide14.xml><?xml version="1.0" encoding="utf-8"?>
+<p:notes xmlns:a="http://schemas.openxmlformats.org/drawingml/2006/main" xmlns:r="http://schemas.openxmlformats.org/officeDocument/2006/relationships" xmlns:p="http://schemas.openxmlformats.org/presentationml/2006/main">
+  <p:cSld>
+    <p:spTree>
+      <p:nvGrpSpPr>
+        <p:cNvPr id="1" name=""/>
+        <p:cNvGrpSpPr/>
+        <p:nvPr/>
+      </p:nvGrpSpPr>
+      <p:grpSpPr>
+        <a:xfrm>
+          <a:off x="0" y="0"/>
+          <a:ext cx="0" cy="0"/>
+          <a:chOff x="0" y="0"/>
+          <a:chExt cx="0" cy="0"/>
+        </a:xfrm>
+      </p:grpSpPr>
+      <p:sp>
+        <p:nvSpPr>
+          <p:cNvPr id="2" name="Segnaposto immagine diapositiva 1"/>
+          <p:cNvSpPr>
+            <a:spLocks noGrp="1" noRot="1" noChangeAspect="1"/>
+          </p:cNvSpPr>
+          <p:nvPr>
+            <p:ph type="sldImg"/>
+          </p:nvPr>
+        </p:nvSpPr>
+        <p:spPr/>
+      </p:sp>
+      <p:sp>
+        <p:nvSpPr>
+          <p:cNvPr id="3" name="Segnaposto note 2"/>
+          <p:cNvSpPr>
+            <a:spLocks noGrp="1"/>
+          </p:cNvSpPr>
+          <p:nvPr>
+            <p:ph type="body" idx="1"/>
+          </p:nvPr>
+        </p:nvSpPr>
+        <p:spPr/>
+        <p:txBody>
+          <a:bodyPr/>
+          <a:lstStyle/>
+          <a:p>
+            <a:endParaRPr lang="it-IT" dirty="0"/>
+          </a:p>
+        </p:txBody>
+      </p:sp>
+      <p:sp>
+        <p:nvSpPr>
+          <p:cNvPr id="4" name="Segnaposto numero diapositiva 3"/>
+          <p:cNvSpPr>
+            <a:spLocks noGrp="1"/>
+          </p:cNvSpPr>
+          <p:nvPr>
+            <p:ph type="sldNum" sz="quarter" idx="10"/>
+          </p:nvPr>
+        </p:nvSpPr>
+        <p:spPr/>
+        <p:txBody>
+          <a:bodyPr/>
+          <a:lstStyle/>
+          <a:p>
+            <a:fld id="{3EBA5BD7-F043-4D1B-AA17-CD412FC534DE}" type="slidenum">
+              <a:rPr lang="it-IT" smtClean="0"/>
+              <a:pPr/>
+              <a:t>14</a:t>
+            </a:fld>
+            <a:endParaRPr lang="it-IT" dirty="0"/>
+          </a:p>
+        </p:txBody>
+      </p:sp>
+    </p:spTree>
+    <p:extLst>
+      <p:ext uri="{BB962C8B-B14F-4D97-AF65-F5344CB8AC3E}">
+        <p14:creationId xmlns:p14="http://schemas.microsoft.com/office/powerpoint/2010/main" val="1036286293"/>
+      </p:ext>
+    </p:extLst>
+  </p:cSld>
+  <p:clrMapOvr>
+    <a:masterClrMapping/>
+  </p:clrMapOvr>
+</p:notes>
+</file>
+
+<file path=ppt/notesSlides/notesSlide15.xml><?xml version="1.0" encoding="utf-8"?>
+<p:notes xmlns:a="http://schemas.openxmlformats.org/drawingml/2006/main" xmlns:r="http://schemas.openxmlformats.org/officeDocument/2006/relationships" xmlns:p="http://schemas.openxmlformats.org/presentationml/2006/main">
+  <p:cSld>
+    <p:spTree>
+      <p:nvGrpSpPr>
+        <p:cNvPr id="1" name=""/>
+        <p:cNvGrpSpPr/>
+        <p:nvPr/>
+      </p:nvGrpSpPr>
+      <p:grpSpPr>
+        <a:xfrm>
+          <a:off x="0" y="0"/>
+          <a:ext cx="0" cy="0"/>
+          <a:chOff x="0" y="0"/>
+          <a:chExt cx="0" cy="0"/>
+        </a:xfrm>
+      </p:grpSpPr>
+      <p:sp>
+        <p:nvSpPr>
+          <p:cNvPr id="2" name="Segnaposto immagine diapositiva 1"/>
+          <p:cNvSpPr>
+            <a:spLocks noGrp="1" noRot="1" noChangeAspect="1"/>
+          </p:cNvSpPr>
+          <p:nvPr>
+            <p:ph type="sldImg"/>
+          </p:nvPr>
+        </p:nvSpPr>
+        <p:spPr/>
+      </p:sp>
+      <p:sp>
+        <p:nvSpPr>
+          <p:cNvPr id="3" name="Segnaposto note 2"/>
+          <p:cNvSpPr>
+            <a:spLocks noGrp="1"/>
+          </p:cNvSpPr>
+          <p:nvPr>
+            <p:ph type="body" idx="1"/>
+          </p:nvPr>
+        </p:nvSpPr>
+        <p:spPr/>
+        <p:txBody>
+          <a:bodyPr/>
+          <a:lstStyle/>
+          <a:p>
+            <a:endParaRPr lang="it-IT" dirty="0"/>
+          </a:p>
+        </p:txBody>
+      </p:sp>
+      <p:sp>
+        <p:nvSpPr>
+          <p:cNvPr id="4" name="Segnaposto numero diapositiva 3"/>
+          <p:cNvSpPr>
+            <a:spLocks noGrp="1"/>
+          </p:cNvSpPr>
+          <p:nvPr>
+            <p:ph type="sldNum" sz="quarter" idx="10"/>
+          </p:nvPr>
+        </p:nvSpPr>
+        <p:spPr/>
+        <p:txBody>
+          <a:bodyPr/>
+          <a:lstStyle/>
+          <a:p>
+            <a:pPr rtl="0"/>
+            <a:fld id="{3EBA5BD7-F043-4D1B-AA17-CD412FC534DE}" type="slidenum">
+              <a:rPr lang="it-IT" smtClean="0"/>
+              <a:t>15</a:t>
+            </a:fld>
+            <a:endParaRPr lang="it-IT" dirty="0"/>
+          </a:p>
+        </p:txBody>
+      </p:sp>
+    </p:spTree>
+    <p:extLst>
+      <p:ext uri="{BB962C8B-B14F-4D97-AF65-F5344CB8AC3E}">
+        <p14:creationId xmlns:p14="http://schemas.microsoft.com/office/powerpoint/2010/main" val="179450603"/>
+      </p:ext>
+    </p:extLst>
+  </p:cSld>
+  <p:clrMapOvr>
+    <a:masterClrMapping/>
+  </p:clrMapOvr>
+</p:notes>
+</file>
+
+<file path=ppt/notesSlides/notesSlide16.xml><?xml version="1.0" encoding="utf-8"?>
+<p:notes xmlns:a="http://schemas.openxmlformats.org/drawingml/2006/main" xmlns:r="http://schemas.openxmlformats.org/officeDocument/2006/relationships" xmlns:p="http://schemas.openxmlformats.org/presentationml/2006/main">
+  <p:cSld>
+    <p:spTree>
+      <p:nvGrpSpPr>
+        <p:cNvPr id="1" name=""/>
+        <p:cNvGrpSpPr/>
+        <p:nvPr/>
+      </p:nvGrpSpPr>
+      <p:grpSpPr>
+        <a:xfrm>
+          <a:off x="0" y="0"/>
+          <a:ext cx="0" cy="0"/>
+          <a:chOff x="0" y="0"/>
+          <a:chExt cx="0" cy="0"/>
+        </a:xfrm>
+      </p:grpSpPr>
+      <p:sp>
+        <p:nvSpPr>
+          <p:cNvPr id="2" name="Segnaposto immagine diapositiva 1"/>
+          <p:cNvSpPr>
+            <a:spLocks noGrp="1" noRot="1" noChangeAspect="1"/>
+          </p:cNvSpPr>
+          <p:nvPr>
+            <p:ph type="sldImg"/>
+          </p:nvPr>
+        </p:nvSpPr>
+        <p:spPr/>
+      </p:sp>
+      <p:sp>
+        <p:nvSpPr>
+          <p:cNvPr id="3" name="Segnaposto note 2"/>
+          <p:cNvSpPr>
+            <a:spLocks noGrp="1"/>
+          </p:cNvSpPr>
+          <p:nvPr>
+            <p:ph type="body" idx="1"/>
+          </p:nvPr>
+        </p:nvSpPr>
+        <p:spPr/>
+        <p:txBody>
+          <a:bodyPr/>
+          <a:lstStyle/>
+          <a:p>
+            <a:endParaRPr lang="it-IT" dirty="0"/>
+          </a:p>
+        </p:txBody>
+      </p:sp>
+      <p:sp>
+        <p:nvSpPr>
+          <p:cNvPr id="4" name="Segnaposto numero diapositiva 3"/>
+          <p:cNvSpPr>
+            <a:spLocks noGrp="1"/>
+          </p:cNvSpPr>
+          <p:nvPr>
+            <p:ph type="sldNum" sz="quarter" idx="10"/>
+          </p:nvPr>
+        </p:nvSpPr>
+        <p:spPr/>
+        <p:txBody>
+          <a:bodyPr/>
+          <a:lstStyle/>
+          <a:p>
+            <a:fld id="{3EBA5BD7-F043-4D1B-AA17-CD412FC534DE}" type="slidenum">
+              <a:rPr lang="it-IT" smtClean="0"/>
+              <a:pPr/>
+              <a:t>16</a:t>
+            </a:fld>
+            <a:endParaRPr lang="it-IT" dirty="0"/>
+          </a:p>
+        </p:txBody>
+      </p:sp>
+    </p:spTree>
+    <p:extLst>
+      <p:ext uri="{BB962C8B-B14F-4D97-AF65-F5344CB8AC3E}">
+        <p14:creationId xmlns:p14="http://schemas.microsoft.com/office/powerpoint/2010/main" val="3918012233"/>
+      </p:ext>
+    </p:extLst>
+  </p:cSld>
+  <p:clrMapOvr>
+    <a:masterClrMapping/>
+  </p:clrMapOvr>
+</p:notes>
+</file>
+
+<file path=ppt/notesSlides/notesSlide17.xml><?xml version="1.0" encoding="utf-8"?>
+<p:notes xmlns:a="http://schemas.openxmlformats.org/drawingml/2006/main" xmlns:r="http://schemas.openxmlformats.org/officeDocument/2006/relationships" xmlns:p="http://schemas.openxmlformats.org/presentationml/2006/main">
+  <p:cSld>
+    <p:spTree>
+      <p:nvGrpSpPr>
+        <p:cNvPr id="1" name=""/>
+        <p:cNvGrpSpPr/>
+        <p:nvPr/>
+      </p:nvGrpSpPr>
+      <p:grpSpPr>
+        <a:xfrm>
+          <a:off x="0" y="0"/>
+          <a:ext cx="0" cy="0"/>
+          <a:chOff x="0" y="0"/>
+          <a:chExt cx="0" cy="0"/>
+        </a:xfrm>
+      </p:grpSpPr>
+      <p:sp>
+        <p:nvSpPr>
+          <p:cNvPr id="2" name="Segnaposto immagine diapositiva 1"/>
+          <p:cNvSpPr>
+            <a:spLocks noGrp="1" noRot="1" noChangeAspect="1"/>
+          </p:cNvSpPr>
+          <p:nvPr>
+            <p:ph type="sldImg"/>
+          </p:nvPr>
+        </p:nvSpPr>
+        <p:spPr/>
+      </p:sp>
+      <p:sp>
+        <p:nvSpPr>
+          <p:cNvPr id="3" name="Segnaposto note 2"/>
+          <p:cNvSpPr>
+            <a:spLocks noGrp="1"/>
+          </p:cNvSpPr>
+          <p:nvPr>
+            <p:ph type="body" idx="1"/>
+          </p:nvPr>
+        </p:nvSpPr>
+        <p:spPr/>
+        <p:txBody>
+          <a:bodyPr/>
+          <a:lstStyle/>
+          <a:p>
+            <a:endParaRPr lang="it-IT" dirty="0"/>
+          </a:p>
+        </p:txBody>
+      </p:sp>
+      <p:sp>
+        <p:nvSpPr>
+          <p:cNvPr id="4" name="Segnaposto numero diapositiva 3"/>
+          <p:cNvSpPr>
+            <a:spLocks noGrp="1"/>
+          </p:cNvSpPr>
+          <p:nvPr>
+            <p:ph type="sldNum" sz="quarter" idx="10"/>
+          </p:nvPr>
+        </p:nvSpPr>
+        <p:spPr/>
+        <p:txBody>
+          <a:bodyPr/>
+          <a:lstStyle/>
+          <a:p>
+            <a:pPr rtl="0"/>
+            <a:fld id="{3EBA5BD7-F043-4D1B-AA17-CD412FC534DE}" type="slidenum">
+              <a:rPr lang="it-IT" smtClean="0"/>
+              <a:t>17</a:t>
+            </a:fld>
+            <a:endParaRPr lang="it-IT" dirty="0"/>
+          </a:p>
+        </p:txBody>
+      </p:sp>
+    </p:spTree>
+    <p:extLst>
+      <p:ext uri="{BB962C8B-B14F-4D97-AF65-F5344CB8AC3E}">
+        <p14:creationId xmlns:p14="http://schemas.microsoft.com/office/powerpoint/2010/main" val="3227959987"/>
       </p:ext>
     </p:extLst>
   </p:cSld>
@@ -6266,7 +6783,7 @@
     </p:spTree>
     <p:extLst>
       <p:ext uri="{BB962C8B-B14F-4D97-AF65-F5344CB8AC3E}">
-        <p14:creationId xmlns:p14="http://schemas.microsoft.com/office/powerpoint/2010/main" val="2158408871"/>
+        <p14:creationId xmlns:p14="http://schemas.microsoft.com/office/powerpoint/2010/main" val="3724226547"/>
       </p:ext>
     </p:extLst>
   </p:cSld>
@@ -6339,9 +6856,9 @@
           <a:bodyPr/>
           <a:lstStyle/>
           <a:p>
+            <a:pPr rtl="0"/>
             <a:fld id="{3EBA5BD7-F043-4D1B-AA17-CD412FC534DE}" type="slidenum">
               <a:rPr lang="it-IT" smtClean="0"/>
-              <a:pPr/>
               <a:t>9</a:t>
             </a:fld>
             <a:endParaRPr lang="it-IT" dirty="0"/>
@@ -6351,7 +6868,7 @@
     </p:spTree>
     <p:extLst>
       <p:ext uri="{BB962C8B-B14F-4D97-AF65-F5344CB8AC3E}">
-        <p14:creationId xmlns:p14="http://schemas.microsoft.com/office/powerpoint/2010/main" val="3842514481"/>
+        <p14:creationId xmlns:p14="http://schemas.microsoft.com/office/powerpoint/2010/main" val="3572760422"/>
       </p:ext>
     </p:extLst>
   </p:cSld>
@@ -11011,7 +11528,7 @@
         </p:nvSpPr>
         <p:spPr>
           <a:xfrm>
-            <a:off x="2256282" y="3926599"/>
+            <a:off x="2256286" y="3926599"/>
             <a:ext cx="7676253" cy="523220"/>
           </a:xfrm>
           <a:prstGeom prst="rect">
@@ -11029,7 +11546,7 @@
               <a:rPr lang="it-IT" sz="2800" dirty="0">
                 <a:latin typeface="Ubuntu Mono" panose="020B0509030602030204" pitchFamily="49" charset="0"/>
               </a:rPr>
-              <a:t>Un tool per generare applicazioni malevoli</a:t>
+              <a:t>Un tool per generare applicazioni malevole</a:t>
             </a:r>
           </a:p>
         </p:txBody>
@@ -11073,6 +11590,77 @@
           </a:prstGeom>
         </p:spPr>
       </p:pic>
+      <p:sp>
+        <p:nvSpPr>
+          <p:cNvPr id="15" name="CasellaDiTesto 14">
+            <a:extLst>
+              <a:ext uri="{FF2B5EF4-FFF2-40B4-BE49-F238E27FC236}">
+                <a16:creationId xmlns:a16="http://schemas.microsoft.com/office/drawing/2014/main" id="{4419E266-F554-4FB6-AB8F-2B78BFED8E62}"/>
+              </a:ext>
+            </a:extLst>
+          </p:cNvPr>
+          <p:cNvSpPr txBox="1"/>
+          <p:nvPr/>
+        </p:nvSpPr>
+        <p:spPr>
+          <a:xfrm>
+            <a:off x="2998068" y="5551733"/>
+            <a:ext cx="6192688" cy="923330"/>
+          </a:xfrm>
+          <a:prstGeom prst="rect">
+            <a:avLst/>
+          </a:prstGeom>
+          <a:noFill/>
+        </p:spPr>
+        <p:txBody>
+          <a:bodyPr wrap="square" rtlCol="0">
+            <a:spAutoFit/>
+          </a:bodyPr>
+          <a:lstStyle/>
+          <a:p>
+            <a:pPr algn="ctr"/>
+            <a:r>
+              <a:rPr lang="it-IT" sz="1800" dirty="0">
+                <a:solidFill>
+                  <a:schemeClr val="tx1">
+                    <a:lumMod val="65000"/>
+                  </a:schemeClr>
+                </a:solidFill>
+                <a:latin typeface="Ubuntu Mono" panose="020B0509030602030204" pitchFamily="49" charset="0"/>
+              </a:rPr>
+              <a:t>Alessandro Annese</a:t>
+            </a:r>
+          </a:p>
+          <a:p>
+            <a:pPr algn="ctr"/>
+            <a:r>
+              <a:rPr lang="it-IT" sz="1800" dirty="0">
+                <a:solidFill>
+                  <a:schemeClr val="tx1">
+                    <a:lumMod val="65000"/>
+                  </a:schemeClr>
+                </a:solidFill>
+                <a:latin typeface="Ubuntu Mono" panose="020B0509030602030204" pitchFamily="49" charset="0"/>
+              </a:rPr>
+              <a:t>Andrea Esposito</a:t>
+            </a:r>
+          </a:p>
+          <a:p>
+            <a:pPr algn="ctr"/>
+            <a:r>
+              <a:rPr lang="it-IT" sz="1800" dirty="0">
+                <a:solidFill>
+                  <a:schemeClr val="tx1">
+                    <a:lumMod val="65000"/>
+                  </a:schemeClr>
+                </a:solidFill>
+                <a:latin typeface="Ubuntu Mono" panose="020B0509030602030204" pitchFamily="49" charset="0"/>
+              </a:rPr>
+              <a:t>Graziano Montanaro</a:t>
+            </a:r>
+          </a:p>
+        </p:txBody>
+      </p:sp>
     </p:spTree>
     <p:extLst>
       <p:ext uri="{BB962C8B-B14F-4D97-AF65-F5344CB8AC3E}">
@@ -11083,13 +11671,13 @@
   <p:clrMapOvr>
     <a:masterClrMapping/>
   </p:clrMapOvr>
-  <mc:AlternateContent xmlns:mc="http://schemas.openxmlformats.org/markup-compatibility/2006" xmlns:p14="http://schemas.microsoft.com/office/powerpoint/2010/main">
-    <mc:Choice Requires="p14">
+  <mc:AlternateContent xmlns:mc="http://schemas.openxmlformats.org/markup-compatibility/2006">
+    <mc:Choice xmlns:p14="http://schemas.microsoft.com/office/powerpoint/2010/main" Requires="p14">
       <p:transition spd="med" p14:dur="700">
         <p:fade/>
       </p:transition>
     </mc:Choice>
-    <mc:Fallback xmlns="">
+    <mc:Fallback>
       <p:transition spd="med">
         <p:fade/>
       </p:transition>
@@ -11117,7 +11705,7 @@
       </p:grpSpPr>
       <p:sp>
         <p:nvSpPr>
-          <p:cNvPr id="2" name="Titolo 1"/>
+          <p:cNvPr id="4" name="Titolo 3"/>
           <p:cNvSpPr>
             <a:spLocks noGrp="1"/>
           </p:cNvSpPr>
@@ -11132,20 +11720,22 @@
           <a:p>
             <a:pPr rtl="0"/>
             <a:r>
-              <a:rPr lang="it-IT" dirty="0"/>
-              <a:t>Aggiungere un titolo di diapositiva - 4</a:t>
+              <a:rPr lang="it-IT" dirty="0">
+                <a:latin typeface="Ubuntu Mono" panose="020B0509030602030204" pitchFamily="49" charset="0"/>
+              </a:rPr>
+              <a:t>Exploit</a:t>
             </a:r>
           </a:p>
         </p:txBody>
       </p:sp>
       <p:sp>
         <p:nvSpPr>
-          <p:cNvPr id="4" name="Segnaposto testo 3"/>
+          <p:cNvPr id="5" name="Segnaposto testo 4"/>
           <p:cNvSpPr>
             <a:spLocks noGrp="1"/>
           </p:cNvSpPr>
           <p:nvPr>
-            <p:ph type="body" sz="half" idx="2"/>
+            <p:ph type="body" idx="1"/>
           </p:nvPr>
         </p:nvSpPr>
         <p:spPr/>
@@ -11154,52 +11744,28 @@
           <a:lstStyle/>
           <a:p>
             <a:pPr rtl="0"/>
-            <a:endParaRPr lang="it-IT" dirty="0"/>
-          </a:p>
-        </p:txBody>
-      </p:sp>
-      <p:sp>
-        <p:nvSpPr>
-          <p:cNvPr id="3" name="Segnaposto contenuto 2"/>
-          <p:cNvSpPr>
-            <a:spLocks noGrp="1"/>
-          </p:cNvSpPr>
-          <p:nvPr>
-            <p:ph idx="1"/>
-          </p:nvPr>
-        </p:nvSpPr>
-        <p:spPr/>
-        <p:txBody>
-          <a:bodyPr rtlCol="0"/>
-          <a:lstStyle/>
-          <a:p>
-            <a:pPr rtl="0"/>
-            <a:endParaRPr lang="it-IT" dirty="0"/>
+            <a:r>
+              <a:rPr lang="it-IT" dirty="0">
+                <a:latin typeface="Ubuntu Mono" panose="020B0509030602030204" pitchFamily="49" charset="0"/>
+              </a:rPr>
+              <a:t>4°FASE</a:t>
+            </a:r>
           </a:p>
         </p:txBody>
       </p:sp>
     </p:spTree>
     <p:extLst>
       <p:ext uri="{BB962C8B-B14F-4D97-AF65-F5344CB8AC3E}">
-        <p14:creationId xmlns:p14="http://schemas.microsoft.com/office/powerpoint/2010/main" val="2319046984"/>
+        <p14:creationId xmlns:p14="http://schemas.microsoft.com/office/powerpoint/2010/main" val="3798481243"/>
       </p:ext>
     </p:extLst>
   </p:cSld>
   <p:clrMapOvr>
     <a:masterClrMapping/>
   </p:clrMapOvr>
-  <mc:AlternateContent xmlns:mc="http://schemas.openxmlformats.org/markup-compatibility/2006" xmlns:p14="http://schemas.microsoft.com/office/powerpoint/2010/main">
-    <mc:Choice Requires="p14">
-      <p:transition spd="med" p14:dur="700">
-        <p:fade/>
-      </p:transition>
-    </mc:Choice>
-    <mc:Fallback xmlns="">
-      <p:transition spd="med">
-        <p:fade/>
-      </p:transition>
-    </mc:Fallback>
-  </mc:AlternateContent>
+  <p:transition spd="slow">
+    <p:pull/>
+  </p:transition>
 </p:sld>
 </file>
 
@@ -11222,7 +11788,7 @@
       </p:grpSpPr>
       <p:sp>
         <p:nvSpPr>
-          <p:cNvPr id="3" name="Titolo 2"/>
+          <p:cNvPr id="7" name="Titolo 6"/>
           <p:cNvSpPr>
             <a:spLocks noGrp="1"/>
           </p:cNvSpPr>
@@ -11237,8 +11803,164 @@
           <a:p>
             <a:pPr rtl="0"/>
             <a:r>
-              <a:rPr lang="it-IT" dirty="0"/>
-              <a:t>Aggiungere un titolo di diapositiva - 5</a:t>
+              <a:rPr lang="it-IT" dirty="0">
+                <a:latin typeface="Ubuntu Mono" panose="020B0509030602030204" pitchFamily="49" charset="0"/>
+              </a:rPr>
+              <a:t>Exploit</a:t>
+            </a:r>
+          </a:p>
+        </p:txBody>
+      </p:sp>
+      <p:sp>
+        <p:nvSpPr>
+          <p:cNvPr id="15" name="Segnaposto contenuto 14">
+            <a:extLst>
+              <a:ext uri="{FF2B5EF4-FFF2-40B4-BE49-F238E27FC236}">
+                <a16:creationId xmlns:a16="http://schemas.microsoft.com/office/drawing/2014/main" id="{2AA4F659-F662-4235-8E87-DEDD933AFE87}"/>
+              </a:ext>
+            </a:extLst>
+          </p:cNvPr>
+          <p:cNvSpPr>
+            <a:spLocks noGrp="1"/>
+          </p:cNvSpPr>
+          <p:nvPr>
+            <p:ph sz="half" idx="2"/>
+          </p:nvPr>
+        </p:nvSpPr>
+        <p:spPr>
+          <a:xfrm>
+            <a:off x="1231126" y="1628800"/>
+            <a:ext cx="7239549" cy="3740214"/>
+          </a:xfrm>
+        </p:spPr>
+        <p:txBody>
+          <a:bodyPr/>
+          <a:lstStyle/>
+          <a:p>
+            <a:r>
+              <a:rPr lang="it-IT" dirty="0">
+                <a:latin typeface="Ubuntu Mono" panose="020B0509030602030204" pitchFamily="49" charset="0"/>
+              </a:rPr>
+              <a:t>Durante questa fase si attende che l’utente scarichi e installi l’applicazione malevola</a:t>
+            </a:r>
+          </a:p>
+          <a:p>
+            <a:r>
+              <a:rPr lang="it-IT" dirty="0">
+                <a:latin typeface="Ubuntu Mono" panose="020B0509030602030204" pitchFamily="49" charset="0"/>
+              </a:rPr>
+              <a:t>Questa fase non richiede ulteriori azioni da parte della squadra attaccante</a:t>
+            </a:r>
+          </a:p>
+          <a:p>
+            <a:r>
+              <a:rPr lang="it-IT" dirty="0">
+                <a:latin typeface="Ubuntu Mono" panose="020B0509030602030204" pitchFamily="49" charset="0"/>
+              </a:rPr>
+              <a:t>La backdoor viene avviata non appena viene eseguita l’app per la prima volta</a:t>
+            </a:r>
+          </a:p>
+        </p:txBody>
+      </p:sp>
+      <p:pic>
+        <p:nvPicPr>
+          <p:cNvPr id="3074" name="Picture 2">
+            <a:extLst>
+              <a:ext uri="{FF2B5EF4-FFF2-40B4-BE49-F238E27FC236}">
+                <a16:creationId xmlns:a16="http://schemas.microsoft.com/office/drawing/2014/main" id="{B8DBD0E0-FDC1-4FC3-8D8D-8AE15518C212}"/>
+              </a:ext>
+            </a:extLst>
+          </p:cNvPr>
+          <p:cNvPicPr>
+            <a:picLocks noChangeAspect="1" noChangeArrowheads="1"/>
+          </p:cNvPicPr>
+          <p:nvPr/>
+        </p:nvPicPr>
+        <p:blipFill>
+          <a:blip r:embed="rId3" cstate="print">
+            <a:extLst>
+              <a:ext uri="{28A0092B-C50C-407E-A947-70E740481C1C}">
+                <a14:useLocalDpi xmlns:a14="http://schemas.microsoft.com/office/drawing/2010/main" val="0"/>
+              </a:ext>
+            </a:extLst>
+          </a:blip>
+          <a:srcRect/>
+          <a:stretch/>
+        </p:blipFill>
+        <p:spPr bwMode="auto">
+          <a:xfrm>
+            <a:off x="8542684" y="1253183"/>
+            <a:ext cx="2522199" cy="4351633"/>
+          </a:xfrm>
+          <a:prstGeom prst="rect">
+            <a:avLst/>
+          </a:prstGeom>
+          <a:noFill/>
+          <a:extLst>
+            <a:ext uri="{909E8E84-426E-40DD-AFC4-6F175D3DCCD1}">
+              <a14:hiddenFill xmlns:a14="http://schemas.microsoft.com/office/drawing/2010/main">
+                <a:solidFill>
+                  <a:srgbClr val="FFFFFF"/>
+                </a:solidFill>
+              </a14:hiddenFill>
+            </a:ext>
+          </a:extLst>
+        </p:spPr>
+      </p:pic>
+    </p:spTree>
+    <p:extLst>
+      <p:ext uri="{BB962C8B-B14F-4D97-AF65-F5344CB8AC3E}">
+        <p14:creationId xmlns:p14="http://schemas.microsoft.com/office/powerpoint/2010/main" val="891728556"/>
+      </p:ext>
+    </p:extLst>
+  </p:cSld>
+  <p:clrMapOvr>
+    <a:masterClrMapping/>
+  </p:clrMapOvr>
+  <p:transition spd="slow">
+    <p:pull/>
+  </p:transition>
+</p:sld>
+</file>
+
+<file path=ppt/slides/slide12.xml><?xml version="1.0" encoding="utf-8"?>
+<p:sld xmlns:a="http://schemas.openxmlformats.org/drawingml/2006/main" xmlns:r="http://schemas.openxmlformats.org/officeDocument/2006/relationships" xmlns:p="http://schemas.openxmlformats.org/presentationml/2006/main">
+  <p:cSld>
+    <p:spTree>
+      <p:nvGrpSpPr>
+        <p:cNvPr id="1" name=""/>
+        <p:cNvGrpSpPr/>
+        <p:nvPr/>
+      </p:nvGrpSpPr>
+      <p:grpSpPr>
+        <a:xfrm>
+          <a:off x="0" y="0"/>
+          <a:ext cx="0" cy="0"/>
+          <a:chOff x="0" y="0"/>
+          <a:chExt cx="0" cy="0"/>
+        </a:xfrm>
+      </p:grpSpPr>
+      <p:sp>
+        <p:nvSpPr>
+          <p:cNvPr id="4" name="Titolo 3"/>
+          <p:cNvSpPr>
+            <a:spLocks noGrp="1"/>
+          </p:cNvSpPr>
+          <p:nvPr>
+            <p:ph type="title"/>
+          </p:nvPr>
+        </p:nvSpPr>
+        <p:spPr/>
+        <p:txBody>
+          <a:bodyPr rtlCol="0"/>
+          <a:lstStyle/>
+          <a:p>
+            <a:pPr rtl="0"/>
+            <a:r>
+              <a:rPr lang="it-IT" dirty="0">
+                <a:latin typeface="Ubuntu Mono" panose="020B0509030602030204" pitchFamily="49" charset="0"/>
+              </a:rPr>
+              <a:t>Installation</a:t>
             </a:r>
           </a:p>
         </p:txBody>
@@ -11250,7 +11972,7 @@
             <a:spLocks noGrp="1"/>
           </p:cNvSpPr>
           <p:nvPr>
-            <p:ph type="body" sz="half" idx="2"/>
+            <p:ph type="body" idx="1"/>
           </p:nvPr>
         </p:nvSpPr>
         <p:spPr/>
@@ -11259,44 +11981,895 @@
           <a:lstStyle/>
           <a:p>
             <a:pPr rtl="0"/>
-            <a:endParaRPr lang="it-IT" dirty="0"/>
+            <a:r>
+              <a:rPr lang="it-IT" dirty="0">
+                <a:latin typeface="Ubuntu Mono" panose="020B0509030602030204" pitchFamily="49" charset="0"/>
+              </a:rPr>
+              <a:t>5°FASE</a:t>
+            </a:r>
           </a:p>
         </p:txBody>
-      </p:sp>
-      <p:sp>
-        <p:nvSpPr>
-          <p:cNvPr id="6" name="Segnaposto immagine 5" descr="Segnaposto vuoto per aggiungere un'immagine. Fare clic sul segnaposto e selezionare l'immagine che si vuole aggiungere."/>
-          <p:cNvSpPr>
-            <a:spLocks noGrp="1"/>
-          </p:cNvSpPr>
-          <p:nvPr>
-            <p:ph type="pic" idx="1"/>
-          </p:nvPr>
-        </p:nvSpPr>
-        <p:spPr/>
       </p:sp>
     </p:spTree>
     <p:extLst>
       <p:ext uri="{BB962C8B-B14F-4D97-AF65-F5344CB8AC3E}">
-        <p14:creationId xmlns:p14="http://schemas.microsoft.com/office/powerpoint/2010/main" val="3480339974"/>
+        <p14:creationId xmlns:p14="http://schemas.microsoft.com/office/powerpoint/2010/main" val="242268243"/>
       </p:ext>
     </p:extLst>
   </p:cSld>
   <p:clrMapOvr>
     <a:masterClrMapping/>
   </p:clrMapOvr>
-  <mc:AlternateContent xmlns:mc="http://schemas.openxmlformats.org/markup-compatibility/2006" xmlns:p14="http://schemas.microsoft.com/office/powerpoint/2010/main">
-    <mc:Choice Requires="p14">
-      <p:transition spd="med" p14:dur="700">
-        <p:fade/>
-      </p:transition>
-    </mc:Choice>
-    <mc:Fallback xmlns="">
-      <p:transition spd="med">
-        <p:fade/>
-      </p:transition>
-    </mc:Fallback>
-  </mc:AlternateContent>
+  <p:transition spd="slow">
+    <p:pull/>
+  </p:transition>
+</p:sld>
+</file>
+
+<file path=ppt/slides/slide13.xml><?xml version="1.0" encoding="utf-8"?>
+<p:sld xmlns:a="http://schemas.openxmlformats.org/drawingml/2006/main" xmlns:r="http://schemas.openxmlformats.org/officeDocument/2006/relationships" xmlns:p="http://schemas.openxmlformats.org/presentationml/2006/main">
+  <p:cSld>
+    <p:spTree>
+      <p:nvGrpSpPr>
+        <p:cNvPr id="1" name=""/>
+        <p:cNvGrpSpPr/>
+        <p:nvPr/>
+      </p:nvGrpSpPr>
+      <p:grpSpPr>
+        <a:xfrm>
+          <a:off x="0" y="0"/>
+          <a:ext cx="0" cy="0"/>
+          <a:chOff x="0" y="0"/>
+          <a:chExt cx="0" cy="0"/>
+        </a:xfrm>
+      </p:grpSpPr>
+      <p:sp>
+        <p:nvSpPr>
+          <p:cNvPr id="7" name="Titolo 6"/>
+          <p:cNvSpPr>
+            <a:spLocks noGrp="1"/>
+          </p:cNvSpPr>
+          <p:nvPr>
+            <p:ph type="title"/>
+          </p:nvPr>
+        </p:nvSpPr>
+        <p:spPr/>
+        <p:txBody>
+          <a:bodyPr rtlCol="0"/>
+          <a:lstStyle/>
+          <a:p>
+            <a:pPr rtl="0"/>
+            <a:r>
+              <a:rPr lang="it-IT" dirty="0">
+                <a:latin typeface="Ubuntu Mono" panose="020B0509030602030204" pitchFamily="49" charset="0"/>
+              </a:rPr>
+              <a:t>Installation</a:t>
+            </a:r>
+          </a:p>
+        </p:txBody>
+      </p:sp>
+      <p:sp>
+        <p:nvSpPr>
+          <p:cNvPr id="15" name="Segnaposto contenuto 14">
+            <a:extLst>
+              <a:ext uri="{FF2B5EF4-FFF2-40B4-BE49-F238E27FC236}">
+                <a16:creationId xmlns:a16="http://schemas.microsoft.com/office/drawing/2014/main" id="{2AA4F659-F662-4235-8E87-DEDD933AFE87}"/>
+              </a:ext>
+            </a:extLst>
+          </p:cNvPr>
+          <p:cNvSpPr>
+            <a:spLocks noGrp="1"/>
+          </p:cNvSpPr>
+          <p:nvPr>
+            <p:ph sz="half" idx="2"/>
+          </p:nvPr>
+        </p:nvSpPr>
+        <p:spPr>
+          <a:xfrm>
+            <a:off x="1231126" y="1628800"/>
+            <a:ext cx="5943405" cy="3740214"/>
+          </a:xfrm>
+        </p:spPr>
+        <p:txBody>
+          <a:bodyPr/>
+          <a:lstStyle/>
+          <a:p>
+            <a:r>
+              <a:rPr lang="it-IT" dirty="0">
+                <a:latin typeface="Ubuntu Mono" panose="020B0509030602030204" pitchFamily="49" charset="0"/>
+              </a:rPr>
+              <a:t>In questa fase l’utente procede all’installazione dell’applicazione</a:t>
+            </a:r>
+          </a:p>
+          <a:p>
+            <a:r>
+              <a:rPr lang="it-IT" dirty="0">
+                <a:latin typeface="Ubuntu Mono" panose="020B0509030602030204" pitchFamily="49" charset="0"/>
+              </a:rPr>
+              <a:t>Durante questa procedura l’utente acconsente all’utilizzo da parte dell’applicazione di tutte le risorse richieste (comprese quelle del malware)</a:t>
+            </a:r>
+          </a:p>
+        </p:txBody>
+      </p:sp>
+      <p:pic>
+        <p:nvPicPr>
+          <p:cNvPr id="6" name="Immagine 5">
+            <a:extLst>
+              <a:ext uri="{FF2B5EF4-FFF2-40B4-BE49-F238E27FC236}">
+                <a16:creationId xmlns:a16="http://schemas.microsoft.com/office/drawing/2014/main" id="{B6DBA8AF-75A8-48FF-92FD-835F5A747508}"/>
+              </a:ext>
+            </a:extLst>
+          </p:cNvPr>
+          <p:cNvPicPr>
+            <a:picLocks noChangeAspect="1"/>
+          </p:cNvPicPr>
+          <p:nvPr/>
+        </p:nvPicPr>
+        <p:blipFill>
+          <a:blip r:embed="rId3" cstate="print">
+            <a:extLst>
+              <a:ext uri="{28A0092B-C50C-407E-A947-70E740481C1C}">
+                <a14:useLocalDpi xmlns:a14="http://schemas.microsoft.com/office/drawing/2010/main" val="0"/>
+              </a:ext>
+            </a:extLst>
+          </a:blip>
+          <a:stretch>
+            <a:fillRect/>
+          </a:stretch>
+        </p:blipFill>
+        <p:spPr>
+          <a:xfrm>
+            <a:off x="7102524" y="1498600"/>
+            <a:ext cx="2019326" cy="3589037"/>
+          </a:xfrm>
+          <a:prstGeom prst="rect">
+            <a:avLst/>
+          </a:prstGeom>
+        </p:spPr>
+      </p:pic>
+      <p:pic>
+        <p:nvPicPr>
+          <p:cNvPr id="9" name="Immagine 8" descr="Immagine che contiene screenshot&#10;&#10;Descrizione generata automaticamente">
+            <a:extLst>
+              <a:ext uri="{FF2B5EF4-FFF2-40B4-BE49-F238E27FC236}">
+                <a16:creationId xmlns:a16="http://schemas.microsoft.com/office/drawing/2014/main" id="{D1D828DA-E911-4C64-AAEA-A66514ABFE0D}"/>
+              </a:ext>
+            </a:extLst>
+          </p:cNvPr>
+          <p:cNvPicPr>
+            <a:picLocks noChangeAspect="1"/>
+          </p:cNvPicPr>
+          <p:nvPr/>
+        </p:nvPicPr>
+        <p:blipFill>
+          <a:blip r:embed="rId4" cstate="print">
+            <a:extLst>
+              <a:ext uri="{28A0092B-C50C-407E-A947-70E740481C1C}">
+                <a14:useLocalDpi xmlns:a14="http://schemas.microsoft.com/office/drawing/2010/main" val="0"/>
+              </a:ext>
+            </a:extLst>
+          </a:blip>
+          <a:stretch>
+            <a:fillRect/>
+          </a:stretch>
+        </p:blipFill>
+        <p:spPr>
+          <a:xfrm>
+            <a:off x="9835726" y="1498602"/>
+            <a:ext cx="2019326" cy="3589036"/>
+          </a:xfrm>
+          <a:prstGeom prst="rect">
+            <a:avLst/>
+          </a:prstGeom>
+        </p:spPr>
+      </p:pic>
+      <p:cxnSp>
+        <p:nvCxnSpPr>
+          <p:cNvPr id="11" name="Connettore 2 10">
+            <a:extLst>
+              <a:ext uri="{FF2B5EF4-FFF2-40B4-BE49-F238E27FC236}">
+                <a16:creationId xmlns:a16="http://schemas.microsoft.com/office/drawing/2014/main" id="{1516DB26-9C4D-4F75-A28B-5BAFADBFF778}"/>
+              </a:ext>
+            </a:extLst>
+          </p:cNvPr>
+          <p:cNvCxnSpPr>
+            <a:cxnSpLocks/>
+            <a:stCxn id="6" idx="3"/>
+            <a:endCxn id="9" idx="1"/>
+          </p:cNvCxnSpPr>
+          <p:nvPr/>
+        </p:nvCxnSpPr>
+        <p:spPr>
+          <a:xfrm>
+            <a:off x="9121850" y="3293119"/>
+            <a:ext cx="713876" cy="1"/>
+          </a:xfrm>
+          <a:prstGeom prst="straightConnector1">
+            <a:avLst/>
+          </a:prstGeom>
+          <a:ln w="25400">
+            <a:tailEnd type="triangle"/>
+          </a:ln>
+        </p:spPr>
+        <p:style>
+          <a:lnRef idx="1">
+            <a:schemeClr val="accent1"/>
+          </a:lnRef>
+          <a:fillRef idx="0">
+            <a:schemeClr val="accent1"/>
+          </a:fillRef>
+          <a:effectRef idx="0">
+            <a:schemeClr val="accent1"/>
+          </a:effectRef>
+          <a:fontRef idx="minor">
+            <a:schemeClr val="tx1"/>
+          </a:fontRef>
+        </p:style>
+      </p:cxnSp>
+    </p:spTree>
+    <p:extLst>
+      <p:ext uri="{BB962C8B-B14F-4D97-AF65-F5344CB8AC3E}">
+        <p14:creationId xmlns:p14="http://schemas.microsoft.com/office/powerpoint/2010/main" val="3147661867"/>
+      </p:ext>
+    </p:extLst>
+  </p:cSld>
+  <p:clrMapOvr>
+    <a:masterClrMapping/>
+  </p:clrMapOvr>
+  <p:transition spd="slow">
+    <p:pull/>
+  </p:transition>
+</p:sld>
+</file>
+
+<file path=ppt/slides/slide14.xml><?xml version="1.0" encoding="utf-8"?>
+<p:sld xmlns:a="http://schemas.openxmlformats.org/drawingml/2006/main" xmlns:r="http://schemas.openxmlformats.org/officeDocument/2006/relationships" xmlns:p="http://schemas.openxmlformats.org/presentationml/2006/main">
+  <p:cSld>
+    <p:spTree>
+      <p:nvGrpSpPr>
+        <p:cNvPr id="1" name=""/>
+        <p:cNvGrpSpPr/>
+        <p:nvPr/>
+      </p:nvGrpSpPr>
+      <p:grpSpPr>
+        <a:xfrm>
+          <a:off x="0" y="0"/>
+          <a:ext cx="0" cy="0"/>
+          <a:chOff x="0" y="0"/>
+          <a:chExt cx="0" cy="0"/>
+        </a:xfrm>
+      </p:grpSpPr>
+      <p:sp>
+        <p:nvSpPr>
+          <p:cNvPr id="4" name="Titolo 3"/>
+          <p:cNvSpPr>
+            <a:spLocks noGrp="1"/>
+          </p:cNvSpPr>
+          <p:nvPr>
+            <p:ph type="title"/>
+          </p:nvPr>
+        </p:nvSpPr>
+        <p:spPr/>
+        <p:txBody>
+          <a:bodyPr rtlCol="0"/>
+          <a:lstStyle/>
+          <a:p>
+            <a:pPr rtl="0"/>
+            <a:r>
+              <a:rPr lang="it-IT" dirty="0" err="1">
+                <a:latin typeface="Ubuntu Mono" panose="020B0509030602030204" pitchFamily="49" charset="0"/>
+              </a:rPr>
+              <a:t>Command</a:t>
+            </a:r>
+            <a:r>
+              <a:rPr lang="it-IT" dirty="0">
+                <a:latin typeface="Ubuntu Mono" panose="020B0509030602030204" pitchFamily="49" charset="0"/>
+              </a:rPr>
+              <a:t> &amp; Control</a:t>
+            </a:r>
+          </a:p>
+        </p:txBody>
+      </p:sp>
+      <p:sp>
+        <p:nvSpPr>
+          <p:cNvPr id="5" name="Segnaposto testo 4"/>
+          <p:cNvSpPr>
+            <a:spLocks noGrp="1"/>
+          </p:cNvSpPr>
+          <p:nvPr>
+            <p:ph type="body" idx="1"/>
+          </p:nvPr>
+        </p:nvSpPr>
+        <p:spPr/>
+        <p:txBody>
+          <a:bodyPr rtlCol="0"/>
+          <a:lstStyle/>
+          <a:p>
+            <a:pPr rtl="0"/>
+            <a:r>
+              <a:rPr lang="it-IT" dirty="0">
+                <a:latin typeface="Ubuntu Mono" panose="020B0509030602030204" pitchFamily="49" charset="0"/>
+              </a:rPr>
+              <a:t>6°FASE</a:t>
+            </a:r>
+          </a:p>
+        </p:txBody>
+      </p:sp>
+    </p:spTree>
+    <p:extLst>
+      <p:ext uri="{BB962C8B-B14F-4D97-AF65-F5344CB8AC3E}">
+        <p14:creationId xmlns:p14="http://schemas.microsoft.com/office/powerpoint/2010/main" val="4251228119"/>
+      </p:ext>
+    </p:extLst>
+  </p:cSld>
+  <p:clrMapOvr>
+    <a:masterClrMapping/>
+  </p:clrMapOvr>
+  <p:transition spd="slow">
+    <p:pull/>
+  </p:transition>
+</p:sld>
+</file>
+
+<file path=ppt/slides/slide15.xml><?xml version="1.0" encoding="utf-8"?>
+<p:sld xmlns:a="http://schemas.openxmlformats.org/drawingml/2006/main" xmlns:r="http://schemas.openxmlformats.org/officeDocument/2006/relationships" xmlns:p="http://schemas.openxmlformats.org/presentationml/2006/main">
+  <p:cSld>
+    <p:spTree>
+      <p:nvGrpSpPr>
+        <p:cNvPr id="1" name=""/>
+        <p:cNvGrpSpPr/>
+        <p:nvPr/>
+      </p:nvGrpSpPr>
+      <p:grpSpPr>
+        <a:xfrm>
+          <a:off x="0" y="0"/>
+          <a:ext cx="0" cy="0"/>
+          <a:chOff x="0" y="0"/>
+          <a:chExt cx="0" cy="0"/>
+        </a:xfrm>
+      </p:grpSpPr>
+      <p:sp>
+        <p:nvSpPr>
+          <p:cNvPr id="7" name="Titolo 6"/>
+          <p:cNvSpPr>
+            <a:spLocks noGrp="1"/>
+          </p:cNvSpPr>
+          <p:nvPr>
+            <p:ph type="title"/>
+          </p:nvPr>
+        </p:nvSpPr>
+        <p:spPr/>
+        <p:txBody>
+          <a:bodyPr rtlCol="0"/>
+          <a:lstStyle/>
+          <a:p>
+            <a:r>
+              <a:rPr lang="it-IT" dirty="0" err="1">
+                <a:latin typeface="Ubuntu Mono" panose="020B0509030602030204" pitchFamily="49" charset="0"/>
+              </a:rPr>
+              <a:t>Command</a:t>
+            </a:r>
+            <a:r>
+              <a:rPr lang="it-IT" dirty="0">
+                <a:latin typeface="Ubuntu Mono" panose="020B0509030602030204" pitchFamily="49" charset="0"/>
+              </a:rPr>
+              <a:t> &amp; Control</a:t>
+            </a:r>
+          </a:p>
+        </p:txBody>
+      </p:sp>
+      <p:sp>
+        <p:nvSpPr>
+          <p:cNvPr id="15" name="Segnaposto contenuto 14">
+            <a:extLst>
+              <a:ext uri="{FF2B5EF4-FFF2-40B4-BE49-F238E27FC236}">
+                <a16:creationId xmlns:a16="http://schemas.microsoft.com/office/drawing/2014/main" id="{2AA4F659-F662-4235-8E87-DEDD933AFE87}"/>
+              </a:ext>
+            </a:extLst>
+          </p:cNvPr>
+          <p:cNvSpPr>
+            <a:spLocks noGrp="1"/>
+          </p:cNvSpPr>
+          <p:nvPr>
+            <p:ph sz="half" idx="2"/>
+          </p:nvPr>
+        </p:nvSpPr>
+        <p:spPr>
+          <a:xfrm>
+            <a:off x="1231127" y="1628800"/>
+            <a:ext cx="5760640" cy="3740214"/>
+          </a:xfrm>
+        </p:spPr>
+        <p:txBody>
+          <a:bodyPr/>
+          <a:lstStyle/>
+          <a:p>
+            <a:r>
+              <a:rPr lang="it-IT" dirty="0">
+                <a:latin typeface="Ubuntu Mono" panose="020B0509030602030204" pitchFamily="49" charset="0"/>
+              </a:rPr>
+              <a:t>L’attaccante utilizza una shell sulla propria macchina per controllare a distanza i dispositivi delle vittime attraverso la backdoor precedentemente creata</a:t>
+            </a:r>
+          </a:p>
+          <a:p>
+            <a:r>
+              <a:rPr lang="it-IT" dirty="0">
+                <a:latin typeface="Ubuntu Mono" panose="020B0509030602030204" pitchFamily="49" charset="0"/>
+              </a:rPr>
+              <a:t>Per attivare la shell vengono sfruttati i comandi forniti dal framework </a:t>
+            </a:r>
+            <a:r>
+              <a:rPr lang="it-IT" dirty="0" err="1">
+                <a:latin typeface="Ubuntu Mono" panose="020B0509030602030204" pitchFamily="49" charset="0"/>
+              </a:rPr>
+              <a:t>Metasploit</a:t>
+            </a:r>
+            <a:endParaRPr lang="it-IT" dirty="0">
+              <a:latin typeface="Ubuntu Mono" panose="020B0509030602030204" pitchFamily="49" charset="0"/>
+            </a:endParaRPr>
+          </a:p>
+          <a:p>
+            <a:endParaRPr lang="it-IT" dirty="0">
+              <a:latin typeface="Ubuntu Mono" panose="020B0509030602030204" pitchFamily="49" charset="0"/>
+            </a:endParaRPr>
+          </a:p>
+        </p:txBody>
+      </p:sp>
+      <p:pic>
+        <p:nvPicPr>
+          <p:cNvPr id="4" name="Immagine 3" descr="Immagine che contiene testo, screenshot&#10;&#10;Descrizione generata automaticamente">
+            <a:extLst>
+              <a:ext uri="{FF2B5EF4-FFF2-40B4-BE49-F238E27FC236}">
+                <a16:creationId xmlns:a16="http://schemas.microsoft.com/office/drawing/2014/main" id="{66C37603-03D4-4A9D-8B18-FBBB614061CD}"/>
+              </a:ext>
+            </a:extLst>
+          </p:cNvPr>
+          <p:cNvPicPr>
+            <a:picLocks noChangeAspect="1"/>
+          </p:cNvPicPr>
+          <p:nvPr/>
+        </p:nvPicPr>
+        <p:blipFill rotWithShape="1">
+          <a:blip r:embed="rId3">
+            <a:extLst>
+              <a:ext uri="{28A0092B-C50C-407E-A947-70E740481C1C}">
+                <a14:useLocalDpi xmlns:a14="http://schemas.microsoft.com/office/drawing/2010/main" val="0"/>
+              </a:ext>
+            </a:extLst>
+          </a:blip>
+          <a:srcRect r="1035" b="5143"/>
+          <a:stretch/>
+        </p:blipFill>
+        <p:spPr>
+          <a:xfrm>
+            <a:off x="6991767" y="1836348"/>
+            <a:ext cx="4941450" cy="3185303"/>
+          </a:xfrm>
+          <a:prstGeom prst="rect">
+            <a:avLst/>
+          </a:prstGeom>
+        </p:spPr>
+      </p:pic>
+    </p:spTree>
+    <p:extLst>
+      <p:ext uri="{BB962C8B-B14F-4D97-AF65-F5344CB8AC3E}">
+        <p14:creationId xmlns:p14="http://schemas.microsoft.com/office/powerpoint/2010/main" val="1960835711"/>
+      </p:ext>
+    </p:extLst>
+  </p:cSld>
+  <p:clrMapOvr>
+    <a:masterClrMapping/>
+  </p:clrMapOvr>
+  <p:transition spd="slow">
+    <p:pull/>
+  </p:transition>
+</p:sld>
+</file>
+
+<file path=ppt/slides/slide16.xml><?xml version="1.0" encoding="utf-8"?>
+<p:sld xmlns:a="http://schemas.openxmlformats.org/drawingml/2006/main" xmlns:r="http://schemas.openxmlformats.org/officeDocument/2006/relationships" xmlns:p="http://schemas.openxmlformats.org/presentationml/2006/main">
+  <p:cSld>
+    <p:spTree>
+      <p:nvGrpSpPr>
+        <p:cNvPr id="1" name=""/>
+        <p:cNvGrpSpPr/>
+        <p:nvPr/>
+      </p:nvGrpSpPr>
+      <p:grpSpPr>
+        <a:xfrm>
+          <a:off x="0" y="0"/>
+          <a:ext cx="0" cy="0"/>
+          <a:chOff x="0" y="0"/>
+          <a:chExt cx="0" cy="0"/>
+        </a:xfrm>
+      </p:grpSpPr>
+      <p:sp>
+        <p:nvSpPr>
+          <p:cNvPr id="4" name="Titolo 3"/>
+          <p:cNvSpPr>
+            <a:spLocks noGrp="1"/>
+          </p:cNvSpPr>
+          <p:nvPr>
+            <p:ph type="title"/>
+          </p:nvPr>
+        </p:nvSpPr>
+        <p:spPr/>
+        <p:txBody>
+          <a:bodyPr rtlCol="0"/>
+          <a:lstStyle/>
+          <a:p>
+            <a:pPr rtl="0"/>
+            <a:r>
+              <a:rPr lang="it-IT" dirty="0">
+                <a:latin typeface="Ubuntu Mono" panose="020B0509030602030204" pitchFamily="49" charset="0"/>
+              </a:rPr>
+              <a:t>Action</a:t>
+            </a:r>
+          </a:p>
+        </p:txBody>
+      </p:sp>
+      <p:sp>
+        <p:nvSpPr>
+          <p:cNvPr id="5" name="Segnaposto testo 4"/>
+          <p:cNvSpPr>
+            <a:spLocks noGrp="1"/>
+          </p:cNvSpPr>
+          <p:nvPr>
+            <p:ph type="body" idx="1"/>
+          </p:nvPr>
+        </p:nvSpPr>
+        <p:spPr/>
+        <p:txBody>
+          <a:bodyPr rtlCol="0"/>
+          <a:lstStyle/>
+          <a:p>
+            <a:pPr rtl="0"/>
+            <a:r>
+              <a:rPr lang="it-IT" dirty="0">
+                <a:latin typeface="Ubuntu Mono" panose="020B0509030602030204" pitchFamily="49" charset="0"/>
+              </a:rPr>
+              <a:t>7°FASE</a:t>
+            </a:r>
+          </a:p>
+        </p:txBody>
+      </p:sp>
+    </p:spTree>
+    <p:extLst>
+      <p:ext uri="{BB962C8B-B14F-4D97-AF65-F5344CB8AC3E}">
+        <p14:creationId xmlns:p14="http://schemas.microsoft.com/office/powerpoint/2010/main" val="3893979087"/>
+      </p:ext>
+    </p:extLst>
+  </p:cSld>
+  <p:clrMapOvr>
+    <a:masterClrMapping/>
+  </p:clrMapOvr>
+  <p:transition spd="slow">
+    <p:pull/>
+  </p:transition>
+</p:sld>
+</file>
+
+<file path=ppt/slides/slide17.xml><?xml version="1.0" encoding="utf-8"?>
+<p:sld xmlns:a="http://schemas.openxmlformats.org/drawingml/2006/main" xmlns:r="http://schemas.openxmlformats.org/officeDocument/2006/relationships" xmlns:p="http://schemas.openxmlformats.org/presentationml/2006/main">
+  <p:cSld>
+    <p:spTree>
+      <p:nvGrpSpPr>
+        <p:cNvPr id="1" name=""/>
+        <p:cNvGrpSpPr/>
+        <p:nvPr/>
+      </p:nvGrpSpPr>
+      <p:grpSpPr>
+        <a:xfrm>
+          <a:off x="0" y="0"/>
+          <a:ext cx="0" cy="0"/>
+          <a:chOff x="0" y="0"/>
+          <a:chExt cx="0" cy="0"/>
+        </a:xfrm>
+      </p:grpSpPr>
+      <p:sp>
+        <p:nvSpPr>
+          <p:cNvPr id="7" name="Titolo 6"/>
+          <p:cNvSpPr>
+            <a:spLocks noGrp="1"/>
+          </p:cNvSpPr>
+          <p:nvPr>
+            <p:ph type="title"/>
+          </p:nvPr>
+        </p:nvSpPr>
+        <p:spPr/>
+        <p:txBody>
+          <a:bodyPr rtlCol="0"/>
+          <a:lstStyle/>
+          <a:p>
+            <a:r>
+              <a:rPr lang="it-IT" dirty="0">
+                <a:latin typeface="Ubuntu Mono" panose="020B0509030602030204" pitchFamily="49" charset="0"/>
+              </a:rPr>
+              <a:t>Action</a:t>
+            </a:r>
+          </a:p>
+        </p:txBody>
+      </p:sp>
+      <p:sp>
+        <p:nvSpPr>
+          <p:cNvPr id="15" name="Segnaposto contenuto 14">
+            <a:extLst>
+              <a:ext uri="{FF2B5EF4-FFF2-40B4-BE49-F238E27FC236}">
+                <a16:creationId xmlns:a16="http://schemas.microsoft.com/office/drawing/2014/main" id="{2AA4F659-F662-4235-8E87-DEDD933AFE87}"/>
+              </a:ext>
+            </a:extLst>
+          </p:cNvPr>
+          <p:cNvSpPr>
+            <a:spLocks noGrp="1"/>
+          </p:cNvSpPr>
+          <p:nvPr>
+            <p:ph sz="half" idx="2"/>
+          </p:nvPr>
+        </p:nvSpPr>
+        <p:spPr>
+          <a:xfrm>
+            <a:off x="1218883" y="1558892"/>
+            <a:ext cx="6087422" cy="3740214"/>
+          </a:xfrm>
+        </p:spPr>
+        <p:txBody>
+          <a:bodyPr/>
+          <a:lstStyle/>
+          <a:p>
+            <a:r>
+              <a:rPr lang="it-IT" sz="2400" dirty="0">
+                <a:latin typeface="Ubuntu Mono" panose="020B0509030602030204" pitchFamily="49" charset="0"/>
+              </a:rPr>
+              <a:t>Trattandosi di un meta-attacco i comandi dipendono strettamente dal tipo di attacco</a:t>
+            </a:r>
+          </a:p>
+          <a:p>
+            <a:r>
+              <a:rPr lang="it-IT" sz="2400" dirty="0">
+                <a:latin typeface="Ubuntu Mono" panose="020B0509030602030204" pitchFamily="49" charset="0"/>
+              </a:rPr>
+              <a:t>Grazie alla backdoor si ha completo accesso al dispositivo ed è quindi possibile effettuare qualsiasi operazione</a:t>
+            </a:r>
+          </a:p>
+          <a:p>
+            <a:r>
+              <a:rPr lang="it-IT" sz="2400" dirty="0">
+                <a:latin typeface="Ubuntu Mono" panose="020B0509030602030204" pitchFamily="49" charset="0"/>
+              </a:rPr>
+              <a:t>Alcuni esempi di attacco sono: Lettura/Invio SMS, </a:t>
+            </a:r>
+            <a:r>
+              <a:rPr lang="it-IT" sz="2400" dirty="0" err="1">
+                <a:latin typeface="Ubuntu Mono" panose="020B0509030602030204" pitchFamily="49" charset="0"/>
+              </a:rPr>
+              <a:t>Screenshot</a:t>
+            </a:r>
+            <a:r>
+              <a:rPr lang="it-IT" sz="2400" dirty="0">
+                <a:latin typeface="Ubuntu Mono" panose="020B0509030602030204" pitchFamily="49" charset="0"/>
+              </a:rPr>
+              <a:t> dello schermo, Utilizzo delle fotocamere, Utilizzo del modulo telefonico </a:t>
+            </a:r>
+            <a:r>
+              <a:rPr lang="it-IT" sz="2400" dirty="0" err="1">
+                <a:latin typeface="Ubuntu Mono" panose="020B0509030602030204" pitchFamily="49" charset="0"/>
+              </a:rPr>
+              <a:t>ecc</a:t>
+            </a:r>
+            <a:r>
+              <a:rPr lang="it-IT" sz="2400" dirty="0">
+                <a:latin typeface="Ubuntu Mono" panose="020B0509030602030204" pitchFamily="49" charset="0"/>
+              </a:rPr>
+              <a:t>…</a:t>
+            </a:r>
+          </a:p>
+        </p:txBody>
+      </p:sp>
+      <p:pic>
+        <p:nvPicPr>
+          <p:cNvPr id="5122" name="Picture 2">
+            <a:extLst>
+              <a:ext uri="{FF2B5EF4-FFF2-40B4-BE49-F238E27FC236}">
+                <a16:creationId xmlns:a16="http://schemas.microsoft.com/office/drawing/2014/main" id="{14EA9C2C-5CE9-4CF6-B9E0-CC7CA48F4853}"/>
+              </a:ext>
+            </a:extLst>
+          </p:cNvPr>
+          <p:cNvPicPr>
+            <a:picLocks noChangeAspect="1" noChangeArrowheads="1"/>
+          </p:cNvPicPr>
+          <p:nvPr/>
+        </p:nvPicPr>
+        <p:blipFill>
+          <a:blip r:embed="rId3">
+            <a:extLst>
+              <a:ext uri="{28A0092B-C50C-407E-A947-70E740481C1C}">
+                <a14:useLocalDpi xmlns:a14="http://schemas.microsoft.com/office/drawing/2010/main" val="0"/>
+              </a:ext>
+            </a:extLst>
+          </a:blip>
+          <a:srcRect/>
+          <a:stretch>
+            <a:fillRect/>
+          </a:stretch>
+        </p:blipFill>
+        <p:spPr bwMode="auto">
+          <a:xfrm>
+            <a:off x="7306305" y="2131219"/>
+            <a:ext cx="4614330" cy="2595561"/>
+          </a:xfrm>
+          <a:prstGeom prst="rect">
+            <a:avLst/>
+          </a:prstGeom>
+          <a:noFill/>
+          <a:extLst>
+            <a:ext uri="{909E8E84-426E-40DD-AFC4-6F175D3DCCD1}">
+              <a14:hiddenFill xmlns:a14="http://schemas.microsoft.com/office/drawing/2010/main">
+                <a:solidFill>
+                  <a:srgbClr val="FFFFFF"/>
+                </a:solidFill>
+              </a14:hiddenFill>
+            </a:ext>
+          </a:extLst>
+        </p:spPr>
+      </p:pic>
+    </p:spTree>
+    <p:extLst>
+      <p:ext uri="{BB962C8B-B14F-4D97-AF65-F5344CB8AC3E}">
+        <p14:creationId xmlns:p14="http://schemas.microsoft.com/office/powerpoint/2010/main" val="3202941529"/>
+      </p:ext>
+    </p:extLst>
+  </p:cSld>
+  <p:clrMapOvr>
+    <a:masterClrMapping/>
+  </p:clrMapOvr>
+  <p:transition spd="slow">
+    <p:pull/>
+  </p:transition>
+</p:sld>
+</file>
+
+<file path=ppt/slides/slide18.xml><?xml version="1.0" encoding="utf-8"?>
+<p:sld xmlns:a="http://schemas.openxmlformats.org/drawingml/2006/main" xmlns:r="http://schemas.openxmlformats.org/officeDocument/2006/relationships" xmlns:p="http://schemas.openxmlformats.org/presentationml/2006/main">
+  <p:cSld>
+    <p:spTree>
+      <p:nvGrpSpPr>
+        <p:cNvPr id="1" name=""/>
+        <p:cNvGrpSpPr/>
+        <p:nvPr/>
+      </p:nvGrpSpPr>
+      <p:grpSpPr>
+        <a:xfrm>
+          <a:off x="0" y="0"/>
+          <a:ext cx="0" cy="0"/>
+          <a:chOff x="0" y="0"/>
+          <a:chExt cx="0" cy="0"/>
+        </a:xfrm>
+      </p:grpSpPr>
+      <p:sp>
+        <p:nvSpPr>
+          <p:cNvPr id="3" name="Sottotitolo 2">
+            <a:extLst>
+              <a:ext uri="{FF2B5EF4-FFF2-40B4-BE49-F238E27FC236}">
+                <a16:creationId xmlns:a16="http://schemas.microsoft.com/office/drawing/2014/main" id="{F519E424-8A5C-4AC3-B2AE-66AAE5F7E6E1}"/>
+              </a:ext>
+            </a:extLst>
+          </p:cNvPr>
+          <p:cNvSpPr>
+            <a:spLocks noGrp="1"/>
+          </p:cNvSpPr>
+          <p:nvPr>
+            <p:ph type="subTitle" idx="1"/>
+          </p:nvPr>
+        </p:nvSpPr>
+        <p:spPr>
+          <a:xfrm>
+            <a:off x="3754152" y="5517232"/>
+            <a:ext cx="4680520" cy="555848"/>
+          </a:xfrm>
+        </p:spPr>
+        <p:txBody>
+          <a:bodyPr>
+            <a:normAutofit fontScale="92500"/>
+          </a:bodyPr>
+          <a:lstStyle/>
+          <a:p>
+            <a:pPr algn="ctr"/>
+            <a:r>
+              <a:rPr lang="it-IT" dirty="0">
+                <a:latin typeface="Ubuntu Mono" panose="020B0509030602030204" pitchFamily="49" charset="0"/>
+              </a:rPr>
+              <a:t>Grazie per l’attenzione</a:t>
+            </a:r>
+          </a:p>
+        </p:txBody>
+      </p:sp>
+      <p:pic>
+        <p:nvPicPr>
+          <p:cNvPr id="7" name="Immagine 6">
+            <a:extLst>
+              <a:ext uri="{FF2B5EF4-FFF2-40B4-BE49-F238E27FC236}">
+                <a16:creationId xmlns:a16="http://schemas.microsoft.com/office/drawing/2014/main" id="{254B3236-F8B3-4061-855B-C741D69E8F64}"/>
+              </a:ext>
+            </a:extLst>
+          </p:cNvPr>
+          <p:cNvPicPr>
+            <a:picLocks noChangeAspect="1"/>
+          </p:cNvPicPr>
+          <p:nvPr/>
+        </p:nvPicPr>
+        <p:blipFill>
+          <a:blip r:embed="rId2" cstate="print">
+            <a:extLst>
+              <a:ext uri="{28A0092B-C50C-407E-A947-70E740481C1C}">
+                <a14:useLocalDpi xmlns:a14="http://schemas.microsoft.com/office/drawing/2010/main" val="0"/>
+              </a:ext>
+            </a:extLst>
+          </a:blip>
+          <a:stretch>
+            <a:fillRect/>
+          </a:stretch>
+        </p:blipFill>
+        <p:spPr>
+          <a:xfrm>
+            <a:off x="4525192" y="2189025"/>
+            <a:ext cx="3138441" cy="3328207"/>
+          </a:xfrm>
+          <a:prstGeom prst="rect">
+            <a:avLst/>
+          </a:prstGeom>
+        </p:spPr>
+      </p:pic>
+      <p:sp>
+        <p:nvSpPr>
+          <p:cNvPr id="2" name="Titolo 1">
+            <a:extLst>
+              <a:ext uri="{FF2B5EF4-FFF2-40B4-BE49-F238E27FC236}">
+                <a16:creationId xmlns:a16="http://schemas.microsoft.com/office/drawing/2014/main" id="{40F136A7-A3AE-41EC-9783-24196FA8DC72}"/>
+              </a:ext>
+            </a:extLst>
+          </p:cNvPr>
+          <p:cNvSpPr>
+            <a:spLocks noGrp="1"/>
+          </p:cNvSpPr>
+          <p:nvPr>
+            <p:ph type="ctrTitle"/>
+          </p:nvPr>
+        </p:nvSpPr>
+        <p:spPr>
+          <a:xfrm>
+            <a:off x="1066264" y="340642"/>
+            <a:ext cx="10056297" cy="2000251"/>
+          </a:xfrm>
+        </p:spPr>
+        <p:txBody>
+          <a:bodyPr>
+            <a:normAutofit fontScale="90000"/>
+          </a:bodyPr>
+          <a:lstStyle/>
+          <a:p>
+            <a:pPr algn="ctr"/>
+            <a:r>
+              <a:rPr lang="it-IT" dirty="0">
+                <a:latin typeface="Ubuntu Mono" panose="020B0509030602030204" pitchFamily="49" charset="0"/>
+              </a:rPr>
+              <a:t>Sei ancora convinto di vendere la tua privacy invece di pagare un servizio?</a:t>
+            </a:r>
+          </a:p>
+        </p:txBody>
+      </p:sp>
+    </p:spTree>
+    <p:extLst>
+      <p:ext uri="{BB962C8B-B14F-4D97-AF65-F5344CB8AC3E}">
+        <p14:creationId xmlns:p14="http://schemas.microsoft.com/office/powerpoint/2010/main" val="2979935933"/>
+      </p:ext>
+    </p:extLst>
+  </p:cSld>
+  <p:clrMapOvr>
+    <a:masterClrMapping/>
+  </p:clrMapOvr>
+  <p:transition spd="slow">
+    <p:pull/>
+  </p:transition>
 </p:sld>
 </file>
 
@@ -11448,13 +13021,13 @@
             <p:ph sz="half" idx="2"/>
             <p:extLst>
               <p:ext uri="{D42A27DB-BD31-4B8C-83A1-F6EECF244321}">
-                <p14:modId xmlns:p14="http://schemas.microsoft.com/office/powerpoint/2010/main" val="809840430"/>
+                <p14:modId xmlns:p14="http://schemas.microsoft.com/office/powerpoint/2010/main" val="3555317401"/>
               </p:ext>
             </p:extLst>
           </p:nvPr>
         </p:nvGraphicFramePr>
         <p:xfrm>
-          <a:off x="6532515" y="1498600"/>
+          <a:off x="6500972" y="1706563"/>
           <a:ext cx="5078412" cy="4465637"/>
         </p:xfrm>
         <a:graphic>
@@ -11473,18 +13046,9 @@
   <p:clrMapOvr>
     <a:masterClrMapping/>
   </p:clrMapOvr>
-  <mc:AlternateContent xmlns:mc="http://schemas.openxmlformats.org/markup-compatibility/2006" xmlns:p14="http://schemas.microsoft.com/office/powerpoint/2010/main">
-    <mc:Choice Requires="p14">
-      <p:transition spd="med" p14:dur="700">
-        <p:fade/>
-      </p:transition>
-    </mc:Choice>
-    <mc:Fallback xmlns="">
-      <p:transition spd="med">
-        <p:fade/>
-      </p:transition>
-    </mc:Fallback>
-  </mc:AlternateContent>
+  <p:transition spd="slow">
+    <p:pull/>
+  </p:transition>
 </p:sld>
 </file>
 
@@ -11568,18 +13132,9 @@
   <p:clrMapOvr>
     <a:masterClrMapping/>
   </p:clrMapOvr>
-  <mc:AlternateContent xmlns:mc="http://schemas.openxmlformats.org/markup-compatibility/2006" xmlns:p14="http://schemas.microsoft.com/office/powerpoint/2010/main">
-    <mc:Choice Requires="p14">
-      <p:transition spd="med" p14:dur="700">
-        <p:fade/>
-      </p:transition>
-    </mc:Choice>
-    <mc:Fallback xmlns="">
-      <p:transition spd="med">
-        <p:fade/>
-      </p:transition>
-    </mc:Fallback>
-  </mc:AlternateContent>
+  <p:transition spd="slow">
+    <p:pull/>
+  </p:transition>
 </p:sld>
 </file>
 
@@ -11658,10 +13213,14 @@
           <a:p>
             <a:pPr rtl="0"/>
             <a:r>
-              <a:rPr lang="it-IT" err="1"/>
+              <a:rPr lang="it-IT" dirty="0" err="1">
+                <a:latin typeface="Ubuntu Mono" panose="020B0509030602030204" pitchFamily="49" charset="0"/>
+              </a:rPr>
               <a:t>Reconnaissance</a:t>
             </a:r>
-            <a:endParaRPr lang="it-IT"/>
+            <a:endParaRPr lang="it-IT" dirty="0">
+              <a:latin typeface="Ubuntu Mono" panose="020B0509030602030204" pitchFamily="49" charset="0"/>
+            </a:endParaRPr>
           </a:p>
         </p:txBody>
       </p:sp>
@@ -11684,7 +13243,7 @@
         <p:spPr>
           <a:xfrm>
             <a:off x="1218883" y="1628800"/>
-            <a:ext cx="6099665" cy="4465320"/>
+            <a:ext cx="6531713" cy="4465320"/>
           </a:xfrm>
           <a:prstGeom prst="rect">
             <a:avLst/>
@@ -11692,51 +13251,62 @@
         </p:spPr>
         <p:txBody>
           <a:bodyPr>
-            <a:normAutofit/>
+            <a:noAutofit/>
           </a:bodyPr>
           <a:lstStyle/>
           <a:p>
             <a:r>
-              <a:rPr lang="it-IT" sz="2200" dirty="0"/>
+              <a:rPr lang="it-IT" sz="2400" dirty="0">
+                <a:latin typeface="Ubuntu Mono" panose="020B0509030602030204" pitchFamily="49" charset="0"/>
+              </a:rPr>
               <a:t>L’intera fase di ricognizione in questo attacco è basata sul </a:t>
             </a:r>
             <a:r>
-              <a:rPr lang="it-IT" sz="2200" i="1" dirty="0"/>
+              <a:rPr lang="it-IT" sz="2400" i="1" dirty="0">
+                <a:latin typeface="Ubuntu Mono" panose="020B0509030602030204" pitchFamily="49" charset="0"/>
+              </a:rPr>
               <a:t>social engineering</a:t>
             </a:r>
             <a:r>
-              <a:rPr lang="it-IT" sz="2200" dirty="0"/>
+              <a:rPr lang="it-IT" sz="2400" dirty="0">
+                <a:latin typeface="Ubuntu Mono" panose="020B0509030602030204" pitchFamily="49" charset="0"/>
+              </a:rPr>
               <a:t>. </a:t>
             </a:r>
           </a:p>
           <a:p>
             <a:r>
-              <a:rPr lang="it-IT" sz="2200" dirty="0"/>
+              <a:rPr lang="it-IT" sz="2400" dirty="0">
+                <a:latin typeface="Ubuntu Mono" panose="020B0509030602030204" pitchFamily="49" charset="0"/>
+              </a:rPr>
               <a:t>Al fine di colpire il maggior numero di dispositivi possibili, la fase di ricognizione ha portato al riconoscere l’importanza di applicazioni legate all’ascolto di musica on-demand. </a:t>
             </a:r>
           </a:p>
           <a:p>
             <a:r>
-              <a:rPr lang="it-IT" sz="2200" dirty="0"/>
+              <a:rPr lang="it-IT" sz="2400" dirty="0">
+                <a:latin typeface="Ubuntu Mono" panose="020B0509030602030204" pitchFamily="49" charset="0"/>
+              </a:rPr>
               <a:t>Una di queste applicazioni è l’applicazione di </a:t>
             </a:r>
             <a:r>
-              <a:rPr lang="it-IT" sz="2200" b="1" dirty="0" err="1"/>
+              <a:rPr lang="it-IT" sz="2400" b="1" dirty="0" err="1">
+                <a:latin typeface="Ubuntu Mono" panose="020B0509030602030204" pitchFamily="49" charset="0"/>
+              </a:rPr>
               <a:t>Spotify</a:t>
             </a:r>
             <a:r>
-              <a:rPr lang="it-IT" sz="2200" dirty="0"/>
+              <a:rPr lang="it-IT" sz="2400" dirty="0">
+                <a:latin typeface="Ubuntu Mono" panose="020B0509030602030204" pitchFamily="49" charset="0"/>
+              </a:rPr>
               <a:t>, installata su diversi dispositivi e che conta numerose applicazioni pirata.</a:t>
             </a:r>
-          </a:p>
-          <a:p>
-            <a:endParaRPr lang="it-IT" sz="2200" dirty="0"/>
           </a:p>
         </p:txBody>
       </p:sp>
       <p:pic>
         <p:nvPicPr>
-          <p:cNvPr id="8" name="Segnaposto contenuto 7" descr="Immagine che contiene disegnando&#10;&#10;Descrizione generata automaticamente">
+          <p:cNvPr id="8" name="Segnaposto contenuto 7">
             <a:extLst>
               <a:ext uri="{FF2B5EF4-FFF2-40B4-BE49-F238E27FC236}">
                 <a16:creationId xmlns:a16="http://schemas.microsoft.com/office/drawing/2014/main" id="{CA54AAAC-5CEA-465C-ABC8-25446AFE58C0}"/>
@@ -11756,19 +13326,15 @@
               <a:ext uri="{28A0092B-C50C-407E-A947-70E740481C1C}">
                 <a14:useLocalDpi xmlns:a14="http://schemas.microsoft.com/office/drawing/2010/main" val="0"/>
               </a:ext>
-              <a:ext uri="{837473B0-CC2E-450A-ABE3-18F120FF3D39}">
-                <a1611:picAttrSrcUrl xmlns:a1611="http://schemas.microsoft.com/office/drawing/2016/11/main" r:id="rId4"/>
-              </a:ext>
             </a:extLst>
           </a:blip>
-          <a:stretch>
-            <a:fillRect/>
-          </a:stretch>
+          <a:srcRect/>
+          <a:stretch/>
         </p:blipFill>
         <p:spPr>
           <a:xfrm>
-            <a:off x="7894612" y="1628800"/>
-            <a:ext cx="3247467" cy="3247467"/>
+            <a:off x="7894612" y="1920814"/>
+            <a:ext cx="3684772" cy="3016371"/>
           </a:xfrm>
           <a:prstGeom prst="rect">
             <a:avLst/>
@@ -11786,18 +13352,9 @@
   <p:clrMapOvr>
     <a:masterClrMapping/>
   </p:clrMapOvr>
-  <mc:AlternateContent xmlns:mc="http://schemas.openxmlformats.org/markup-compatibility/2006" xmlns:p14="http://schemas.microsoft.com/office/powerpoint/2010/main">
-    <mc:Choice Requires="p14">
-      <p:transition spd="med" p14:dur="700">
-        <p:fade/>
-      </p:transition>
-    </mc:Choice>
-    <mc:Fallback xmlns="">
-      <p:transition spd="med">
-        <p:fade/>
-      </p:transition>
-    </mc:Fallback>
-  </mc:AlternateContent>
+  <p:transition spd="slow">
+    <p:pull/>
+  </p:transition>
 </p:sld>
 </file>
 
@@ -11919,9 +13476,8 @@
             <a:r>
               <a:rPr lang="it-IT" sz="1400" dirty="0">
                 <a:solidFill>
-                  <a:schemeClr val="bg1">
-                    <a:lumMod val="50000"/>
-                    <a:lumOff val="50000"/>
+                  <a:schemeClr val="tx1">
+                    <a:lumMod val="65000"/>
                   </a:schemeClr>
                 </a:solidFill>
                 <a:latin typeface="Ubuntu Mono" panose="020B0509030602030204" pitchFamily="49" charset="0"/>
@@ -11934,9 +13490,8 @@
             <a:r>
               <a:rPr lang="it-IT" sz="1400" dirty="0">
                 <a:solidFill>
-                  <a:schemeClr val="bg1">
-                    <a:lumMod val="50000"/>
-                    <a:lumOff val="50000"/>
+                  <a:schemeClr val="tx1">
+                    <a:lumMod val="65000"/>
                   </a:schemeClr>
                 </a:solidFill>
                 <a:latin typeface="Ubuntu Mono" panose="020B0509030602030204" pitchFamily="49" charset="0"/>
@@ -11956,18 +13511,9 @@
   <p:clrMapOvr>
     <a:masterClrMapping/>
   </p:clrMapOvr>
-  <mc:AlternateContent xmlns:mc="http://schemas.openxmlformats.org/markup-compatibility/2006" xmlns:p14="http://schemas.microsoft.com/office/powerpoint/2010/main">
-    <mc:Choice Requires="p14">
-      <p:transition spd="med" p14:dur="700">
-        <p:fade/>
-      </p:transition>
-    </mc:Choice>
-    <mc:Fallback xmlns="">
-      <p:transition spd="med">
-        <p:fade/>
-      </p:transition>
-    </mc:Fallback>
-  </mc:AlternateContent>
+  <p:transition spd="slow">
+    <p:pull/>
+  </p:transition>
 </p:sld>
 </file>
 
@@ -12051,18 +13597,9 @@
   <p:clrMapOvr>
     <a:masterClrMapping/>
   </p:clrMapOvr>
-  <mc:AlternateContent xmlns:mc="http://schemas.openxmlformats.org/markup-compatibility/2006" xmlns:p14="http://schemas.microsoft.com/office/powerpoint/2010/main">
-    <mc:Choice Requires="p14">
-      <p:transition spd="med" p14:dur="700">
-        <p:fade/>
-      </p:transition>
-    </mc:Choice>
-    <mc:Fallback xmlns="">
-      <p:transition spd="med">
-        <p:fade/>
-      </p:transition>
-    </mc:Fallback>
-  </mc:AlternateContent>
+  <p:transition spd="slow">
+    <p:pull/>
+  </p:transition>
 </p:sld>
 </file>
 
@@ -12129,8 +13666,8 @@
         </p:nvSpPr>
         <p:spPr>
           <a:xfrm>
-            <a:off x="1218883" y="1844824"/>
-            <a:ext cx="6027657" cy="3454400"/>
+            <a:off x="1231127" y="1628800"/>
+            <a:ext cx="5760640" cy="3740214"/>
           </a:xfrm>
         </p:spPr>
         <p:txBody>
@@ -12138,39 +13675,44 @@
           <a:lstStyle/>
           <a:p>
             <a:r>
-              <a:rPr lang="it-IT" dirty="0"/>
-              <a:t>Ciao</a:t>
+              <a:rPr lang="it-IT" dirty="0">
+                <a:latin typeface="Ubuntu Mono" panose="020B0509030602030204" pitchFamily="49" charset="0"/>
+              </a:rPr>
+              <a:t>Creazione di un tool per condurre un meta-attacco su Android mediante backdoor</a:t>
             </a:r>
           </a:p>
           <a:p>
             <a:r>
-              <a:rPr lang="it-IT" dirty="0"/>
-              <a:t>Come</a:t>
+              <a:rPr lang="it-IT" dirty="0">
+                <a:latin typeface="Ubuntu Mono" panose="020B0509030602030204" pitchFamily="49" charset="0"/>
+              </a:rPr>
+              <a:t>Il tool è capace di iniettare una backdoor all’interno di una qualsiasi applicazione</a:t>
             </a:r>
           </a:p>
           <a:p>
             <a:r>
-              <a:rPr lang="it-IT" dirty="0"/>
-              <a:t>Va?</a:t>
+              <a:rPr lang="it-IT" dirty="0">
+                <a:latin typeface="Ubuntu Mono" panose="020B0509030602030204" pitchFamily="49" charset="0"/>
+              </a:rPr>
+              <a:t>Creazione di un app pirata di </a:t>
             </a:r>
-          </a:p>
-          <a:p>
             <a:r>
-              <a:rPr lang="it-IT" dirty="0"/>
-              <a:t>AHAH</a:t>
+              <a:rPr lang="it-IT" dirty="0" err="1">
+                <a:latin typeface="Ubuntu Mono" panose="020B0509030602030204" pitchFamily="49" charset="0"/>
+              </a:rPr>
+              <a:t>Spotify</a:t>
             </a:r>
-          </a:p>
-          <a:p>
             <a:r>
-              <a:rPr lang="it-IT" dirty="0"/>
-              <a:t>HEHEHEHVBEHEWKJEWK</a:t>
+              <a:rPr lang="it-IT" dirty="0">
+                <a:latin typeface="Ubuntu Mono" panose="020B0509030602030204" pitchFamily="49" charset="0"/>
+              </a:rPr>
+              <a:t> per testare il tool</a:t>
             </a:r>
           </a:p>
           <a:p>
-            <a:r>
-              <a:rPr lang="it-IT" dirty="0"/>
-              <a:t>EFHWBUJVGKBJUEVGEWBGVEVG</a:t>
-            </a:r>
+            <a:endParaRPr lang="it-IT" dirty="0">
+              <a:latin typeface="Ubuntu Mono" panose="020B0509030602030204" pitchFamily="49" charset="0"/>
+            </a:endParaRPr>
           </a:p>
         </p:txBody>
       </p:sp>
@@ -12188,7 +13730,7 @@
           </p:cNvPicPr>
           <p:nvPr/>
         </p:nvPicPr>
-        <p:blipFill>
+        <p:blipFill rotWithShape="1">
           <a:blip r:embed="rId3">
             <a:extLst>
               <a:ext uri="{28A0092B-C50C-407E-A947-70E740481C1C}">
@@ -12196,15 +13738,13 @@
               </a:ext>
             </a:extLst>
           </a:blip>
-          <a:srcRect/>
-          <a:stretch>
-            <a:fillRect/>
-          </a:stretch>
+          <a:srcRect r="1722" b="3178"/>
+          <a:stretch/>
         </p:blipFill>
         <p:spPr bwMode="auto">
           <a:xfrm>
-            <a:off x="6886500" y="1849026"/>
-            <a:ext cx="4835781" cy="2747392"/>
+            <a:off x="7174532" y="2098953"/>
+            <a:ext cx="4752528" cy="2660094"/>
           </a:xfrm>
           <a:prstGeom prst="rect">
             <a:avLst/>
@@ -12231,18 +13771,9 @@
   <p:clrMapOvr>
     <a:masterClrMapping/>
   </p:clrMapOvr>
-  <mc:AlternateContent xmlns:mc="http://schemas.openxmlformats.org/markup-compatibility/2006" xmlns:p14="http://schemas.microsoft.com/office/powerpoint/2010/main">
-    <mc:Choice Requires="p14">
-      <p:transition spd="med" p14:dur="700">
-        <p:fade/>
-      </p:transition>
-    </mc:Choice>
-    <mc:Fallback xmlns="">
-      <p:transition spd="med">
-        <p:fade/>
-      </p:transition>
-    </mc:Fallback>
-  </mc:AlternateContent>
+  <p:transition spd="slow">
+    <p:pull/>
+  </p:transition>
 </p:sld>
 </file>
 
@@ -12265,7 +13796,7 @@
       </p:grpSpPr>
       <p:sp>
         <p:nvSpPr>
-          <p:cNvPr id="3" name="Titolo 2"/>
+          <p:cNvPr id="4" name="Titolo 3"/>
           <p:cNvSpPr>
             <a:spLocks noGrp="1"/>
           </p:cNvSpPr>
@@ -12280,8 +13811,35 @@
           <a:p>
             <a:pPr rtl="0"/>
             <a:r>
-              <a:rPr lang="it-IT" dirty="0"/>
-              <a:t>Aggiungere un titolo di diapositiva - 3</a:t>
+              <a:rPr lang="it-IT" dirty="0">
+                <a:latin typeface="Ubuntu Mono" panose="020B0509030602030204" pitchFamily="49" charset="0"/>
+              </a:rPr>
+              <a:t>Delivery</a:t>
+            </a:r>
+          </a:p>
+        </p:txBody>
+      </p:sp>
+      <p:sp>
+        <p:nvSpPr>
+          <p:cNvPr id="5" name="Segnaposto testo 4"/>
+          <p:cNvSpPr>
+            <a:spLocks noGrp="1"/>
+          </p:cNvSpPr>
+          <p:nvPr>
+            <p:ph type="body" idx="1"/>
+          </p:nvPr>
+        </p:nvSpPr>
+        <p:spPr/>
+        <p:txBody>
+          <a:bodyPr rtlCol="0"/>
+          <a:lstStyle/>
+          <a:p>
+            <a:pPr rtl="0"/>
+            <a:r>
+              <a:rPr lang="it-IT" dirty="0">
+                <a:latin typeface="Ubuntu Mono" panose="020B0509030602030204" pitchFamily="49" charset="0"/>
+              </a:rPr>
+              <a:t>3°FASE</a:t>
             </a:r>
           </a:p>
         </p:txBody>
@@ -12289,25 +13847,16 @@
     </p:spTree>
     <p:extLst>
       <p:ext uri="{BB962C8B-B14F-4D97-AF65-F5344CB8AC3E}">
-        <p14:creationId xmlns:p14="http://schemas.microsoft.com/office/powerpoint/2010/main" val="397710800"/>
+        <p14:creationId xmlns:p14="http://schemas.microsoft.com/office/powerpoint/2010/main" val="293097849"/>
       </p:ext>
     </p:extLst>
   </p:cSld>
   <p:clrMapOvr>
     <a:masterClrMapping/>
   </p:clrMapOvr>
-  <mc:AlternateContent xmlns:mc="http://schemas.openxmlformats.org/markup-compatibility/2006" xmlns:p14="http://schemas.microsoft.com/office/powerpoint/2010/main">
-    <mc:Choice Requires="p14">
-      <p:transition spd="med" p14:dur="700">
-        <p:fade/>
-      </p:transition>
-    </mc:Choice>
-    <mc:Fallback xmlns="">
-      <p:transition spd="med">
-        <p:fade/>
-      </p:transition>
-    </mc:Fallback>
-  </mc:AlternateContent>
+  <p:transition spd="slow">
+    <p:pull/>
+  </p:transition>
 </p:sld>
 </file>
 
@@ -12328,28 +13877,150 @@
           <a:chExt cx="0" cy="0"/>
         </a:xfrm>
       </p:grpSpPr>
+      <p:sp>
+        <p:nvSpPr>
+          <p:cNvPr id="7" name="Titolo 6"/>
+          <p:cNvSpPr>
+            <a:spLocks noGrp="1"/>
+          </p:cNvSpPr>
+          <p:nvPr>
+            <p:ph type="title"/>
+          </p:nvPr>
+        </p:nvSpPr>
+        <p:spPr/>
+        <p:txBody>
+          <a:bodyPr rtlCol="0"/>
+          <a:lstStyle/>
+          <a:p>
+            <a:pPr rtl="0"/>
+            <a:r>
+              <a:rPr lang="it-IT" dirty="0">
+                <a:latin typeface="Ubuntu Mono" panose="020B0509030602030204" pitchFamily="49" charset="0"/>
+              </a:rPr>
+              <a:t>Delivery</a:t>
+            </a:r>
+          </a:p>
+        </p:txBody>
+      </p:sp>
+      <p:sp>
+        <p:nvSpPr>
+          <p:cNvPr id="15" name="Segnaposto contenuto 14">
+            <a:extLst>
+              <a:ext uri="{FF2B5EF4-FFF2-40B4-BE49-F238E27FC236}">
+                <a16:creationId xmlns:a16="http://schemas.microsoft.com/office/drawing/2014/main" id="{2AA4F659-F662-4235-8E87-DEDD933AFE87}"/>
+              </a:ext>
+            </a:extLst>
+          </p:cNvPr>
+          <p:cNvSpPr>
+            <a:spLocks noGrp="1"/>
+          </p:cNvSpPr>
+          <p:nvPr>
+            <p:ph sz="half" idx="2"/>
+          </p:nvPr>
+        </p:nvSpPr>
+        <p:spPr>
+          <a:xfrm>
+            <a:off x="1231127" y="1628800"/>
+            <a:ext cx="5760640" cy="3740214"/>
+          </a:xfrm>
+        </p:spPr>
+        <p:txBody>
+          <a:bodyPr/>
+          <a:lstStyle/>
+          <a:p>
+            <a:r>
+              <a:rPr lang="it-IT" dirty="0">
+                <a:latin typeface="Ubuntu Mono" panose="020B0509030602030204" pitchFamily="49" charset="0"/>
+              </a:rPr>
+              <a:t>La consegna dell’</a:t>
+            </a:r>
+            <a:r>
+              <a:rPr lang="it-IT" dirty="0" err="1">
+                <a:latin typeface="Ubuntu Mono" panose="020B0509030602030204" pitchFamily="49" charset="0"/>
+              </a:rPr>
+              <a:t>apk</a:t>
+            </a:r>
+            <a:r>
+              <a:rPr lang="it-IT" dirty="0">
+                <a:latin typeface="Ubuntu Mono" panose="020B0509030602030204" pitchFamily="49" charset="0"/>
+              </a:rPr>
+              <a:t> malevolo avviene attraverso canali terzi come blog, gruppi o pagine social (Facebook, </a:t>
+            </a:r>
+            <a:r>
+              <a:rPr lang="it-IT" dirty="0" err="1">
+                <a:latin typeface="Ubuntu Mono" panose="020B0509030602030204" pitchFamily="49" charset="0"/>
+              </a:rPr>
+              <a:t>Telegram</a:t>
+            </a:r>
+            <a:r>
+              <a:rPr lang="it-IT" dirty="0">
+                <a:latin typeface="Ubuntu Mono" panose="020B0509030602030204" pitchFamily="49" charset="0"/>
+              </a:rPr>
+              <a:t> </a:t>
+            </a:r>
+            <a:r>
+              <a:rPr lang="it-IT" dirty="0" err="1">
+                <a:latin typeface="Ubuntu Mono" panose="020B0509030602030204" pitchFamily="49" charset="0"/>
+              </a:rPr>
+              <a:t>ecc</a:t>
+            </a:r>
+            <a:r>
+              <a:rPr lang="it-IT" dirty="0">
+                <a:latin typeface="Ubuntu Mono" panose="020B0509030602030204" pitchFamily="49" charset="0"/>
+              </a:rPr>
+              <a:t>…)</a:t>
+            </a:r>
+          </a:p>
+        </p:txBody>
+      </p:sp>
+      <p:pic>
+        <p:nvPicPr>
+          <p:cNvPr id="3" name="Immagine 2" descr="Immagine che contiene screenshot, schermo, monitor, computer&#10;&#10;Descrizione generata automaticamente">
+            <a:extLst>
+              <a:ext uri="{FF2B5EF4-FFF2-40B4-BE49-F238E27FC236}">
+                <a16:creationId xmlns:a16="http://schemas.microsoft.com/office/drawing/2014/main" id="{12128CE0-9BB1-42EF-8182-0EBEAD6B91C2}"/>
+              </a:ext>
+            </a:extLst>
+          </p:cNvPr>
+          <p:cNvPicPr>
+            <a:picLocks noChangeAspect="1"/>
+          </p:cNvPicPr>
+          <p:nvPr/>
+        </p:nvPicPr>
+        <p:blipFill rotWithShape="1">
+          <a:blip r:embed="rId3" cstate="print">
+            <a:extLst>
+              <a:ext uri="{28A0092B-C50C-407E-A947-70E740481C1C}">
+                <a14:useLocalDpi xmlns:a14="http://schemas.microsoft.com/office/drawing/2010/main" val="0"/>
+              </a:ext>
+            </a:extLst>
+          </a:blip>
+          <a:srcRect t="-262" b="64563"/>
+          <a:stretch/>
+        </p:blipFill>
+        <p:spPr>
+          <a:xfrm>
+            <a:off x="7246540" y="1894262"/>
+            <a:ext cx="4536504" cy="3069476"/>
+          </a:xfrm>
+          <a:prstGeom prst="rect">
+            <a:avLst/>
+          </a:prstGeom>
+        </p:spPr>
+      </p:pic>
     </p:spTree>
     <p:extLst>
       <p:ext uri="{BB962C8B-B14F-4D97-AF65-F5344CB8AC3E}">
-        <p14:creationId xmlns:p14="http://schemas.microsoft.com/office/powerpoint/2010/main" val="1405850135"/>
+        <p14:creationId xmlns:p14="http://schemas.microsoft.com/office/powerpoint/2010/main" val="2611455454"/>
       </p:ext>
     </p:extLst>
   </p:cSld>
   <p:clrMapOvr>
     <a:masterClrMapping/>
   </p:clrMapOvr>
-  <mc:AlternateContent xmlns:mc="http://schemas.openxmlformats.org/markup-compatibility/2006" xmlns:p14="http://schemas.microsoft.com/office/powerpoint/2010/main">
-    <mc:Choice Requires="p14">
-      <p:transition spd="med" p14:dur="700">
-        <p:fade/>
-      </p:transition>
-    </mc:Choice>
-    <mc:Fallback xmlns="">
-      <p:transition spd="med">
-        <p:fade/>
-      </p:transition>
-    </mc:Fallback>
-  </mc:AlternateContent>
+  <p:transition spd="slow">
+    <p:pull/>
+  </p:transition>
 </p:sld>
 </file>
 
@@ -14517,14 +16188,14 @@
 <file path=customXml/itemProps3.xml><?xml version="1.0" encoding="utf-8"?>
 <ds:datastoreItem xmlns:ds="http://schemas.openxmlformats.org/officeDocument/2006/customXml" ds:itemID="{60C67BEE-D13F-4BD2-98A5-34D8A0977F68}">
   <ds:schemaRefs>
+    <ds:schemaRef ds:uri="http://purl.org/dc/elements/1.1/"/>
+    <ds:schemaRef ds:uri="http://www.w3.org/XML/1998/namespace"/>
     <ds:schemaRef ds:uri="4873beb7-5857-4685-be1f-d57550cc96cc"/>
+    <ds:schemaRef ds:uri="http://purl.org/dc/terms/"/>
+    <ds:schemaRef ds:uri="http://schemas.microsoft.com/office/2006/metadata/properties"/>
+    <ds:schemaRef ds:uri="http://schemas.microsoft.com/office/2006/documentManagement/types"/>
+    <ds:schemaRef ds:uri="http://schemas.microsoft.com/office/infopath/2007/PartnerControls"/>
     <ds:schemaRef ds:uri="http://schemas.openxmlformats.org/package/2006/metadata/core-properties"/>
-    <ds:schemaRef ds:uri="http://purl.org/dc/terms/"/>
-    <ds:schemaRef ds:uri="http://schemas.microsoft.com/office/2006/documentManagement/types"/>
-    <ds:schemaRef ds:uri="http://purl.org/dc/elements/1.1/"/>
-    <ds:schemaRef ds:uri="http://schemas.microsoft.com/office/2006/metadata/properties"/>
-    <ds:schemaRef ds:uri="http://schemas.microsoft.com/office/infopath/2007/PartnerControls"/>
-    <ds:schemaRef ds:uri="http://www.w3.org/XML/1998/namespace"/>
     <ds:schemaRef ds:uri="http://purl.org/dc/dcmitype/"/>
   </ds:schemaRefs>
 </ds:datastoreItem>

</xml_diff>

<commit_message>
Updated documentation & PowerPoint
</commit_message>
<xml_diff>
--- a/Presentazione.pptx
+++ b/Presentazione.pptx
@@ -954,18 +954,30 @@
 </file>
 
 <file path=ppt/diagrams/colors1.xml><?xml version="1.0" encoding="utf-8"?>
-<dgm:colorsDef xmlns:dgm="http://schemas.openxmlformats.org/drawingml/2006/diagram" xmlns:a="http://schemas.openxmlformats.org/drawingml/2006/main" uniqueId="urn:microsoft.com/office/officeart/2005/8/colors/colorful1">
+<dgm:colorsDef xmlns:dgm="http://schemas.openxmlformats.org/drawingml/2006/diagram" xmlns:a="http://schemas.openxmlformats.org/drawingml/2006/main" uniqueId="urn:microsoft.com/office/officeart/2005/8/colors/accent0_3">
   <dgm:title val=""/>
   <dgm:desc val=""/>
   <dgm:catLst>
-    <dgm:cat type="colorful" pri="10100"/>
+    <dgm:cat type="mainScheme" pri="10300"/>
   </dgm:catLst>
   <dgm:styleLbl name="node0">
     <dgm:fillClrLst meth="repeat">
-      <a:schemeClr val="accent1"/>
+      <a:schemeClr val="dk2"/>
     </dgm:fillClrLst>
     <dgm:linClrLst meth="repeat">
-      <a:schemeClr val="lt1"/>
+      <a:schemeClr val="lt2"/>
+    </dgm:linClrLst>
+    <dgm:effectClrLst/>
+    <dgm:txLinClrLst/>
+    <dgm:txFillClrLst/>
+    <dgm:txEffectClrLst/>
+  </dgm:styleLbl>
+  <dgm:styleLbl name="alignNode1">
+    <dgm:fillClrLst meth="repeat">
+      <a:schemeClr val="dk2"/>
+    </dgm:fillClrLst>
+    <dgm:linClrLst meth="repeat">
+      <a:schemeClr val="dk2"/>
     </dgm:linClrLst>
     <dgm:effectClrLst/>
     <dgm:txLinClrLst/>
@@ -974,34 +986,10 @@
   </dgm:styleLbl>
   <dgm:styleLbl name="node1">
     <dgm:fillClrLst meth="repeat">
-      <a:schemeClr val="accent2"/>
-      <a:schemeClr val="accent3"/>
-      <a:schemeClr val="accent4"/>
-      <a:schemeClr val="accent5"/>
-      <a:schemeClr val="accent6"/>
+      <a:schemeClr val="dk2"/>
     </dgm:fillClrLst>
     <dgm:linClrLst meth="repeat">
-      <a:schemeClr val="lt1"/>
-    </dgm:linClrLst>
-    <dgm:effectClrLst/>
-    <dgm:txLinClrLst/>
-    <dgm:txFillClrLst/>
-    <dgm:txEffectClrLst/>
-  </dgm:styleLbl>
-  <dgm:styleLbl name="alignNode1">
-    <dgm:fillClrLst meth="repeat">
-      <a:schemeClr val="accent2"/>
-      <a:schemeClr val="accent3"/>
-      <a:schemeClr val="accent4"/>
-      <a:schemeClr val="accent5"/>
-      <a:schemeClr val="accent6"/>
-    </dgm:fillClrLst>
-    <dgm:linClrLst meth="repeat">
-      <a:schemeClr val="accent2"/>
-      <a:schemeClr val="accent3"/>
-      <a:schemeClr val="accent4"/>
-      <a:schemeClr val="accent5"/>
-      <a:schemeClr val="accent6"/>
+      <a:schemeClr val="lt2"/>
     </dgm:linClrLst>
     <dgm:effectClrLst/>
     <dgm:txLinClrLst/>
@@ -1010,14 +998,10 @@
   </dgm:styleLbl>
   <dgm:styleLbl name="lnNode1">
     <dgm:fillClrLst meth="repeat">
-      <a:schemeClr val="accent2"/>
-      <a:schemeClr val="accent3"/>
-      <a:schemeClr val="accent4"/>
-      <a:schemeClr val="accent5"/>
-      <a:schemeClr val="accent6"/>
+      <a:schemeClr val="dk2"/>
     </dgm:fillClrLst>
     <dgm:linClrLst meth="repeat">
-      <a:schemeClr val="lt1"/>
+      <a:schemeClr val="lt2"/>
     </dgm:linClrLst>
     <dgm:effectClrLst/>
     <dgm:txLinClrLst/>
@@ -1026,24 +1010,12 @@
   </dgm:styleLbl>
   <dgm:styleLbl name="vennNode1">
     <dgm:fillClrLst meth="repeat">
-      <a:schemeClr val="accent2">
-        <a:alpha val="50000"/>
-      </a:schemeClr>
-      <a:schemeClr val="accent3">
-        <a:alpha val="50000"/>
-      </a:schemeClr>
-      <a:schemeClr val="accent4">
-        <a:alpha val="50000"/>
-      </a:schemeClr>
-      <a:schemeClr val="accent5">
-        <a:alpha val="50000"/>
-      </a:schemeClr>
-      <a:schemeClr val="accent6">
+      <a:schemeClr val="dk2">
         <a:alpha val="50000"/>
       </a:schemeClr>
     </dgm:fillClrLst>
     <dgm:linClrLst meth="repeat">
-      <a:schemeClr val="lt1"/>
+      <a:schemeClr val="lt2"/>
     </dgm:linClrLst>
     <dgm:effectClrLst/>
     <dgm:txLinClrLst/>
@@ -1051,11 +1023,11 @@
     <dgm:txEffectClrLst/>
   </dgm:styleLbl>
   <dgm:styleLbl name="node2">
-    <dgm:fillClrLst>
-      <a:schemeClr val="accent2"/>
+    <dgm:fillClrLst meth="repeat">
+      <a:schemeClr val="dk2"/>
     </dgm:fillClrLst>
     <dgm:linClrLst meth="repeat">
-      <a:schemeClr val="lt1"/>
+      <a:schemeClr val="lt2"/>
     </dgm:linClrLst>
     <dgm:effectClrLst/>
     <dgm:txLinClrLst/>
@@ -1063,11 +1035,11 @@
     <dgm:txEffectClrLst/>
   </dgm:styleLbl>
   <dgm:styleLbl name="node3">
-    <dgm:fillClrLst>
-      <a:schemeClr val="accent3"/>
+    <dgm:fillClrLst meth="repeat">
+      <a:schemeClr val="dk2"/>
     </dgm:fillClrLst>
     <dgm:linClrLst meth="repeat">
-      <a:schemeClr val="lt1"/>
+      <a:schemeClr val="lt2"/>
     </dgm:linClrLst>
     <dgm:effectClrLst/>
     <dgm:txLinClrLst/>
@@ -1075,11 +1047,11 @@
     <dgm:txEffectClrLst/>
   </dgm:styleLbl>
   <dgm:styleLbl name="node4">
-    <dgm:fillClrLst>
-      <a:schemeClr val="accent4"/>
+    <dgm:fillClrLst meth="repeat">
+      <a:schemeClr val="dk2"/>
     </dgm:fillClrLst>
     <dgm:linClrLst meth="repeat">
-      <a:schemeClr val="lt1"/>
+      <a:schemeClr val="lt2"/>
     </dgm:linClrLst>
     <dgm:effectClrLst/>
     <dgm:txLinClrLst/>
@@ -1088,80 +1060,66 @@
   </dgm:styleLbl>
   <dgm:styleLbl name="fgImgPlace1">
     <dgm:fillClrLst meth="repeat">
-      <a:schemeClr val="accent2">
-        <a:tint val="50000"/>
-      </a:schemeClr>
-      <a:schemeClr val="accent3">
-        <a:tint val="50000"/>
-      </a:schemeClr>
-      <a:schemeClr val="accent4">
-        <a:tint val="50000"/>
-      </a:schemeClr>
-      <a:schemeClr val="accent5">
-        <a:tint val="50000"/>
-      </a:schemeClr>
-      <a:schemeClr val="accent6">
+      <a:schemeClr val="dk2">
         <a:tint val="50000"/>
       </a:schemeClr>
     </dgm:fillClrLst>
     <dgm:linClrLst meth="repeat">
-      <a:schemeClr val="lt1"/>
+      <a:schemeClr val="lt2"/>
     </dgm:linClrLst>
     <dgm:effectClrLst/>
     <dgm:txLinClrLst/>
     <dgm:txFillClrLst meth="repeat">
-      <a:schemeClr val="lt1"/>
+      <a:schemeClr val="lt2"/>
     </dgm:txFillClrLst>
     <dgm:txEffectClrLst/>
   </dgm:styleLbl>
   <dgm:styleLbl name="alignImgPlace1">
-    <dgm:fillClrLst>
-      <a:schemeClr val="accent1">
+    <dgm:fillClrLst meth="repeat">
+      <a:schemeClr val="dk2">
         <a:tint val="50000"/>
-      </a:schemeClr>
-      <a:schemeClr val="accent2">
-        <a:tint val="20000"/>
       </a:schemeClr>
     </dgm:fillClrLst>
     <dgm:linClrLst meth="repeat">
-      <a:schemeClr val="lt1"/>
+      <a:schemeClr val="dk2">
+        <a:shade val="80000"/>
+      </a:schemeClr>
     </dgm:linClrLst>
     <dgm:effectClrLst/>
     <dgm:txLinClrLst/>
     <dgm:txFillClrLst meth="repeat">
-      <a:schemeClr val="lt1"/>
+      <a:schemeClr val="lt2"/>
     </dgm:txFillClrLst>
     <dgm:txEffectClrLst/>
   </dgm:styleLbl>
   <dgm:styleLbl name="bgImgPlace1">
-    <dgm:fillClrLst>
-      <a:schemeClr val="accent1">
+    <dgm:fillClrLst meth="repeat">
+      <a:schemeClr val="dk2">
         <a:tint val="50000"/>
-      </a:schemeClr>
-      <a:schemeClr val="accent2">
-        <a:tint val="20000"/>
       </a:schemeClr>
     </dgm:fillClrLst>
     <dgm:linClrLst meth="repeat">
-      <a:schemeClr val="lt1"/>
+      <a:schemeClr val="dk2">
+        <a:shade val="80000"/>
+      </a:schemeClr>
     </dgm:linClrLst>
     <dgm:effectClrLst/>
     <dgm:txLinClrLst/>
     <dgm:txFillClrLst meth="repeat">
-      <a:schemeClr val="lt1"/>
+      <a:schemeClr val="lt2"/>
     </dgm:txFillClrLst>
     <dgm:txEffectClrLst/>
   </dgm:styleLbl>
   <dgm:styleLbl name="sibTrans2D1">
     <dgm:fillClrLst meth="repeat">
-      <a:schemeClr val="accent2"/>
-      <a:schemeClr val="accent3"/>
-      <a:schemeClr val="accent4"/>
-      <a:schemeClr val="accent5"/>
-      <a:schemeClr val="accent6"/>
+      <a:schemeClr val="dk2">
+        <a:tint val="60000"/>
+      </a:schemeClr>
     </dgm:fillClrLst>
-    <dgm:linClrLst meth="cycle">
-      <a:schemeClr val="lt1"/>
+    <dgm:linClrLst meth="repeat">
+      <a:schemeClr val="dk2">
+        <a:tint val="60000"/>
+      </a:schemeClr>
     </dgm:linClrLst>
     <dgm:effectClrLst/>
     <dgm:txLinClrLst/>
@@ -1170,84 +1128,72 @@
   </dgm:styleLbl>
   <dgm:styleLbl name="fgSibTrans2D1">
     <dgm:fillClrLst meth="repeat">
-      <a:schemeClr val="accent2"/>
-      <a:schemeClr val="accent3"/>
-      <a:schemeClr val="accent4"/>
-      <a:schemeClr val="accent5"/>
-      <a:schemeClr val="accent6"/>
+      <a:schemeClr val="dk2">
+        <a:tint val="60000"/>
+      </a:schemeClr>
     </dgm:fillClrLst>
-    <dgm:linClrLst meth="cycle">
-      <a:schemeClr val="lt1"/>
+    <dgm:linClrLst meth="repeat">
+      <a:schemeClr val="dk2">
+        <a:tint val="60000"/>
+      </a:schemeClr>
+    </dgm:linClrLst>
+    <dgm:effectClrLst/>
+    <dgm:txLinClrLst/>
+    <dgm:txFillClrLst/>
+    <dgm:txEffectClrLst/>
+  </dgm:styleLbl>
+  <dgm:styleLbl name="bgSibTrans2D1">
+    <dgm:fillClrLst meth="repeat">
+      <a:schemeClr val="dk2">
+        <a:tint val="60000"/>
+      </a:schemeClr>
+    </dgm:fillClrLst>
+    <dgm:linClrLst meth="repeat">
+      <a:schemeClr val="dk2">
+        <a:tint val="60000"/>
+      </a:schemeClr>
+    </dgm:linClrLst>
+    <dgm:effectClrLst/>
+    <dgm:txLinClrLst/>
+    <dgm:txFillClrLst/>
+    <dgm:txEffectClrLst/>
+  </dgm:styleLbl>
+  <dgm:styleLbl name="sibTrans1D1">
+    <dgm:fillClrLst meth="repeat">
+      <a:schemeClr val="dk2"/>
+    </dgm:fillClrLst>
+    <dgm:linClrLst meth="repeat">
+      <a:schemeClr val="dk2"/>
     </dgm:linClrLst>
     <dgm:effectClrLst/>
     <dgm:txLinClrLst/>
     <dgm:txFillClrLst meth="repeat">
-      <a:schemeClr val="lt1"/>
-    </dgm:txFillClrLst>
-    <dgm:txEffectClrLst/>
-  </dgm:styleLbl>
-  <dgm:styleLbl name="bgSibTrans2D1">
-    <dgm:fillClrLst meth="repeat">
-      <a:schemeClr val="accent2"/>
-      <a:schemeClr val="accent3"/>
-      <a:schemeClr val="accent4"/>
-      <a:schemeClr val="accent5"/>
-      <a:schemeClr val="accent6"/>
-    </dgm:fillClrLst>
-    <dgm:linClrLst meth="cycle">
-      <a:schemeClr val="lt1"/>
-    </dgm:linClrLst>
-    <dgm:effectClrLst/>
-    <dgm:txLinClrLst/>
-    <dgm:txFillClrLst meth="repeat">
-      <a:schemeClr val="lt1"/>
-    </dgm:txFillClrLst>
-    <dgm:txEffectClrLst/>
-  </dgm:styleLbl>
-  <dgm:styleLbl name="sibTrans1D1">
-    <dgm:fillClrLst meth="repeat">
-      <a:schemeClr val="accent2"/>
-      <a:schemeClr val="accent3"/>
-      <a:schemeClr val="accent4"/>
-      <a:schemeClr val="accent5"/>
-      <a:schemeClr val="accent6"/>
-    </dgm:fillClrLst>
-    <dgm:linClrLst meth="repeat">
-      <a:schemeClr val="accent2"/>
-      <a:schemeClr val="accent3"/>
-      <a:schemeClr val="accent4"/>
-      <a:schemeClr val="accent5"/>
-      <a:schemeClr val="accent6"/>
-    </dgm:linClrLst>
-    <dgm:effectClrLst/>
-    <dgm:txLinClrLst/>
-    <dgm:txFillClrLst meth="repeat">
-      <a:schemeClr val="tx1"/>
+      <a:schemeClr val="lt2"/>
     </dgm:txFillClrLst>
     <dgm:txEffectClrLst/>
   </dgm:styleLbl>
   <dgm:styleLbl name="callout">
     <dgm:fillClrLst meth="repeat">
-      <a:schemeClr val="accent2"/>
+      <a:schemeClr val="dk2"/>
     </dgm:fillClrLst>
     <dgm:linClrLst meth="repeat">
-      <a:schemeClr val="accent2">
+      <a:schemeClr val="dk2">
         <a:tint val="50000"/>
       </a:schemeClr>
     </dgm:linClrLst>
     <dgm:effectClrLst/>
     <dgm:txLinClrLst/>
     <dgm:txFillClrLst meth="repeat">
-      <a:schemeClr val="tx1"/>
+      <a:schemeClr val="lt2"/>
     </dgm:txFillClrLst>
     <dgm:txEffectClrLst/>
   </dgm:styleLbl>
   <dgm:styleLbl name="asst0">
     <dgm:fillClrLst meth="repeat">
-      <a:schemeClr val="accent1"/>
+      <a:schemeClr val="dk2"/>
     </dgm:fillClrLst>
     <dgm:linClrLst meth="repeat">
-      <a:schemeClr val="lt1"/>
+      <a:schemeClr val="lt2"/>
     </dgm:linClrLst>
     <dgm:effectClrLst/>
     <dgm:txLinClrLst/>
@@ -1256,10 +1202,10 @@
   </dgm:styleLbl>
   <dgm:styleLbl name="asst1">
     <dgm:fillClrLst meth="repeat">
-      <a:schemeClr val="accent2"/>
+      <a:schemeClr val="dk2"/>
     </dgm:fillClrLst>
     <dgm:linClrLst meth="repeat">
-      <a:schemeClr val="lt1"/>
+      <a:schemeClr val="lt2"/>
     </dgm:linClrLst>
     <dgm:effectClrLst/>
     <dgm:txLinClrLst/>
@@ -1267,11 +1213,11 @@
     <dgm:txEffectClrLst/>
   </dgm:styleLbl>
   <dgm:styleLbl name="asst2">
-    <dgm:fillClrLst>
-      <a:schemeClr val="accent3"/>
+    <dgm:fillClrLst meth="repeat">
+      <a:schemeClr val="dk2"/>
     </dgm:fillClrLst>
     <dgm:linClrLst meth="repeat">
-      <a:schemeClr val="lt1"/>
+      <a:schemeClr val="lt2"/>
     </dgm:linClrLst>
     <dgm:effectClrLst/>
     <dgm:txLinClrLst/>
@@ -1279,11 +1225,11 @@
     <dgm:txEffectClrLst/>
   </dgm:styleLbl>
   <dgm:styleLbl name="asst3">
-    <dgm:fillClrLst>
-      <a:schemeClr val="accent4"/>
+    <dgm:fillClrLst meth="repeat">
+      <a:schemeClr val="dk2"/>
     </dgm:fillClrLst>
     <dgm:linClrLst meth="repeat">
-      <a:schemeClr val="lt1"/>
+      <a:schemeClr val="lt2"/>
     </dgm:linClrLst>
     <dgm:effectClrLst/>
     <dgm:txLinClrLst/>
@@ -1291,11 +1237,11 @@
     <dgm:txEffectClrLst/>
   </dgm:styleLbl>
   <dgm:styleLbl name="asst4">
-    <dgm:fillClrLst>
-      <a:schemeClr val="accent5"/>
+    <dgm:fillClrLst meth="repeat">
+      <a:schemeClr val="dk2"/>
     </dgm:fillClrLst>
     <dgm:linClrLst meth="repeat">
-      <a:schemeClr val="lt1"/>
+      <a:schemeClr val="lt2"/>
     </dgm:linClrLst>
     <dgm:effectClrLst/>
     <dgm:txLinClrLst/>
@@ -1304,62 +1250,72 @@
   </dgm:styleLbl>
   <dgm:styleLbl name="parChTrans2D1">
     <dgm:fillClrLst meth="repeat">
-      <a:schemeClr val="accent2"/>
+      <a:schemeClr val="dk2">
+        <a:tint val="60000"/>
+      </a:schemeClr>
     </dgm:fillClrLst>
     <dgm:linClrLst meth="repeat">
-      <a:schemeClr val="lt1"/>
+      <a:schemeClr val="dk2">
+        <a:tint val="60000"/>
+      </a:schemeClr>
     </dgm:linClrLst>
     <dgm:effectClrLst/>
     <dgm:txLinClrLst/>
     <dgm:txFillClrLst meth="repeat">
-      <a:schemeClr val="lt1"/>
+      <a:schemeClr val="lt2"/>
     </dgm:txFillClrLst>
     <dgm:txEffectClrLst/>
   </dgm:styleLbl>
   <dgm:styleLbl name="parChTrans2D2">
     <dgm:fillClrLst meth="repeat">
-      <a:schemeClr val="accent3"/>
+      <a:schemeClr val="dk2"/>
     </dgm:fillClrLst>
     <dgm:linClrLst meth="repeat">
-      <a:schemeClr val="lt1"/>
+      <a:schemeClr val="dk2"/>
     </dgm:linClrLst>
     <dgm:effectClrLst/>
     <dgm:txLinClrLst/>
-    <dgm:txFillClrLst/>
+    <dgm:txFillClrLst meth="repeat">
+      <a:schemeClr val="lt2"/>
+    </dgm:txFillClrLst>
     <dgm:txEffectClrLst/>
   </dgm:styleLbl>
   <dgm:styleLbl name="parChTrans2D3">
     <dgm:fillClrLst meth="repeat">
-      <a:schemeClr val="accent4"/>
+      <a:schemeClr val="dk2"/>
     </dgm:fillClrLst>
     <dgm:linClrLst meth="repeat">
-      <a:schemeClr val="lt1"/>
+      <a:schemeClr val="dk2"/>
     </dgm:linClrLst>
     <dgm:effectClrLst/>
     <dgm:txLinClrLst/>
-    <dgm:txFillClrLst/>
+    <dgm:txFillClrLst meth="repeat">
+      <a:schemeClr val="lt2"/>
+    </dgm:txFillClrLst>
     <dgm:txEffectClrLst/>
   </dgm:styleLbl>
   <dgm:styleLbl name="parChTrans2D4">
     <dgm:fillClrLst meth="repeat">
-      <a:schemeClr val="accent5"/>
+      <a:schemeClr val="dk2"/>
     </dgm:fillClrLst>
     <dgm:linClrLst meth="repeat">
-      <a:schemeClr val="lt1"/>
+      <a:schemeClr val="dk2"/>
     </dgm:linClrLst>
     <dgm:effectClrLst/>
     <dgm:txLinClrLst/>
     <dgm:txFillClrLst meth="repeat">
-      <a:schemeClr val="lt1"/>
+      <a:schemeClr val="lt2"/>
     </dgm:txFillClrLst>
     <dgm:txEffectClrLst/>
   </dgm:styleLbl>
   <dgm:styleLbl name="parChTrans1D1">
     <dgm:fillClrLst meth="repeat">
-      <a:schemeClr val="accent2"/>
+      <a:schemeClr val="dk2"/>
     </dgm:fillClrLst>
     <dgm:linClrLst meth="repeat">
-      <a:schemeClr val="accent1"/>
+      <a:schemeClr val="dk2">
+        <a:shade val="60000"/>
+      </a:schemeClr>
     </dgm:linClrLst>
     <dgm:effectClrLst/>
     <dgm:txLinClrLst/>
@@ -1370,12 +1326,12 @@
   </dgm:styleLbl>
   <dgm:styleLbl name="parChTrans1D2">
     <dgm:fillClrLst meth="repeat">
-      <a:schemeClr val="accent3">
-        <a:tint val="90000"/>
-      </a:schemeClr>
+      <a:schemeClr val="dk2"/>
     </dgm:fillClrLst>
     <dgm:linClrLst meth="repeat">
-      <a:schemeClr val="accent2"/>
+      <a:schemeClr val="dk2">
+        <a:shade val="60000"/>
+      </a:schemeClr>
     </dgm:linClrLst>
     <dgm:effectClrLst/>
     <dgm:txLinClrLst/>
@@ -1386,12 +1342,12 @@
   </dgm:styleLbl>
   <dgm:styleLbl name="parChTrans1D3">
     <dgm:fillClrLst meth="repeat">
-      <a:schemeClr val="accent4">
-        <a:tint val="70000"/>
-      </a:schemeClr>
+      <a:schemeClr val="dk2"/>
     </dgm:fillClrLst>
     <dgm:linClrLst meth="repeat">
-      <a:schemeClr val="accent3"/>
+      <a:schemeClr val="dk2">
+        <a:shade val="80000"/>
+      </a:schemeClr>
     </dgm:linClrLst>
     <dgm:effectClrLst/>
     <dgm:txLinClrLst/>
@@ -1402,12 +1358,12 @@
   </dgm:styleLbl>
   <dgm:styleLbl name="parChTrans1D4">
     <dgm:fillClrLst meth="repeat">
-      <a:schemeClr val="accent5">
-        <a:tint val="50000"/>
-      </a:schemeClr>
+      <a:schemeClr val="dk2"/>
     </dgm:fillClrLst>
     <dgm:linClrLst meth="repeat">
-      <a:schemeClr val="accent4"/>
+      <a:schemeClr val="dk2">
+        <a:shade val="80000"/>
+      </a:schemeClr>
     </dgm:linClrLst>
     <dgm:effectClrLst/>
     <dgm:txLinClrLst/>
@@ -1418,16 +1374,12 @@
   </dgm:styleLbl>
   <dgm:styleLbl name="fgAcc1">
     <dgm:fillClrLst meth="repeat">
-      <a:schemeClr val="lt1">
+      <a:schemeClr val="lt2">
         <a:alpha val="90000"/>
       </a:schemeClr>
     </dgm:fillClrLst>
     <dgm:linClrLst meth="repeat">
-      <a:schemeClr val="accent2"/>
-      <a:schemeClr val="accent3"/>
-      <a:schemeClr val="accent4"/>
-      <a:schemeClr val="accent5"/>
-      <a:schemeClr val="accent6"/>
+      <a:schemeClr val="dk2"/>
     </dgm:linClrLst>
     <dgm:effectClrLst/>
     <dgm:txLinClrLst/>
@@ -1438,16 +1390,12 @@
   </dgm:styleLbl>
   <dgm:styleLbl name="conFgAcc1">
     <dgm:fillClrLst meth="repeat">
-      <a:schemeClr val="lt1">
+      <a:schemeClr val="lt2">
         <a:alpha val="90000"/>
       </a:schemeClr>
     </dgm:fillClrLst>
     <dgm:linClrLst meth="repeat">
-      <a:schemeClr val="accent2"/>
-      <a:schemeClr val="accent3"/>
-      <a:schemeClr val="accent4"/>
-      <a:schemeClr val="accent5"/>
-      <a:schemeClr val="accent6"/>
+      <a:schemeClr val="dk2"/>
     </dgm:linClrLst>
     <dgm:effectClrLst/>
     <dgm:txLinClrLst/>
@@ -1458,16 +1406,12 @@
   </dgm:styleLbl>
   <dgm:styleLbl name="alignAcc1">
     <dgm:fillClrLst meth="repeat">
-      <a:schemeClr val="lt1">
+      <a:schemeClr val="lt2">
         <a:alpha val="90000"/>
       </a:schemeClr>
     </dgm:fillClrLst>
     <dgm:linClrLst meth="repeat">
-      <a:schemeClr val="accent2"/>
-      <a:schemeClr val="accent3"/>
-      <a:schemeClr val="accent4"/>
-      <a:schemeClr val="accent5"/>
-      <a:schemeClr val="accent6"/>
+      <a:schemeClr val="dk2"/>
     </dgm:linClrLst>
     <dgm:effectClrLst/>
     <dgm:txLinClrLst/>
@@ -1478,12 +1422,12 @@
   </dgm:styleLbl>
   <dgm:styleLbl name="trAlignAcc1">
     <dgm:fillClrLst meth="repeat">
-      <a:schemeClr val="lt1">
+      <a:schemeClr val="lt2">
         <a:alpha val="40000"/>
       </a:schemeClr>
     </dgm:fillClrLst>
     <dgm:linClrLst meth="repeat">
-      <a:schemeClr val="accent1"/>
+      <a:schemeClr val="dk2"/>
     </dgm:linClrLst>
     <dgm:effectClrLst/>
     <dgm:txLinClrLst/>
@@ -1494,16 +1438,12 @@
   </dgm:styleLbl>
   <dgm:styleLbl name="bgAcc1">
     <dgm:fillClrLst meth="repeat">
-      <a:schemeClr val="lt1">
+      <a:schemeClr val="lt2">
         <a:alpha val="90000"/>
       </a:schemeClr>
     </dgm:fillClrLst>
     <dgm:linClrLst meth="repeat">
-      <a:schemeClr val="accent2"/>
-      <a:schemeClr val="accent3"/>
-      <a:schemeClr val="accent4"/>
-      <a:schemeClr val="accent5"/>
-      <a:schemeClr val="accent6"/>
+      <a:schemeClr val="dk2"/>
     </dgm:linClrLst>
     <dgm:effectClrLst/>
     <dgm:txLinClrLst/>
@@ -1514,14 +1454,10 @@
   </dgm:styleLbl>
   <dgm:styleLbl name="solidFgAcc1">
     <dgm:fillClrLst meth="repeat">
-      <a:schemeClr val="lt1"/>
+      <a:schemeClr val="lt2"/>
     </dgm:fillClrLst>
     <dgm:linClrLst meth="repeat">
-      <a:schemeClr val="accent2"/>
-      <a:schemeClr val="accent3"/>
-      <a:schemeClr val="accent4"/>
-      <a:schemeClr val="accent5"/>
-      <a:schemeClr val="accent6"/>
+      <a:schemeClr val="dk2"/>
     </dgm:linClrLst>
     <dgm:effectClrLst/>
     <dgm:txLinClrLst/>
@@ -1532,14 +1468,10 @@
   </dgm:styleLbl>
   <dgm:styleLbl name="solidAlignAcc1">
     <dgm:fillClrLst meth="repeat">
-      <a:schemeClr val="lt1"/>
+      <a:schemeClr val="lt2"/>
     </dgm:fillClrLst>
     <dgm:linClrLst meth="repeat">
-      <a:schemeClr val="accent2"/>
-      <a:schemeClr val="accent3"/>
-      <a:schemeClr val="accent4"/>
-      <a:schemeClr val="accent5"/>
-      <a:schemeClr val="accent6"/>
+      <a:schemeClr val="dk2"/>
     </dgm:linClrLst>
     <dgm:effectClrLst/>
     <dgm:txLinClrLst/>
@@ -1550,14 +1482,10 @@
   </dgm:styleLbl>
   <dgm:styleLbl name="solidBgAcc1">
     <dgm:fillClrLst meth="repeat">
-      <a:schemeClr val="lt1"/>
+      <a:schemeClr val="lt2"/>
     </dgm:fillClrLst>
     <dgm:linClrLst meth="repeat">
-      <a:schemeClr val="accent2"/>
-      <a:schemeClr val="accent3"/>
-      <a:schemeClr val="accent4"/>
-      <a:schemeClr val="accent5"/>
-      <a:schemeClr val="accent6"/>
+      <a:schemeClr val="dk2"/>
     </dgm:linClrLst>
     <dgm:effectClrLst/>
     <dgm:txLinClrLst/>
@@ -1568,47 +1496,15 @@
   </dgm:styleLbl>
   <dgm:styleLbl name="fgAccFollowNode1">
     <dgm:fillClrLst meth="repeat">
-      <a:schemeClr val="accent2">
+      <a:schemeClr val="dk2">
+        <a:alpha val="90000"/>
         <a:tint val="40000"/>
-        <a:alpha val="90000"/>
-      </a:schemeClr>
-      <a:schemeClr val="accent3">
-        <a:tint val="40000"/>
-        <a:alpha val="90000"/>
-      </a:schemeClr>
-      <a:schemeClr val="accent4">
-        <a:tint val="40000"/>
-        <a:alpha val="90000"/>
-      </a:schemeClr>
-      <a:schemeClr val="accent5">
-        <a:tint val="40000"/>
-        <a:alpha val="90000"/>
-      </a:schemeClr>
-      <a:schemeClr val="accent6">
-        <a:tint val="40000"/>
-        <a:alpha val="90000"/>
       </a:schemeClr>
     </dgm:fillClrLst>
     <dgm:linClrLst meth="repeat">
-      <a:schemeClr val="accent2">
+      <a:schemeClr val="dk2">
+        <a:alpha val="90000"/>
         <a:tint val="40000"/>
-        <a:alpha val="90000"/>
-      </a:schemeClr>
-      <a:schemeClr val="accent3">
-        <a:tint val="40000"/>
-        <a:alpha val="90000"/>
-      </a:schemeClr>
-      <a:schemeClr val="accent4">
-        <a:tint val="40000"/>
-        <a:alpha val="90000"/>
-      </a:schemeClr>
-      <a:schemeClr val="accent5">
-        <a:tint val="40000"/>
-        <a:alpha val="90000"/>
-      </a:schemeClr>
-      <a:schemeClr val="accent6">
-        <a:tint val="40000"/>
-        <a:alpha val="90000"/>
       </a:schemeClr>
     </dgm:linClrLst>
     <dgm:effectClrLst/>
@@ -1620,47 +1516,15 @@
   </dgm:styleLbl>
   <dgm:styleLbl name="alignAccFollowNode1">
     <dgm:fillClrLst meth="repeat">
-      <a:schemeClr val="accent2">
+      <a:schemeClr val="dk2">
+        <a:alpha val="90000"/>
         <a:tint val="40000"/>
-        <a:alpha val="90000"/>
-      </a:schemeClr>
-      <a:schemeClr val="accent3">
-        <a:tint val="40000"/>
-        <a:alpha val="90000"/>
-      </a:schemeClr>
-      <a:schemeClr val="accent4">
-        <a:tint val="40000"/>
-        <a:alpha val="90000"/>
-      </a:schemeClr>
-      <a:schemeClr val="accent5">
-        <a:tint val="40000"/>
-        <a:alpha val="90000"/>
-      </a:schemeClr>
-      <a:schemeClr val="accent6">
-        <a:tint val="40000"/>
-        <a:alpha val="90000"/>
       </a:schemeClr>
     </dgm:fillClrLst>
     <dgm:linClrLst meth="repeat">
-      <a:schemeClr val="accent2">
+      <a:schemeClr val="dk2">
+        <a:alpha val="90000"/>
         <a:tint val="40000"/>
-        <a:alpha val="90000"/>
-      </a:schemeClr>
-      <a:schemeClr val="accent3">
-        <a:tint val="40000"/>
-        <a:alpha val="90000"/>
-      </a:schemeClr>
-      <a:schemeClr val="accent4">
-        <a:tint val="40000"/>
-        <a:alpha val="90000"/>
-      </a:schemeClr>
-      <a:schemeClr val="accent5">
-        <a:tint val="40000"/>
-        <a:alpha val="90000"/>
-      </a:schemeClr>
-      <a:schemeClr val="accent6">
-        <a:tint val="40000"/>
-        <a:alpha val="90000"/>
       </a:schemeClr>
     </dgm:linClrLst>
     <dgm:effectClrLst/>
@@ -1672,47 +1536,15 @@
   </dgm:styleLbl>
   <dgm:styleLbl name="bgAccFollowNode1">
     <dgm:fillClrLst meth="repeat">
-      <a:schemeClr val="accent2">
+      <a:schemeClr val="dk2">
+        <a:alpha val="90000"/>
         <a:tint val="40000"/>
-        <a:alpha val="90000"/>
-      </a:schemeClr>
-      <a:schemeClr val="accent3">
-        <a:tint val="40000"/>
-        <a:alpha val="90000"/>
-      </a:schemeClr>
-      <a:schemeClr val="accent4">
-        <a:tint val="40000"/>
-        <a:alpha val="90000"/>
-      </a:schemeClr>
-      <a:schemeClr val="accent5">
-        <a:tint val="40000"/>
-        <a:alpha val="90000"/>
-      </a:schemeClr>
-      <a:schemeClr val="accent6">
-        <a:tint val="40000"/>
-        <a:alpha val="90000"/>
       </a:schemeClr>
     </dgm:fillClrLst>
     <dgm:linClrLst meth="repeat">
-      <a:schemeClr val="accent2">
+      <a:schemeClr val="dk2">
+        <a:alpha val="90000"/>
         <a:tint val="40000"/>
-        <a:alpha val="90000"/>
-      </a:schemeClr>
-      <a:schemeClr val="accent3">
-        <a:tint val="40000"/>
-        <a:alpha val="90000"/>
-      </a:schemeClr>
-      <a:schemeClr val="accent4">
-        <a:tint val="40000"/>
-        <a:alpha val="90000"/>
-      </a:schemeClr>
-      <a:schemeClr val="accent5">
-        <a:tint val="40000"/>
-        <a:alpha val="90000"/>
-      </a:schemeClr>
-      <a:schemeClr val="accent6">
-        <a:tint val="40000"/>
-        <a:alpha val="90000"/>
       </a:schemeClr>
     </dgm:linClrLst>
     <dgm:effectClrLst/>
@@ -1724,12 +1556,12 @@
   </dgm:styleLbl>
   <dgm:styleLbl name="fgAcc0">
     <dgm:fillClrLst meth="repeat">
-      <a:schemeClr val="lt1">
+      <a:schemeClr val="lt2">
         <a:alpha val="90000"/>
       </a:schemeClr>
     </dgm:fillClrLst>
-    <dgm:linClrLst>
-      <a:schemeClr val="accent1"/>
+    <dgm:linClrLst meth="repeat">
+      <a:schemeClr val="dk2"/>
     </dgm:linClrLst>
     <dgm:effectClrLst/>
     <dgm:txLinClrLst/>
@@ -1740,12 +1572,12 @@
   </dgm:styleLbl>
   <dgm:styleLbl name="fgAcc2">
     <dgm:fillClrLst meth="repeat">
-      <a:schemeClr val="lt1">
+      <a:schemeClr val="lt2">
         <a:alpha val="90000"/>
       </a:schemeClr>
     </dgm:fillClrLst>
-    <dgm:linClrLst>
-      <a:schemeClr val="accent2"/>
+    <dgm:linClrLst meth="repeat">
+      <a:schemeClr val="dk2"/>
     </dgm:linClrLst>
     <dgm:effectClrLst/>
     <dgm:txLinClrLst/>
@@ -1756,12 +1588,12 @@
   </dgm:styleLbl>
   <dgm:styleLbl name="fgAcc3">
     <dgm:fillClrLst meth="repeat">
-      <a:schemeClr val="lt1">
+      <a:schemeClr val="lt2">
         <a:alpha val="90000"/>
       </a:schemeClr>
     </dgm:fillClrLst>
-    <dgm:linClrLst>
-      <a:schemeClr val="accent3"/>
+    <dgm:linClrLst meth="repeat">
+      <a:schemeClr val="dk2"/>
     </dgm:linClrLst>
     <dgm:effectClrLst/>
     <dgm:txLinClrLst/>
@@ -1772,12 +1604,12 @@
   </dgm:styleLbl>
   <dgm:styleLbl name="fgAcc4">
     <dgm:fillClrLst meth="repeat">
-      <a:schemeClr val="lt1">
+      <a:schemeClr val="lt2">
         <a:alpha val="90000"/>
       </a:schemeClr>
     </dgm:fillClrLst>
-    <dgm:linClrLst>
-      <a:schemeClr val="accent4"/>
+    <dgm:linClrLst meth="repeat">
+      <a:schemeClr val="dk2"/>
     </dgm:linClrLst>
     <dgm:effectClrLst/>
     <dgm:txLinClrLst/>
@@ -1788,12 +1620,12 @@
   </dgm:styleLbl>
   <dgm:styleLbl name="bgShp">
     <dgm:fillClrLst meth="repeat">
-      <a:schemeClr val="accent2">
+      <a:schemeClr val="dk2">
         <a:tint val="40000"/>
       </a:schemeClr>
     </dgm:fillClrLst>
     <dgm:linClrLst meth="repeat">
-      <a:schemeClr val="dk1"/>
+      <a:schemeClr val="dk2"/>
     </dgm:linClrLst>
     <dgm:effectClrLst/>
     <dgm:txLinClrLst/>
@@ -1804,12 +1636,12 @@
   </dgm:styleLbl>
   <dgm:styleLbl name="dkBgShp">
     <dgm:fillClrLst meth="repeat">
-      <a:schemeClr val="accent2">
-        <a:shade val="90000"/>
+      <a:schemeClr val="dk2">
+        <a:shade val="80000"/>
       </a:schemeClr>
     </dgm:fillClrLst>
     <dgm:linClrLst meth="repeat">
-      <a:schemeClr val="dk1"/>
+      <a:schemeClr val="dk2"/>
     </dgm:linClrLst>
     <dgm:effectClrLst/>
     <dgm:txLinClrLst/>
@@ -1820,13 +1652,13 @@
   </dgm:styleLbl>
   <dgm:styleLbl name="trBgShp">
     <dgm:fillClrLst meth="repeat">
-      <a:schemeClr val="accent1">
+      <a:schemeClr val="dk2">
         <a:tint val="50000"/>
         <a:alpha val="40000"/>
       </a:schemeClr>
     </dgm:fillClrLst>
     <dgm:linClrLst meth="repeat">
-      <a:schemeClr val="accent2"/>
+      <a:schemeClr val="dk2"/>
     </dgm:linClrLst>
     <dgm:effectClrLst/>
     <dgm:txLinClrLst/>
@@ -1837,12 +1669,12 @@
   </dgm:styleLbl>
   <dgm:styleLbl name="fgShp">
     <dgm:fillClrLst meth="repeat">
-      <a:schemeClr val="accent2">
-        <a:tint val="40000"/>
+      <a:schemeClr val="dk2">
+        <a:tint val="60000"/>
       </a:schemeClr>
     </dgm:fillClrLst>
     <dgm:linClrLst meth="repeat">
-      <a:schemeClr val="lt1"/>
+      <a:schemeClr val="lt2"/>
     </dgm:linClrLst>
     <dgm:effectClrLst/>
     <dgm:txLinClrLst/>
@@ -1853,7 +1685,7 @@
   </dgm:styleLbl>
   <dgm:styleLbl name="revTx">
     <dgm:fillClrLst meth="repeat">
-      <a:schemeClr val="lt1">
+      <a:schemeClr val="lt2">
         <a:alpha val="0"/>
       </a:schemeClr>
     </dgm:fillClrLst>
@@ -1876,7 +1708,7 @@
 <dgm:dataModel xmlns:dgm="http://schemas.openxmlformats.org/drawingml/2006/diagram" xmlns:a="http://schemas.openxmlformats.org/drawingml/2006/main">
   <dgm:ptLst>
     <dgm:pt modelId="{CD7942A0-B7D2-4B14-8FEA-55FC702F5BE7}" type="doc">
-      <dgm:prSet loTypeId="urn:microsoft.com/office/officeart/2005/8/layout/vProcess5" loCatId="process" qsTypeId="urn:microsoft.com/office/officeart/2005/8/quickstyle/simple4" qsCatId="simple" csTypeId="urn:microsoft.com/office/officeart/2005/8/colors/colorful1" csCatId="colorful" phldr="1"/>
+      <dgm:prSet loTypeId="urn:microsoft.com/office/officeart/2005/8/layout/vProcess5" loCatId="process" qsTypeId="urn:microsoft.com/office/officeart/2005/8/quickstyle/simple1" qsCatId="simple" csTypeId="urn:microsoft.com/office/officeart/2005/8/colors/accent0_3" csCatId="mainScheme" phldr="1"/>
       <dgm:spPr/>
       <dgm:t>
         <a:bodyPr rtlCol="0"/>
@@ -1890,22 +1722,7 @@
     <dgm:pt modelId="{095A5E99-E976-4550-8F80-53CC813F2F5A}">
       <dgm:prSet phldrT="[Text]"/>
       <dgm:spPr>
-        <a:gradFill rotWithShape="0">
-          <a:gsLst>
-            <a:gs pos="0">
-              <a:srgbClr val="703000"/>
-            </a:gs>
-            <a:gs pos="50000">
-              <a:srgbClr val="A44A00"/>
-            </a:gs>
-            <a:gs pos="70000">
-              <a:srgbClr val="BC5500"/>
-            </a:gs>
-            <a:gs pos="100000">
-              <a:srgbClr val="F26D00"/>
-            </a:gs>
-          </a:gsLst>
-        </a:gradFill>
+        <a:noFill/>
       </dgm:spPr>
       <dgm:t>
         <a:bodyPr rtlCol="0"/>
@@ -1952,7 +1769,9 @@
     </dgm:pt>
     <dgm:pt modelId="{8EC937D8-BD76-4A12-A3E5-900D5C1E2E05}">
       <dgm:prSet phldrT="[Text]"/>
-      <dgm:spPr/>
+      <dgm:spPr>
+        <a:noFill/>
+      </dgm:spPr>
       <dgm:t>
         <a:bodyPr rtlCol="0"/>
         <a:lstStyle/>
@@ -1994,30 +1813,7 @@
     <dgm:pt modelId="{7133ECF5-4190-4604-AA2F-03C9A0A9210F}">
       <dgm:prSet phldrT="[Text]"/>
       <dgm:spPr>
-        <a:gradFill rotWithShape="0">
-          <a:gsLst>
-            <a:gs pos="0">
-              <a:srgbClr val="394404"/>
-            </a:gs>
-            <a:gs pos="50000">
-              <a:srgbClr val="5F6F0F"/>
-            </a:gs>
-            <a:gs pos="70000">
-              <a:srgbClr val="65741A"/>
-            </a:gs>
-            <a:gs pos="100000">
-              <a:schemeClr val="accent4">
-                <a:hueOff val="0"/>
-                <a:satOff val="0"/>
-                <a:lumOff val="0"/>
-                <a:alphaOff val="0"/>
-                <a:tint val="100000"/>
-                <a:shade val="100000"/>
-                <a:satMod val="155000"/>
-              </a:schemeClr>
-            </a:gs>
-          </a:gsLst>
-        </a:gradFill>
+        <a:noFill/>
       </dgm:spPr>
       <dgm:t>
         <a:bodyPr rtlCol="0"/>
@@ -2172,6 +1968,9 @@
     <a:ext uri="http://schemas.microsoft.com/office/drawing/2008/diagram">
       <dsp:dataModelExt xmlns:dsp="http://schemas.microsoft.com/office/drawing/2008/diagram" relId="rId7" minVer="http://schemas.openxmlformats.org/drawingml/2006/diagram"/>
     </a:ext>
+    <a:ext uri="{C62137D5-CB1D-491B-B009-E17868A290BF}">
+      <dgm14:recolorImg xmlns:dgm14="http://schemas.microsoft.com/office/drawing/2010/diagram" val="1"/>
+    </a:ext>
   </dgm:extLst>
 </dgm:dataModel>
 </file>
@@ -2199,42 +1998,28 @@
             <a:gd name="adj" fmla="val 10000"/>
           </a:avLst>
         </a:prstGeom>
-        <a:gradFill rotWithShape="0">
-          <a:gsLst>
-            <a:gs pos="0">
-              <a:srgbClr val="703000"/>
-            </a:gs>
-            <a:gs pos="50000">
-              <a:srgbClr val="A44A00"/>
-            </a:gs>
-            <a:gs pos="70000">
-              <a:srgbClr val="BC5500"/>
-            </a:gs>
-            <a:gs pos="100000">
-              <a:srgbClr val="F26D00"/>
-            </a:gs>
-          </a:gsLst>
-          <a:lin ang="16200000" scaled="0"/>
-        </a:gradFill>
-        <a:ln>
-          <a:noFill/>
+        <a:noFill/>
+        <a:ln w="25400" cap="flat" cmpd="sng" algn="ctr">
+          <a:solidFill>
+            <a:schemeClr val="lt2">
+              <a:hueOff val="0"/>
+              <a:satOff val="0"/>
+              <a:lumOff val="0"/>
+              <a:alphaOff val="0"/>
+            </a:schemeClr>
+          </a:solidFill>
+          <a:miter lim="800000"/>
         </a:ln>
-        <a:effectLst>
-          <a:outerShdw blurRad="38100" dist="25400" dir="2700000" algn="br" rotWithShape="0">
-            <a:srgbClr val="000000">
-              <a:alpha val="60000"/>
-            </a:srgbClr>
-          </a:outerShdw>
-        </a:effectLst>
+        <a:effectLst/>
       </dsp:spPr>
       <dsp:style>
-        <a:lnRef idx="0">
+        <a:lnRef idx="2">
           <a:scrgbClr r="0" g="0" b="0"/>
         </a:lnRef>
-        <a:fillRef idx="3">
+        <a:fillRef idx="1">
           <a:scrgbClr r="0" g="0" b="0"/>
         </a:fillRef>
-        <a:effectRef idx="2">
+        <a:effectRef idx="0">
           <a:scrgbClr r="0" g="0" b="0"/>
         </a:effectRef>
         <a:fontRef idx="minor">
@@ -2287,72 +2072,28 @@
             <a:gd name="adj" fmla="val 10000"/>
           </a:avLst>
         </a:prstGeom>
-        <a:gradFill rotWithShape="0">
-          <a:gsLst>
-            <a:gs pos="0">
-              <a:schemeClr val="accent3">
-                <a:hueOff val="0"/>
-                <a:satOff val="0"/>
-                <a:lumOff val="0"/>
-                <a:alphaOff val="0"/>
-                <a:shade val="15000"/>
-                <a:satMod val="180000"/>
-              </a:schemeClr>
-            </a:gs>
-            <a:gs pos="50000">
-              <a:schemeClr val="accent3">
-                <a:hueOff val="0"/>
-                <a:satOff val="0"/>
-                <a:lumOff val="0"/>
-                <a:alphaOff val="0"/>
-                <a:shade val="45000"/>
-                <a:satMod val="170000"/>
-              </a:schemeClr>
-            </a:gs>
-            <a:gs pos="70000">
-              <a:schemeClr val="accent3">
-                <a:hueOff val="0"/>
-                <a:satOff val="0"/>
-                <a:lumOff val="0"/>
-                <a:alphaOff val="0"/>
-                <a:tint val="99000"/>
-                <a:shade val="65000"/>
-                <a:satMod val="155000"/>
-              </a:schemeClr>
-            </a:gs>
-            <a:gs pos="100000">
-              <a:schemeClr val="accent3">
-                <a:hueOff val="0"/>
-                <a:satOff val="0"/>
-                <a:lumOff val="0"/>
-                <a:alphaOff val="0"/>
-                <a:tint val="100000"/>
-                <a:shade val="100000"/>
-                <a:satMod val="155000"/>
-              </a:schemeClr>
-            </a:gs>
-          </a:gsLst>
-          <a:lin ang="16200000" scaled="0"/>
-        </a:gradFill>
-        <a:ln>
-          <a:noFill/>
+        <a:noFill/>
+        <a:ln w="25400" cap="flat" cmpd="sng" algn="ctr">
+          <a:solidFill>
+            <a:schemeClr val="lt2">
+              <a:hueOff val="0"/>
+              <a:satOff val="0"/>
+              <a:lumOff val="0"/>
+              <a:alphaOff val="0"/>
+            </a:schemeClr>
+          </a:solidFill>
+          <a:miter lim="800000"/>
         </a:ln>
-        <a:effectLst>
-          <a:outerShdw blurRad="38100" dist="25400" dir="2700000" algn="br" rotWithShape="0">
-            <a:srgbClr val="000000">
-              <a:alpha val="60000"/>
-            </a:srgbClr>
-          </a:outerShdw>
-        </a:effectLst>
+        <a:effectLst/>
       </dsp:spPr>
       <dsp:style>
-        <a:lnRef idx="0">
+        <a:lnRef idx="2">
           <a:scrgbClr r="0" g="0" b="0"/>
         </a:lnRef>
-        <a:fillRef idx="3">
+        <a:fillRef idx="1">
           <a:scrgbClr r="0" g="0" b="0"/>
         </a:fillRef>
-        <a:effectRef idx="2">
+        <a:effectRef idx="0">
           <a:scrgbClr r="0" g="0" b="0"/>
         </a:effectRef>
         <a:fontRef idx="minor">
@@ -2405,50 +2146,28 @@
             <a:gd name="adj" fmla="val 10000"/>
           </a:avLst>
         </a:prstGeom>
-        <a:gradFill rotWithShape="0">
-          <a:gsLst>
-            <a:gs pos="0">
-              <a:srgbClr val="394404"/>
-            </a:gs>
-            <a:gs pos="50000">
-              <a:srgbClr val="5F6F0F"/>
-            </a:gs>
-            <a:gs pos="70000">
-              <a:srgbClr val="65741A"/>
-            </a:gs>
-            <a:gs pos="100000">
-              <a:schemeClr val="accent4">
-                <a:hueOff val="0"/>
-                <a:satOff val="0"/>
-                <a:lumOff val="0"/>
-                <a:alphaOff val="0"/>
-                <a:tint val="100000"/>
-                <a:shade val="100000"/>
-                <a:satMod val="155000"/>
-              </a:schemeClr>
-            </a:gs>
-          </a:gsLst>
-          <a:lin ang="16200000" scaled="0"/>
-        </a:gradFill>
-        <a:ln>
-          <a:noFill/>
+        <a:noFill/>
+        <a:ln w="25400" cap="flat" cmpd="sng" algn="ctr">
+          <a:solidFill>
+            <a:schemeClr val="lt2">
+              <a:hueOff val="0"/>
+              <a:satOff val="0"/>
+              <a:lumOff val="0"/>
+              <a:alphaOff val="0"/>
+            </a:schemeClr>
+          </a:solidFill>
+          <a:miter lim="800000"/>
         </a:ln>
-        <a:effectLst>
-          <a:outerShdw blurRad="38100" dist="25400" dir="2700000" algn="br" rotWithShape="0">
-            <a:srgbClr val="000000">
-              <a:alpha val="60000"/>
-            </a:srgbClr>
-          </a:outerShdw>
-        </a:effectLst>
+        <a:effectLst/>
       </dsp:spPr>
       <dsp:style>
-        <a:lnRef idx="0">
+        <a:lnRef idx="2">
           <a:scrgbClr r="0" g="0" b="0"/>
         </a:lnRef>
-        <a:fillRef idx="3">
+        <a:fillRef idx="1">
           <a:scrgbClr r="0" g="0" b="0"/>
         </a:fillRef>
-        <a:effectRef idx="2">
+        <a:effectRef idx="0">
           <a:scrgbClr r="0" g="0" b="0"/>
         </a:effectRef>
         <a:fontRef idx="minor">
@@ -2503,20 +2222,20 @@
           </a:avLst>
         </a:prstGeom>
         <a:solidFill>
-          <a:schemeClr val="accent2">
+          <a:schemeClr val="dk2">
+            <a:alpha val="90000"/>
             <a:tint val="40000"/>
-            <a:alpha val="90000"/>
             <a:hueOff val="0"/>
             <a:satOff val="0"/>
             <a:lumOff val="0"/>
             <a:alphaOff val="0"/>
           </a:schemeClr>
         </a:solidFill>
-        <a:ln w="9525" cap="flat" cmpd="sng" algn="ctr">
+        <a:ln w="25400" cap="flat" cmpd="sng" algn="ctr">
           <a:solidFill>
-            <a:schemeClr val="accent2">
+            <a:schemeClr val="dk2">
+              <a:alpha val="90000"/>
               <a:tint val="40000"/>
-              <a:alpha val="90000"/>
               <a:hueOff val="0"/>
               <a:satOff val="0"/>
               <a:lumOff val="0"/>
@@ -2528,7 +2247,7 @@
         <a:effectLst/>
       </dsp:spPr>
       <dsp:style>
-        <a:lnRef idx="1">
+        <a:lnRef idx="2">
           <a:scrgbClr r="0" g="0" b="0"/>
         </a:lnRef>
         <a:fillRef idx="1">
@@ -2582,20 +2301,20 @@
           </a:avLst>
         </a:prstGeom>
         <a:solidFill>
-          <a:schemeClr val="accent3">
+          <a:schemeClr val="dk2">
+            <a:alpha val="90000"/>
             <a:tint val="40000"/>
-            <a:alpha val="90000"/>
             <a:hueOff val="0"/>
             <a:satOff val="0"/>
             <a:lumOff val="0"/>
             <a:alphaOff val="0"/>
           </a:schemeClr>
         </a:solidFill>
-        <a:ln w="9525" cap="flat" cmpd="sng" algn="ctr">
+        <a:ln w="25400" cap="flat" cmpd="sng" algn="ctr">
           <a:solidFill>
-            <a:schemeClr val="accent3">
+            <a:schemeClr val="dk2">
+              <a:alpha val="90000"/>
               <a:tint val="40000"/>
-              <a:alpha val="90000"/>
               <a:hueOff val="0"/>
               <a:satOff val="0"/>
               <a:lumOff val="0"/>
@@ -2607,7 +2326,7 @@
         <a:effectLst/>
       </dsp:spPr>
       <dsp:style>
-        <a:lnRef idx="1">
+        <a:lnRef idx="2">
           <a:scrgbClr r="0" g="0" b="0"/>
         </a:lnRef>
         <a:fillRef idx="1">
@@ -3875,11 +3594,11 @@
 </file>
 
 <file path=ppt/diagrams/quickStyle1.xml><?xml version="1.0" encoding="utf-8"?>
-<dgm:styleDef xmlns:dgm="http://schemas.openxmlformats.org/drawingml/2006/diagram" xmlns:a="http://schemas.openxmlformats.org/drawingml/2006/main" uniqueId="urn:microsoft.com/office/officeart/2005/8/quickstyle/simple4">
+<dgm:styleDef xmlns:dgm="http://schemas.openxmlformats.org/drawingml/2006/diagram" xmlns:a="http://schemas.openxmlformats.org/drawingml/2006/main" uniqueId="urn:microsoft.com/office/officeart/2005/8/quickstyle/simple1">
   <dgm:title val=""/>
   <dgm:desc val=""/>
   <dgm:catLst>
-    <dgm:cat type="simple" pri="10400"/>
+    <dgm:cat type="simple" pri="10100"/>
   </dgm:catLst>
   <dgm:scene3d>
     <a:camera prst="orthographicFront"/>
@@ -3893,13 +3612,13 @@
     <dgm:sp3d/>
     <dgm:txPr/>
     <dgm:style>
-      <a:lnRef idx="0">
+      <a:lnRef idx="2">
         <a:scrgbClr r="0" g="0" b="0"/>
       </a:lnRef>
-      <a:fillRef idx="3">
+      <a:fillRef idx="1">
         <a:scrgbClr r="0" g="0" b="0"/>
       </a:fillRef>
-      <a:effectRef idx="2">
+      <a:effectRef idx="0">
         <a:scrgbClr r="0" g="0" b="0"/>
       </a:effectRef>
       <a:fontRef idx="minor">
@@ -3915,13 +3634,13 @@
     <dgm:sp3d/>
     <dgm:txPr/>
     <dgm:style>
-      <a:lnRef idx="1">
+      <a:lnRef idx="2">
         <a:scrgbClr r="0" g="0" b="0"/>
       </a:lnRef>
-      <a:fillRef idx="3">
+      <a:fillRef idx="1">
         <a:scrgbClr r="0" g="0" b="0"/>
       </a:fillRef>
-      <a:effectRef idx="2">
+      <a:effectRef idx="0">
         <a:scrgbClr r="0" g="0" b="0"/>
       </a:effectRef>
       <a:fontRef idx="minor">
@@ -3937,10 +3656,10 @@
     <dgm:sp3d/>
     <dgm:txPr/>
     <dgm:style>
-      <a:lnRef idx="0">
+      <a:lnRef idx="2">
         <a:scrgbClr r="0" g="0" b="0"/>
       </a:lnRef>
-      <a:fillRef idx="3">
+      <a:fillRef idx="1">
         <a:scrgbClr r="0" g="0" b="0"/>
       </a:fillRef>
       <a:effectRef idx="0">
@@ -3959,13 +3678,13 @@
     <dgm:sp3d/>
     <dgm:txPr/>
     <dgm:style>
-      <a:lnRef idx="1">
+      <a:lnRef idx="2">
         <a:scrgbClr r="0" g="0" b="0"/>
       </a:lnRef>
-      <a:fillRef idx="3">
+      <a:fillRef idx="1">
         <a:scrgbClr r="0" g="0" b="0"/>
       </a:fillRef>
-      <a:effectRef idx="2">
+      <a:effectRef idx="0">
         <a:scrgbClr r="0" g="0" b="0"/>
       </a:effectRef>
       <a:fontRef idx="minor">
@@ -3981,13 +3700,13 @@
     <dgm:sp3d/>
     <dgm:txPr/>
     <dgm:style>
-      <a:lnRef idx="0">
+      <a:lnRef idx="2">
         <a:scrgbClr r="0" g="0" b="0"/>
       </a:lnRef>
-      <a:fillRef idx="3">
+      <a:fillRef idx="1">
         <a:scrgbClr r="0" g="0" b="0"/>
       </a:fillRef>
-      <a:effectRef idx="2">
+      <a:effectRef idx="0">
         <a:scrgbClr r="0" g="0" b="0"/>
       </a:effectRef>
       <a:fontRef idx="minor">
@@ -4003,13 +3722,13 @@
     <dgm:sp3d/>
     <dgm:txPr/>
     <dgm:style>
-      <a:lnRef idx="0">
+      <a:lnRef idx="2">
         <a:scrgbClr r="0" g="0" b="0"/>
       </a:lnRef>
-      <a:fillRef idx="3">
+      <a:fillRef idx="1">
         <a:scrgbClr r="0" g="0" b="0"/>
       </a:fillRef>
-      <a:effectRef idx="2">
+      <a:effectRef idx="0">
         <a:scrgbClr r="0" g="0" b="0"/>
       </a:effectRef>
       <a:fontRef idx="minor">
@@ -4025,13 +3744,13 @@
     <dgm:sp3d/>
     <dgm:txPr/>
     <dgm:style>
-      <a:lnRef idx="0">
+      <a:lnRef idx="2">
         <a:scrgbClr r="0" g="0" b="0"/>
       </a:lnRef>
-      <a:fillRef idx="3">
+      <a:fillRef idx="1">
         <a:scrgbClr r="0" g="0" b="0"/>
       </a:fillRef>
-      <a:effectRef idx="2">
+      <a:effectRef idx="0">
         <a:scrgbClr r="0" g="0" b="0"/>
       </a:effectRef>
       <a:fontRef idx="minor">
@@ -4047,13 +3766,13 @@
     <dgm:sp3d/>
     <dgm:txPr/>
     <dgm:style>
-      <a:lnRef idx="0">
+      <a:lnRef idx="2">
         <a:scrgbClr r="0" g="0" b="0"/>
       </a:lnRef>
-      <a:fillRef idx="3">
+      <a:fillRef idx="1">
         <a:scrgbClr r="0" g="0" b="0"/>
       </a:fillRef>
-      <a:effectRef idx="2">
+      <a:effectRef idx="0">
         <a:scrgbClr r="0" g="0" b="0"/>
       </a:effectRef>
       <a:fontRef idx="minor">
@@ -4069,13 +3788,13 @@
     <dgm:sp3d/>
     <dgm:txPr/>
     <dgm:style>
-      <a:lnRef idx="0">
+      <a:lnRef idx="2">
         <a:scrgbClr r="0" g="0" b="0"/>
       </a:lnRef>
       <a:fillRef idx="1">
         <a:scrgbClr r="0" g="0" b="0"/>
       </a:fillRef>
-      <a:effectRef idx="2">
+      <a:effectRef idx="0">
         <a:scrgbClr r="0" g="0" b="0"/>
       </a:effectRef>
       <a:fontRef idx="minor"/>
@@ -4089,13 +3808,13 @@
     <dgm:sp3d/>
     <dgm:txPr/>
     <dgm:style>
-      <a:lnRef idx="0">
+      <a:lnRef idx="2">
         <a:scrgbClr r="0" g="0" b="0"/>
       </a:lnRef>
       <a:fillRef idx="1">
         <a:scrgbClr r="0" g="0" b="0"/>
       </a:fillRef>
-      <a:effectRef idx="2">
+      <a:effectRef idx="0">
         <a:scrgbClr r="0" g="0" b="0"/>
       </a:effectRef>
       <a:fontRef idx="minor"/>
@@ -4109,13 +3828,13 @@
     <dgm:sp3d/>
     <dgm:txPr/>
     <dgm:style>
-      <a:lnRef idx="0">
+      <a:lnRef idx="2">
         <a:scrgbClr r="0" g="0" b="0"/>
       </a:lnRef>
       <a:fillRef idx="1">
         <a:scrgbClr r="0" g="0" b="0"/>
       </a:fillRef>
-      <a:effectRef idx="2">
+      <a:effectRef idx="0">
         <a:scrgbClr r="0" g="0" b="0"/>
       </a:effectRef>
       <a:fontRef idx="minor"/>
@@ -4132,10 +3851,10 @@
       <a:lnRef idx="0">
         <a:scrgbClr r="0" g="0" b="0"/>
       </a:lnRef>
-      <a:fillRef idx="3">
+      <a:fillRef idx="1">
         <a:scrgbClr r="0" g="0" b="0"/>
       </a:fillRef>
-      <a:effectRef idx="2">
+      <a:effectRef idx="0">
         <a:scrgbClr r="0" g="0" b="0"/>
       </a:effectRef>
       <a:fontRef idx="minor">
@@ -4154,10 +3873,10 @@
       <a:lnRef idx="0">
         <a:scrgbClr r="0" g="0" b="0"/>
       </a:lnRef>
-      <a:fillRef idx="3">
+      <a:fillRef idx="1">
         <a:scrgbClr r="0" g="0" b="0"/>
       </a:fillRef>
-      <a:effectRef idx="2">
+      <a:effectRef idx="0">
         <a:scrgbClr r="0" g="0" b="0"/>
       </a:effectRef>
       <a:fontRef idx="minor">
@@ -4176,10 +3895,10 @@
       <a:lnRef idx="0">
         <a:scrgbClr r="0" g="0" b="0"/>
       </a:lnRef>
-      <a:fillRef idx="3">
+      <a:fillRef idx="1">
         <a:scrgbClr r="0" g="0" b="0"/>
       </a:fillRef>
-      <a:effectRef idx="2">
+      <a:effectRef idx="0">
         <a:scrgbClr r="0" g="0" b="0"/>
       </a:effectRef>
       <a:fontRef idx="minor">
@@ -4221,7 +3940,7 @@
       <a:fillRef idx="1">
         <a:scrgbClr r="0" g="0" b="0"/>
       </a:fillRef>
-      <a:effectRef idx="1">
+      <a:effectRef idx="0">
         <a:scrgbClr r="0" g="0" b="0"/>
       </a:effectRef>
       <a:fontRef idx="minor"/>
@@ -4235,13 +3954,13 @@
     <dgm:sp3d/>
     <dgm:txPr/>
     <dgm:style>
-      <a:lnRef idx="0">
+      <a:lnRef idx="2">
         <a:scrgbClr r="0" g="0" b="0"/>
       </a:lnRef>
-      <a:fillRef idx="3">
+      <a:fillRef idx="1">
         <a:scrgbClr r="0" g="0" b="0"/>
       </a:fillRef>
-      <a:effectRef idx="2">
+      <a:effectRef idx="0">
         <a:scrgbClr r="0" g="0" b="0"/>
       </a:effectRef>
       <a:fontRef idx="minor">
@@ -4257,13 +3976,13 @@
     <dgm:sp3d/>
     <dgm:txPr/>
     <dgm:style>
-      <a:lnRef idx="0">
+      <a:lnRef idx="2">
         <a:scrgbClr r="0" g="0" b="0"/>
       </a:lnRef>
-      <a:fillRef idx="3">
+      <a:fillRef idx="1">
         <a:scrgbClr r="0" g="0" b="0"/>
       </a:fillRef>
-      <a:effectRef idx="2">
+      <a:effectRef idx="0">
         <a:scrgbClr r="0" g="0" b="0"/>
       </a:effectRef>
       <a:fontRef idx="minor">
@@ -4279,13 +3998,13 @@
     <dgm:sp3d/>
     <dgm:txPr/>
     <dgm:style>
-      <a:lnRef idx="0">
+      <a:lnRef idx="2">
         <a:scrgbClr r="0" g="0" b="0"/>
       </a:lnRef>
-      <a:fillRef idx="3">
+      <a:fillRef idx="1">
         <a:scrgbClr r="0" g="0" b="0"/>
       </a:fillRef>
-      <a:effectRef idx="2">
+      <a:effectRef idx="0">
         <a:scrgbClr r="0" g="0" b="0"/>
       </a:effectRef>
       <a:fontRef idx="minor">
@@ -4301,13 +4020,13 @@
     <dgm:sp3d/>
     <dgm:txPr/>
     <dgm:style>
-      <a:lnRef idx="0">
+      <a:lnRef idx="2">
         <a:scrgbClr r="0" g="0" b="0"/>
       </a:lnRef>
-      <a:fillRef idx="3">
+      <a:fillRef idx="1">
         <a:scrgbClr r="0" g="0" b="0"/>
       </a:fillRef>
-      <a:effectRef idx="2">
+      <a:effectRef idx="0">
         <a:scrgbClr r="0" g="0" b="0"/>
       </a:effectRef>
       <a:fontRef idx="minor">
@@ -4323,13 +4042,13 @@
     <dgm:sp3d/>
     <dgm:txPr/>
     <dgm:style>
-      <a:lnRef idx="0">
+      <a:lnRef idx="2">
         <a:scrgbClr r="0" g="0" b="0"/>
       </a:lnRef>
-      <a:fillRef idx="3">
+      <a:fillRef idx="1">
         <a:scrgbClr r="0" g="0" b="0"/>
       </a:fillRef>
-      <a:effectRef idx="2">
+      <a:effectRef idx="0">
         <a:scrgbClr r="0" g="0" b="0"/>
       </a:effectRef>
       <a:fontRef idx="minor">
@@ -4345,13 +4064,13 @@
     <dgm:sp3d/>
     <dgm:txPr/>
     <dgm:style>
-      <a:lnRef idx="0">
+      <a:lnRef idx="2">
         <a:scrgbClr r="0" g="0" b="0"/>
       </a:lnRef>
-      <a:fillRef idx="3">
+      <a:fillRef idx="1">
         <a:scrgbClr r="0" g="0" b="0"/>
       </a:fillRef>
-      <a:effectRef idx="2">
+      <a:effectRef idx="0">
         <a:scrgbClr r="0" g="0" b="0"/>
       </a:effectRef>
       <a:fontRef idx="minor">
@@ -4367,13 +4086,13 @@
     <dgm:sp3d/>
     <dgm:txPr/>
     <dgm:style>
-      <a:lnRef idx="0">
+      <a:lnRef idx="2">
         <a:scrgbClr r="0" g="0" b="0"/>
       </a:lnRef>
-      <a:fillRef idx="3">
+      <a:fillRef idx="1">
         <a:scrgbClr r="0" g="0" b="0"/>
       </a:fillRef>
-      <a:effectRef idx="2">
+      <a:effectRef idx="0">
         <a:scrgbClr r="0" g="0" b="0"/>
       </a:effectRef>
       <a:fontRef idx="minor">
@@ -4389,13 +4108,13 @@
     <dgm:sp3d/>
     <dgm:txPr/>
     <dgm:style>
-      <a:lnRef idx="1">
+      <a:lnRef idx="2">
         <a:scrgbClr r="0" g="0" b="0"/>
       </a:lnRef>
-      <a:fillRef idx="3">
+      <a:fillRef idx="1">
         <a:scrgbClr r="0" g="0" b="0"/>
       </a:fillRef>
-      <a:effectRef idx="2">
+      <a:effectRef idx="0">
         <a:scrgbClr r="0" g="0" b="0"/>
       </a:effectRef>
       <a:fontRef idx="minor">
@@ -4411,13 +4130,13 @@
     <dgm:sp3d/>
     <dgm:txPr/>
     <dgm:style>
-      <a:lnRef idx="1">
+      <a:lnRef idx="2">
         <a:scrgbClr r="0" g="0" b="0"/>
       </a:lnRef>
-      <a:fillRef idx="3">
+      <a:fillRef idx="1">
         <a:scrgbClr r="0" g="0" b="0"/>
       </a:fillRef>
-      <a:effectRef idx="2">
+      <a:effectRef idx="0">
         <a:scrgbClr r="0" g="0" b="0"/>
       </a:effectRef>
       <a:fontRef idx="minor">
@@ -4433,7 +4152,7 @@
     <dgm:sp3d/>
     <dgm:txPr/>
     <dgm:style>
-      <a:lnRef idx="1">
+      <a:lnRef idx="2">
         <a:scrgbClr r="0" g="0" b="0"/>
       </a:lnRef>
       <a:fillRef idx="0">
@@ -4453,7 +4172,7 @@
     <dgm:sp3d/>
     <dgm:txPr/>
     <dgm:style>
-      <a:lnRef idx="1">
+      <a:lnRef idx="2">
         <a:scrgbClr r="0" g="0" b="0"/>
       </a:lnRef>
       <a:fillRef idx="0">
@@ -4473,7 +4192,7 @@
     <dgm:sp3d/>
     <dgm:txPr/>
     <dgm:style>
-      <a:lnRef idx="1">
+      <a:lnRef idx="2">
         <a:scrgbClr r="0" g="0" b="0"/>
       </a:lnRef>
       <a:fillRef idx="0">
@@ -4493,7 +4212,7 @@
     <dgm:sp3d/>
     <dgm:txPr/>
     <dgm:style>
-      <a:lnRef idx="1">
+      <a:lnRef idx="2">
         <a:scrgbClr r="0" g="0" b="0"/>
       </a:lnRef>
       <a:fillRef idx="0">
@@ -4513,7 +4232,7 @@
     <dgm:sp3d/>
     <dgm:txPr/>
     <dgm:style>
-      <a:lnRef idx="1">
+      <a:lnRef idx="2">
         <a:scrgbClr r="0" g="0" b="0"/>
       </a:lnRef>
       <a:fillRef idx="1">
@@ -4533,7 +4252,7 @@
     <dgm:sp3d/>
     <dgm:txPr/>
     <dgm:style>
-      <a:lnRef idx="1">
+      <a:lnRef idx="2">
         <a:scrgbClr r="0" g="0" b="0"/>
       </a:lnRef>
       <a:fillRef idx="1">
@@ -4553,7 +4272,7 @@
     <dgm:sp3d/>
     <dgm:txPr/>
     <dgm:style>
-      <a:lnRef idx="1">
+      <a:lnRef idx="2">
         <a:scrgbClr r="0" g="0" b="0"/>
       </a:lnRef>
       <a:fillRef idx="1">
@@ -4593,7 +4312,7 @@
     <dgm:sp3d/>
     <dgm:txPr/>
     <dgm:style>
-      <a:lnRef idx="1">
+      <a:lnRef idx="2">
         <a:scrgbClr r="0" g="0" b="0"/>
       </a:lnRef>
       <a:fillRef idx="1">
@@ -4613,7 +4332,7 @@
     <dgm:sp3d/>
     <dgm:txPr/>
     <dgm:style>
-      <a:lnRef idx="1">
+      <a:lnRef idx="2">
         <a:scrgbClr r="0" g="0" b="0"/>
       </a:lnRef>
       <a:fillRef idx="1">
@@ -4633,7 +4352,7 @@
     <dgm:sp3d/>
     <dgm:txPr/>
     <dgm:style>
-      <a:lnRef idx="1">
+      <a:lnRef idx="2">
         <a:scrgbClr r="0" g="0" b="0"/>
       </a:lnRef>
       <a:fillRef idx="1">
@@ -4653,7 +4372,7 @@
     <dgm:sp3d/>
     <dgm:txPr/>
     <dgm:style>
-      <a:lnRef idx="1">
+      <a:lnRef idx="2">
         <a:scrgbClr r="0" g="0" b="0"/>
       </a:lnRef>
       <a:fillRef idx="1">
@@ -4673,7 +4392,7 @@
     <dgm:sp3d/>
     <dgm:txPr/>
     <dgm:style>
-      <a:lnRef idx="1">
+      <a:lnRef idx="2">
         <a:scrgbClr r="0" g="0" b="0"/>
       </a:lnRef>
       <a:fillRef idx="1">
@@ -4693,7 +4412,7 @@
     <dgm:sp3d/>
     <dgm:txPr/>
     <dgm:style>
-      <a:lnRef idx="1">
+      <a:lnRef idx="2">
         <a:scrgbClr r="0" g="0" b="0"/>
       </a:lnRef>
       <a:fillRef idx="1">
@@ -4713,7 +4432,7 @@
     <dgm:sp3d/>
     <dgm:txPr/>
     <dgm:style>
-      <a:lnRef idx="1">
+      <a:lnRef idx="2">
         <a:scrgbClr r="0" g="0" b="0"/>
       </a:lnRef>
       <a:fillRef idx="1">
@@ -4733,7 +4452,7 @@
     <dgm:sp3d/>
     <dgm:txPr/>
     <dgm:style>
-      <a:lnRef idx="1">
+      <a:lnRef idx="2">
         <a:scrgbClr r="0" g="0" b="0"/>
       </a:lnRef>
       <a:fillRef idx="1">
@@ -4753,7 +4472,7 @@
     <dgm:sp3d/>
     <dgm:txPr/>
     <dgm:style>
-      <a:lnRef idx="1">
+      <a:lnRef idx="2">
         <a:scrgbClr r="0" g="0" b="0"/>
       </a:lnRef>
       <a:fillRef idx="1">
@@ -4773,7 +4492,7 @@
     <dgm:sp3d/>
     <dgm:txPr/>
     <dgm:style>
-      <a:lnRef idx="1">
+      <a:lnRef idx="2">
         <a:scrgbClr r="0" g="0" b="0"/>
       </a:lnRef>
       <a:fillRef idx="1">
@@ -4793,7 +4512,7 @@
     <dgm:sp3d/>
     <dgm:txPr/>
     <dgm:style>
-      <a:lnRef idx="1">
+      <a:lnRef idx="2">
         <a:scrgbClr r="0" g="0" b="0"/>
       </a:lnRef>
       <a:fillRef idx="1">
@@ -4819,7 +4538,7 @@
       <a:fillRef idx="1">
         <a:scrgbClr r="0" g="0" b="0"/>
       </a:fillRef>
-      <a:effectRef idx="2">
+      <a:effectRef idx="0">
         <a:scrgbClr r="0" g="0" b="0"/>
       </a:effectRef>
       <a:fontRef idx="minor"/>
@@ -4839,7 +4558,7 @@
       <a:fillRef idx="1">
         <a:scrgbClr r="0" g="0" b="0"/>
       </a:fillRef>
-      <a:effectRef idx="2">
+      <a:effectRef idx="0">
         <a:scrgbClr r="0" g="0" b="0"/>
       </a:effectRef>
       <a:fontRef idx="minor"/>
@@ -4873,13 +4592,13 @@
     <dgm:sp3d/>
     <dgm:txPr/>
     <dgm:style>
-      <a:lnRef idx="0">
+      <a:lnRef idx="2">
         <a:scrgbClr r="0" g="0" b="0"/>
       </a:lnRef>
-      <a:fillRef idx="3">
+      <a:fillRef idx="1">
         <a:scrgbClr r="0" g="0" b="0"/>
       </a:fillRef>
-      <a:effectRef idx="2">
+      <a:effectRef idx="0">
         <a:scrgbClr r="0" g="0" b="0"/>
       </a:effectRef>
       <a:fontRef idx="minor"/>
@@ -5646,7 +5365,132 @@
           <a:bodyPr/>
           <a:lstStyle/>
           <a:p>
-            <a:endParaRPr lang="it-IT" dirty="0"/>
+            <a:r>
+              <a:rPr lang="it-IT" dirty="0"/>
+              <a:t>MITRE: </a:t>
+            </a:r>
+            <a:r>
+              <a:rPr lang="en-US" sz="1600" u="sng" kern="1200" dirty="0">
+                <a:solidFill>
+                  <a:schemeClr val="tx1"/>
+                </a:solidFill>
+                <a:effectLst/>
+                <a:latin typeface="+mn-lt"/>
+                <a:ea typeface="+mn-ea"/>
+                <a:cs typeface="+mn-cs"/>
+                <a:hlinkClick r:id="rId3"/>
+              </a:rPr>
+              <a:t>App Auto-Start at Device Boot</a:t>
+            </a:r>
+            <a:r>
+              <a:rPr lang="en-US" sz="1600" u="none" kern="1200" dirty="0">
+                <a:solidFill>
+                  <a:schemeClr val="tx1"/>
+                </a:solidFill>
+                <a:effectLst/>
+                <a:latin typeface="+mn-lt"/>
+                <a:ea typeface="+mn-ea"/>
+                <a:cs typeface="+mn-cs"/>
+              </a:rPr>
+              <a:t> (</a:t>
+            </a:r>
+            <a:r>
+              <a:rPr lang="en-US" sz="1600" u="none" kern="1200" dirty="0" err="1">
+                <a:solidFill>
+                  <a:schemeClr val="tx1"/>
+                </a:solidFill>
+                <a:effectLst/>
+                <a:latin typeface="+mn-lt"/>
+                <a:ea typeface="+mn-ea"/>
+                <a:cs typeface="+mn-cs"/>
+              </a:rPr>
+              <a:t>l’applicazione</a:t>
+            </a:r>
+            <a:r>
+              <a:rPr lang="en-US" sz="1600" u="none" kern="1200" dirty="0">
+                <a:solidFill>
+                  <a:schemeClr val="tx1"/>
+                </a:solidFill>
+                <a:effectLst/>
+                <a:latin typeface="+mn-lt"/>
+                <a:ea typeface="+mn-ea"/>
+                <a:cs typeface="+mn-cs"/>
+              </a:rPr>
+              <a:t> </a:t>
+            </a:r>
+            <a:r>
+              <a:rPr lang="en-US" sz="1600" u="none" kern="1200" dirty="0" err="1">
+                <a:solidFill>
+                  <a:schemeClr val="tx1"/>
+                </a:solidFill>
+                <a:effectLst/>
+                <a:latin typeface="+mn-lt"/>
+                <a:ea typeface="+mn-ea"/>
+                <a:cs typeface="+mn-cs"/>
+              </a:rPr>
+              <a:t>dipende</a:t>
+            </a:r>
+            <a:r>
+              <a:rPr lang="en-US" sz="1600" u="none" kern="1200" dirty="0">
+                <a:solidFill>
+                  <a:schemeClr val="tx1"/>
+                </a:solidFill>
+                <a:effectLst/>
+                <a:latin typeface="+mn-lt"/>
+                <a:ea typeface="+mn-ea"/>
+                <a:cs typeface="+mn-cs"/>
+              </a:rPr>
+              <a:t> </a:t>
+            </a:r>
+            <a:r>
+              <a:rPr lang="en-US" sz="1600" u="none" kern="1200" dirty="0" err="1">
+                <a:solidFill>
+                  <a:schemeClr val="tx1"/>
+                </a:solidFill>
+                <a:effectLst/>
+                <a:latin typeface="+mn-lt"/>
+                <a:ea typeface="+mn-ea"/>
+                <a:cs typeface="+mn-cs"/>
+              </a:rPr>
+              <a:t>dallo</a:t>
+            </a:r>
+            <a:r>
+              <a:rPr lang="en-US" sz="1600" u="none" kern="1200" dirty="0">
+                <a:solidFill>
+                  <a:schemeClr val="tx1"/>
+                </a:solidFill>
+                <a:effectLst/>
+                <a:latin typeface="+mn-lt"/>
+                <a:ea typeface="+mn-ea"/>
+                <a:cs typeface="+mn-cs"/>
+              </a:rPr>
+              <a:t> specific APK </a:t>
+            </a:r>
+            <a:r>
+              <a:rPr lang="en-US" sz="1600" u="none" kern="1200" dirty="0" err="1">
+                <a:solidFill>
+                  <a:schemeClr val="tx1"/>
+                </a:solidFill>
+                <a:effectLst/>
+                <a:latin typeface="+mn-lt"/>
+                <a:ea typeface="+mn-ea"/>
+                <a:cs typeface="+mn-cs"/>
+              </a:rPr>
+              <a:t>scelto</a:t>
+            </a:r>
+            <a:r>
+              <a:rPr lang="en-US" sz="1600" u="none" kern="1200" dirty="0">
+                <a:solidFill>
+                  <a:schemeClr val="tx1"/>
+                </a:solidFill>
+                <a:effectLst/>
+                <a:latin typeface="+mn-lt"/>
+                <a:ea typeface="+mn-ea"/>
+                <a:cs typeface="+mn-cs"/>
+              </a:rPr>
+              <a:t>)</a:t>
+            </a:r>
+            <a:endParaRPr lang="it-IT" u="none" dirty="0"/>
           </a:p>
         </p:txBody>
       </p:sp>
@@ -5816,6 +5660,105 @@
           <a:bodyPr/>
           <a:lstStyle/>
           <a:p>
+            <a:pPr marL="0" marR="0" lvl="0" indent="0" algn="l" defTabSz="1218987" rtl="0" eaLnBrk="1" fontAlgn="auto" latinLnBrk="0" hangingPunct="1">
+              <a:lnSpc>
+                <a:spcPct val="100000"/>
+              </a:lnSpc>
+              <a:spcBef>
+                <a:spcPts val="0"/>
+              </a:spcBef>
+              <a:spcAft>
+                <a:spcPts val="0"/>
+              </a:spcAft>
+              <a:buClrTx/>
+              <a:buSzTx/>
+              <a:buFontTx/>
+              <a:buNone/>
+              <a:tabLst/>
+              <a:defRPr/>
+            </a:pPr>
+            <a:r>
+              <a:rPr lang="it-IT" dirty="0"/>
+              <a:t>MITRE: </a:t>
+            </a:r>
+            <a:r>
+              <a:rPr lang="it-IT" sz="1600" b="0" i="0" u="none" strike="noStrike" kern="1200" dirty="0" err="1">
+                <a:solidFill>
+                  <a:schemeClr val="tx1"/>
+                </a:solidFill>
+                <a:effectLst/>
+                <a:latin typeface="+mn-lt"/>
+                <a:ea typeface="+mn-ea"/>
+                <a:cs typeface="+mn-cs"/>
+                <a:hlinkClick r:id="rId3"/>
+              </a:rPr>
+              <a:t>Masquerade</a:t>
+            </a:r>
+            <a:r>
+              <a:rPr lang="it-IT" sz="1600" b="0" i="0" u="none" strike="noStrike" kern="1200" dirty="0">
+                <a:solidFill>
+                  <a:schemeClr val="tx1"/>
+                </a:solidFill>
+                <a:effectLst/>
+                <a:latin typeface="+mn-lt"/>
+                <a:ea typeface="+mn-ea"/>
+                <a:cs typeface="+mn-cs"/>
+                <a:hlinkClick r:id="rId3"/>
+              </a:rPr>
+              <a:t> </a:t>
+            </a:r>
+            <a:r>
+              <a:rPr lang="it-IT" sz="1600" b="0" i="0" u="none" strike="noStrike" kern="1200" dirty="0" err="1">
+                <a:solidFill>
+                  <a:schemeClr val="tx1"/>
+                </a:solidFill>
+                <a:effectLst/>
+                <a:latin typeface="+mn-lt"/>
+                <a:ea typeface="+mn-ea"/>
+                <a:cs typeface="+mn-cs"/>
+                <a:hlinkClick r:id="rId3"/>
+              </a:rPr>
+              <a:t>as</a:t>
+            </a:r>
+            <a:r>
+              <a:rPr lang="it-IT" sz="1600" b="0" i="0" u="none" strike="noStrike" kern="1200" dirty="0">
+                <a:solidFill>
+                  <a:schemeClr val="tx1"/>
+                </a:solidFill>
+                <a:effectLst/>
+                <a:latin typeface="+mn-lt"/>
+                <a:ea typeface="+mn-ea"/>
+                <a:cs typeface="+mn-cs"/>
+                <a:hlinkClick r:id="rId3"/>
+              </a:rPr>
+              <a:t> </a:t>
+            </a:r>
+            <a:r>
+              <a:rPr lang="it-IT" sz="1600" b="0" i="0" u="none" strike="noStrike" kern="1200" dirty="0" err="1">
+                <a:solidFill>
+                  <a:schemeClr val="tx1"/>
+                </a:solidFill>
+                <a:effectLst/>
+                <a:latin typeface="+mn-lt"/>
+                <a:ea typeface="+mn-ea"/>
+                <a:cs typeface="+mn-cs"/>
+                <a:hlinkClick r:id="rId3"/>
+              </a:rPr>
+              <a:t>Legitimate</a:t>
+            </a:r>
+            <a:r>
+              <a:rPr lang="it-IT" sz="1600" b="0" i="0" u="none" strike="noStrike" kern="1200" dirty="0">
+                <a:solidFill>
+                  <a:schemeClr val="tx1"/>
+                </a:solidFill>
+                <a:effectLst/>
+                <a:latin typeface="+mn-lt"/>
+                <a:ea typeface="+mn-ea"/>
+                <a:cs typeface="+mn-cs"/>
+                <a:hlinkClick r:id="rId3"/>
+              </a:rPr>
+              <a:t> Application</a:t>
+            </a:r>
             <a:endParaRPr lang="it-IT" dirty="0"/>
           </a:p>
         </p:txBody>
@@ -5986,6 +5929,62 @@
           <a:bodyPr/>
           <a:lstStyle/>
           <a:p>
+            <a:r>
+              <a:rPr lang="it-IT" dirty="0"/>
+              <a:t>MITRE: </a:t>
+            </a:r>
+            <a:r>
+              <a:rPr lang="it-IT" sz="1600" b="0" i="0" u="sng" kern="1200" dirty="0" err="1">
+                <a:solidFill>
+                  <a:schemeClr val="tx1"/>
+                </a:solidFill>
+                <a:effectLst/>
+                <a:latin typeface="+mn-lt"/>
+                <a:ea typeface="+mn-ea"/>
+                <a:cs typeface="+mn-cs"/>
+                <a:hlinkClick r:id="rId3"/>
+              </a:rPr>
+              <a:t>Uncommonly</a:t>
+            </a:r>
+            <a:r>
+              <a:rPr lang="it-IT" sz="1600" b="0" i="0" u="sng" kern="1200" dirty="0">
+                <a:solidFill>
+                  <a:schemeClr val="tx1"/>
+                </a:solidFill>
+                <a:effectLst/>
+                <a:latin typeface="+mn-lt"/>
+                <a:ea typeface="+mn-ea"/>
+                <a:cs typeface="+mn-cs"/>
+                <a:hlinkClick r:id="rId3"/>
+              </a:rPr>
+              <a:t> </a:t>
+            </a:r>
+            <a:r>
+              <a:rPr lang="it-IT" sz="1600" b="0" i="0" u="sng" kern="1200" dirty="0" err="1">
+                <a:solidFill>
+                  <a:schemeClr val="tx1"/>
+                </a:solidFill>
+                <a:effectLst/>
+                <a:latin typeface="+mn-lt"/>
+                <a:ea typeface="+mn-ea"/>
+                <a:cs typeface="+mn-cs"/>
+                <a:hlinkClick r:id="rId3"/>
+              </a:rPr>
+              <a:t>Used</a:t>
+            </a:r>
+            <a:r>
+              <a:rPr lang="it-IT" sz="1600" b="0" i="0" u="sng" kern="1200" dirty="0">
+                <a:solidFill>
+                  <a:schemeClr val="tx1"/>
+                </a:solidFill>
+                <a:effectLst/>
+                <a:latin typeface="+mn-lt"/>
+                <a:ea typeface="+mn-ea"/>
+                <a:cs typeface="+mn-cs"/>
+                <a:hlinkClick r:id="rId3"/>
+              </a:rPr>
+              <a:t> Port</a:t>
+            </a:r>
             <a:endParaRPr lang="it-IT" dirty="0"/>
           </a:p>
         </p:txBody>
@@ -6156,7 +6155,10 @@
           <a:bodyPr/>
           <a:lstStyle/>
           <a:p>
-            <a:endParaRPr lang="it-IT" dirty="0"/>
+            <a:r>
+              <a:rPr lang="it-IT" dirty="0"/>
+              <a:t>MITRE: Tattiche «Impact» e «Collection»</a:t>
+            </a:r>
           </a:p>
         </p:txBody>
       </p:sp>
@@ -6667,6 +6669,88 @@
           <a:bodyPr/>
           <a:lstStyle/>
           <a:p>
+            <a:r>
+              <a:rPr lang="it-IT" dirty="0"/>
+              <a:t>MITRE: </a:t>
+            </a:r>
+            <a:r>
+              <a:rPr lang="it-IT" sz="1600" b="0" i="0" u="none" strike="noStrike" kern="1200" dirty="0" err="1">
+                <a:solidFill>
+                  <a:schemeClr val="tx1"/>
+                </a:solidFill>
+                <a:effectLst/>
+                <a:latin typeface="+mn-lt"/>
+                <a:ea typeface="+mn-ea"/>
+                <a:cs typeface="+mn-cs"/>
+                <a:hlinkClick r:id="rId3"/>
+              </a:rPr>
+              <a:t>Masquerade</a:t>
+            </a:r>
+            <a:r>
+              <a:rPr lang="it-IT" sz="1600" b="0" i="0" u="none" strike="noStrike" kern="1200" dirty="0">
+                <a:solidFill>
+                  <a:schemeClr val="tx1"/>
+                </a:solidFill>
+                <a:effectLst/>
+                <a:latin typeface="+mn-lt"/>
+                <a:ea typeface="+mn-ea"/>
+                <a:cs typeface="+mn-cs"/>
+                <a:hlinkClick r:id="rId3"/>
+              </a:rPr>
+              <a:t> </a:t>
+            </a:r>
+            <a:r>
+              <a:rPr lang="it-IT" sz="1600" b="0" i="0" u="none" strike="noStrike" kern="1200" dirty="0" err="1">
+                <a:solidFill>
+                  <a:schemeClr val="tx1"/>
+                </a:solidFill>
+                <a:effectLst/>
+                <a:latin typeface="+mn-lt"/>
+                <a:ea typeface="+mn-ea"/>
+                <a:cs typeface="+mn-cs"/>
+                <a:hlinkClick r:id="rId3"/>
+              </a:rPr>
+              <a:t>as</a:t>
+            </a:r>
+            <a:r>
+              <a:rPr lang="it-IT" sz="1600" b="0" i="0" u="none" strike="noStrike" kern="1200" dirty="0">
+                <a:solidFill>
+                  <a:schemeClr val="tx1"/>
+                </a:solidFill>
+                <a:effectLst/>
+                <a:latin typeface="+mn-lt"/>
+                <a:ea typeface="+mn-ea"/>
+                <a:cs typeface="+mn-cs"/>
+                <a:hlinkClick r:id="rId3"/>
+              </a:rPr>
+              <a:t> </a:t>
+            </a:r>
+            <a:r>
+              <a:rPr lang="it-IT" sz="1600" b="0" i="0" u="none" strike="noStrike" kern="1200" dirty="0" err="1">
+                <a:solidFill>
+                  <a:schemeClr val="tx1"/>
+                </a:solidFill>
+                <a:effectLst/>
+                <a:latin typeface="+mn-lt"/>
+                <a:ea typeface="+mn-ea"/>
+                <a:cs typeface="+mn-cs"/>
+                <a:hlinkClick r:id="rId3"/>
+              </a:rPr>
+              <a:t>Legitimate</a:t>
+            </a:r>
+            <a:r>
+              <a:rPr lang="it-IT" sz="1600" b="0" i="0" u="none" strike="noStrike" kern="1200" dirty="0">
+                <a:solidFill>
+                  <a:schemeClr val="tx1"/>
+                </a:solidFill>
+                <a:effectLst/>
+                <a:latin typeface="+mn-lt"/>
+                <a:ea typeface="+mn-ea"/>
+                <a:cs typeface="+mn-cs"/>
+                <a:hlinkClick r:id="rId3"/>
+              </a:rPr>
+              <a:t> Application</a:t>
+            </a:r>
             <a:endParaRPr lang="it-IT" dirty="0"/>
           </a:p>
         </p:txBody>
@@ -6837,6 +6921,23 @@
           <a:bodyPr/>
           <a:lstStyle/>
           <a:p>
+            <a:r>
+              <a:rPr lang="it-IT" dirty="0"/>
+              <a:t>MITRE: </a:t>
+            </a:r>
+            <a:r>
+              <a:rPr lang="en-US" sz="1600" b="0" i="0" u="none" strike="noStrike" kern="1200" dirty="0">
+                <a:solidFill>
+                  <a:schemeClr val="tx1"/>
+                </a:solidFill>
+                <a:effectLst/>
+                <a:latin typeface="+mn-lt"/>
+                <a:ea typeface="+mn-ea"/>
+                <a:cs typeface="+mn-cs"/>
+                <a:hlinkClick r:id="rId3"/>
+              </a:rPr>
+              <a:t>Deliver Malicious App via Other Means</a:t>
+            </a:r>
             <a:endParaRPr lang="it-IT" dirty="0"/>
           </a:p>
         </p:txBody>
@@ -11475,82 +11576,104 @@
           </a:p>
         </p:txBody>
       </p:sp>
-      <p:pic>
-        <p:nvPicPr>
-          <p:cNvPr id="8" name="Elemento grafico 7">
+      <p:grpSp>
+        <p:nvGrpSpPr>
+          <p:cNvPr id="2" name="Gruppo 1">
             <a:extLst>
               <a:ext uri="{FF2B5EF4-FFF2-40B4-BE49-F238E27FC236}">
-                <a16:creationId xmlns:a16="http://schemas.microsoft.com/office/drawing/2014/main" id="{10069565-03BE-47BE-BEAC-CAFC6D6222BC}"/>
+                <a16:creationId xmlns:a16="http://schemas.microsoft.com/office/drawing/2014/main" id="{3BBD0CC9-C85A-47D2-BC3A-147682249F83}"/>
               </a:ext>
             </a:extLst>
           </p:cNvPr>
-          <p:cNvPicPr>
-            <a:picLocks noChangeAspect="1"/>
-          </p:cNvPicPr>
+          <p:cNvGrpSpPr/>
           <p:nvPr/>
-        </p:nvPicPr>
-        <p:blipFill>
-          <a:blip r:embed="rId3">
-            <a:extLst>
-              <a:ext uri="{28A0092B-C50C-407E-A947-70E740481C1C}">
-                <a14:useLocalDpi xmlns:a14="http://schemas.microsoft.com/office/drawing/2010/main" val="0"/>
-              </a:ext>
-              <a:ext uri="{96DAC541-7B7A-43D3-8B79-37D633B846F1}">
-                <asvg:svgBlip xmlns:asvg="http://schemas.microsoft.com/office/drawing/2016/SVG/main" r:embed="rId4"/>
-              </a:ext>
-            </a:extLst>
-          </a:blip>
-          <a:stretch>
-            <a:fillRect/>
-          </a:stretch>
-        </p:blipFill>
-        <p:spPr>
+        </p:nvGrpSpPr>
+        <p:grpSpPr>
           <a:xfrm>
-            <a:off x="1297195" y="1841701"/>
-            <a:ext cx="9594426" cy="2179400"/>
+            <a:off x="1297199" y="2124941"/>
+            <a:ext cx="9594426" cy="2608118"/>
+            <a:chOff x="1297195" y="1998175"/>
+            <a:chExt cx="9594426" cy="2608118"/>
           </a:xfrm>
-          <a:prstGeom prst="rect">
-            <a:avLst/>
-          </a:prstGeom>
-        </p:spPr>
-      </p:pic>
-      <p:sp>
-        <p:nvSpPr>
-          <p:cNvPr id="9" name="CasellaDiTesto 8">
-            <a:extLst>
-              <a:ext uri="{FF2B5EF4-FFF2-40B4-BE49-F238E27FC236}">
-                <a16:creationId xmlns:a16="http://schemas.microsoft.com/office/drawing/2014/main" id="{124BEE29-6D50-4B71-81F2-5FA5BB0270FF}"/>
-              </a:ext>
-            </a:extLst>
-          </p:cNvPr>
-          <p:cNvSpPr txBox="1"/>
-          <p:nvPr/>
-        </p:nvSpPr>
-        <p:spPr>
-          <a:xfrm>
-            <a:off x="2256286" y="3926599"/>
-            <a:ext cx="7676253" cy="523220"/>
-          </a:xfrm>
-          <a:prstGeom prst="rect">
-            <a:avLst/>
-          </a:prstGeom>
-          <a:noFill/>
-        </p:spPr>
-        <p:txBody>
-          <a:bodyPr wrap="square" rtlCol="0">
-            <a:spAutoFit/>
-          </a:bodyPr>
-          <a:lstStyle/>
-          <a:p>
-            <a:r>
-              <a:rPr lang="it-IT" sz="2800" dirty="0">
-                <a:latin typeface="Ubuntu Mono" panose="020B0509030602030204" pitchFamily="49" charset="0"/>
-              </a:rPr>
-              <a:t>Un tool per generare applicazioni malevole</a:t>
-            </a:r>
-          </a:p>
-        </p:txBody>
-      </p:sp>
+        </p:grpSpPr>
+        <p:pic>
+          <p:nvPicPr>
+            <p:cNvPr id="8" name="Elemento grafico 7">
+              <a:extLst>
+                <a:ext uri="{FF2B5EF4-FFF2-40B4-BE49-F238E27FC236}">
+                  <a16:creationId xmlns:a16="http://schemas.microsoft.com/office/drawing/2014/main" id="{10069565-03BE-47BE-BEAC-CAFC6D6222BC}"/>
+                </a:ext>
+              </a:extLst>
+            </p:cNvPr>
+            <p:cNvPicPr>
+              <a:picLocks noChangeAspect="1"/>
+            </p:cNvPicPr>
+            <p:nvPr/>
+          </p:nvPicPr>
+          <p:blipFill>
+            <a:blip r:embed="rId3">
+              <a:extLst>
+                <a:ext uri="{28A0092B-C50C-407E-A947-70E740481C1C}">
+                  <a14:useLocalDpi xmlns:a14="http://schemas.microsoft.com/office/drawing/2010/main" val="0"/>
+                </a:ext>
+                <a:ext uri="{96DAC541-7B7A-43D3-8B79-37D633B846F1}">
+                  <asvg:svgBlip xmlns:asvg="http://schemas.microsoft.com/office/drawing/2016/SVG/main" r:embed="rId4"/>
+                </a:ext>
+              </a:extLst>
+            </a:blip>
+            <a:stretch>
+              <a:fillRect/>
+            </a:stretch>
+          </p:blipFill>
+          <p:spPr>
+            <a:xfrm>
+              <a:off x="1297195" y="1998175"/>
+              <a:ext cx="9594426" cy="2179400"/>
+            </a:xfrm>
+            <a:prstGeom prst="rect">
+              <a:avLst/>
+            </a:prstGeom>
+          </p:spPr>
+        </p:pic>
+        <p:sp>
+          <p:nvSpPr>
+            <p:cNvPr id="9" name="CasellaDiTesto 8">
+              <a:extLst>
+                <a:ext uri="{FF2B5EF4-FFF2-40B4-BE49-F238E27FC236}">
+                  <a16:creationId xmlns:a16="http://schemas.microsoft.com/office/drawing/2014/main" id="{124BEE29-6D50-4B71-81F2-5FA5BB0270FF}"/>
+                </a:ext>
+              </a:extLst>
+            </p:cNvPr>
+            <p:cNvSpPr txBox="1"/>
+            <p:nvPr/>
+          </p:nvSpPr>
+          <p:spPr>
+            <a:xfrm>
+              <a:off x="2256286" y="4083073"/>
+              <a:ext cx="7676253" cy="523220"/>
+            </a:xfrm>
+            <a:prstGeom prst="rect">
+              <a:avLst/>
+            </a:prstGeom>
+            <a:noFill/>
+          </p:spPr>
+          <p:txBody>
+            <a:bodyPr wrap="square" rtlCol="0">
+              <a:spAutoFit/>
+            </a:bodyPr>
+            <a:lstStyle/>
+            <a:p>
+              <a:pPr algn="ctr"/>
+              <a:r>
+                <a:rPr lang="it-IT" sz="2800" dirty="0">
+                  <a:latin typeface="Ubuntu Mono" panose="020B0509030602030204" pitchFamily="49" charset="0"/>
+                </a:rPr>
+                <a:t>Un tool per generare applicazioni malevole</a:t>
+              </a:r>
+            </a:p>
+          </p:txBody>
+        </p:sp>
+      </p:grpSp>
       <p:pic>
         <p:nvPicPr>
           <p:cNvPr id="14" name="Elemento grafico 13">
@@ -11671,13 +11794,13 @@
   <p:clrMapOvr>
     <a:masterClrMapping/>
   </p:clrMapOvr>
-  <mc:AlternateContent xmlns:mc="http://schemas.openxmlformats.org/markup-compatibility/2006">
-    <mc:Choice xmlns:p14="http://schemas.microsoft.com/office/powerpoint/2010/main" Requires="p14">
+  <mc:AlternateContent xmlns:mc="http://schemas.openxmlformats.org/markup-compatibility/2006" xmlns:p14="http://schemas.microsoft.com/office/powerpoint/2010/main">
+    <mc:Choice Requires="p14">
       <p:transition spd="med" p14:dur="700">
         <p:fade/>
       </p:transition>
     </mc:Choice>
-    <mc:Fallback>
+    <mc:Fallback xmlns="">
       <p:transition spd="med">
         <p:fade/>
       </p:transition>
@@ -11859,6 +11982,17 @@
               </a:rPr>
               <a:t>La backdoor viene avviata non appena viene eseguita l’app per la prima volta</a:t>
             </a:r>
+          </a:p>
+          <a:p>
+            <a:r>
+              <a:rPr lang="it-IT" sz="2000" dirty="0">
+                <a:latin typeface="Ubuntu Mono" panose="020B0509030602030204" pitchFamily="49" charset="0"/>
+              </a:rPr>
+              <a:t>MITRE: Possibilità di applicare T1402</a:t>
+            </a:r>
+            <a:endParaRPr lang="it-IT" dirty="0">
+              <a:latin typeface="Ubuntu Mono" panose="020B0509030602030204" pitchFamily="49" charset="0"/>
+            </a:endParaRPr>
           </a:p>
         </p:txBody>
       </p:sp>
@@ -12087,6 +12221,14 @@
                 <a:latin typeface="Ubuntu Mono" panose="020B0509030602030204" pitchFamily="49" charset="0"/>
               </a:rPr>
               <a:t>Durante questa procedura l’utente acconsente all’utilizzo da parte dell’applicazione di tutte le risorse richieste (comprese quelle del malware)</a:t>
+            </a:r>
+          </a:p>
+          <a:p>
+            <a:r>
+              <a:rPr lang="it-IT" sz="2000" dirty="0">
+                <a:latin typeface="Ubuntu Mono" panose="020B0509030602030204" pitchFamily="49" charset="0"/>
+              </a:rPr>
+              <a:t>MITRE: T1444</a:t>
             </a:r>
           </a:p>
         </p:txBody>
@@ -12377,7 +12519,7 @@
         <p:spPr>
           <a:xfrm>
             <a:off x="1231127" y="1628800"/>
-            <a:ext cx="5760640" cy="3740214"/>
+            <a:ext cx="5760640" cy="4032448"/>
           </a:xfrm>
         </p:spPr>
         <p:txBody>
@@ -12404,6 +12546,19 @@
               </a:rPr>
               <a:t>Metasploit</a:t>
             </a:r>
+            <a:endParaRPr lang="it-IT" dirty="0">
+              <a:latin typeface="Ubuntu Mono" panose="020B0509030602030204" pitchFamily="49" charset="0"/>
+            </a:endParaRPr>
+          </a:p>
+          <a:p>
+            <a:r>
+              <a:rPr lang="it-IT" sz="2000" dirty="0">
+                <a:latin typeface="Ubuntu Mono" panose="020B0509030602030204"/>
+              </a:rPr>
+              <a:t>MITRE: T1509</a:t>
+            </a:r>
+          </a:p>
+          <a:p>
             <a:endParaRPr lang="it-IT" dirty="0">
               <a:latin typeface="Ubuntu Mono" panose="020B0509030602030204" pitchFamily="49" charset="0"/>
             </a:endParaRPr>
@@ -12661,6 +12816,14 @@
                 <a:latin typeface="Ubuntu Mono" panose="020B0509030602030204" pitchFamily="49" charset="0"/>
               </a:rPr>
               <a:t>…</a:t>
+            </a:r>
+          </a:p>
+          <a:p>
+            <a:r>
+              <a:rPr lang="it-IT" sz="2000" dirty="0">
+                <a:latin typeface="Ubuntu Mono" panose="020B0509030602030204" pitchFamily="49" charset="0"/>
+              </a:rPr>
+              <a:t>MITRE: Tattiche TA0034 e TA0035</a:t>
             </a:r>
           </a:p>
         </p:txBody>
@@ -12935,7 +13098,10 @@
           <a:bodyPr rtlCol="0"/>
           <a:lstStyle/>
           <a:p>
-            <a:pPr rtl="0"/>
+            <a:pPr marL="514350" indent="-514350" rtl="0">
+              <a:buFont typeface="+mj-lt"/>
+              <a:buAutoNum type="arabicPeriod"/>
+            </a:pPr>
             <a:r>
               <a:rPr lang="it-IT" dirty="0" err="1">
                 <a:latin typeface="Ubuntu Mono" panose="020B0509030602030204" pitchFamily="49" charset="0"/>
@@ -12947,7 +13113,10 @@
             </a:endParaRPr>
           </a:p>
           <a:p>
-            <a:pPr rtl="0"/>
+            <a:pPr marL="514350" indent="-514350" rtl="0">
+              <a:buFont typeface="+mj-lt"/>
+              <a:buAutoNum type="arabicPeriod"/>
+            </a:pPr>
             <a:r>
               <a:rPr lang="it-IT" dirty="0" err="1">
                 <a:latin typeface="Ubuntu Mono" panose="020B0509030602030204" pitchFamily="49" charset="0"/>
@@ -12959,7 +13128,10 @@
             </a:endParaRPr>
           </a:p>
           <a:p>
-            <a:pPr rtl="0"/>
+            <a:pPr marL="514350" indent="-514350" rtl="0">
+              <a:buFont typeface="+mj-lt"/>
+              <a:buAutoNum type="arabicPeriod"/>
+            </a:pPr>
             <a:r>
               <a:rPr lang="it-IT" dirty="0">
                 <a:latin typeface="Ubuntu Mono" panose="020B0509030602030204" pitchFamily="49" charset="0"/>
@@ -12968,7 +13140,10 @@
             </a:r>
           </a:p>
           <a:p>
-            <a:pPr rtl="0"/>
+            <a:pPr marL="514350" indent="-514350" rtl="0">
+              <a:buFont typeface="+mj-lt"/>
+              <a:buAutoNum type="arabicPeriod"/>
+            </a:pPr>
             <a:r>
               <a:rPr lang="it-IT" dirty="0">
                 <a:latin typeface="Ubuntu Mono" panose="020B0509030602030204" pitchFamily="49" charset="0"/>
@@ -12977,7 +13152,10 @@
             </a:r>
           </a:p>
           <a:p>
-            <a:pPr rtl="0"/>
+            <a:pPr marL="514350" indent="-514350" rtl="0">
+              <a:buFont typeface="+mj-lt"/>
+              <a:buAutoNum type="arabicPeriod"/>
+            </a:pPr>
             <a:r>
               <a:rPr lang="it-IT" dirty="0">
                 <a:latin typeface="Ubuntu Mono" panose="020B0509030602030204" pitchFamily="49" charset="0"/>
@@ -12986,7 +13164,10 @@
             </a:r>
           </a:p>
           <a:p>
-            <a:pPr rtl="0"/>
+            <a:pPr marL="514350" indent="-514350" rtl="0">
+              <a:buFont typeface="+mj-lt"/>
+              <a:buAutoNum type="arabicPeriod"/>
+            </a:pPr>
             <a:r>
               <a:rPr lang="it-IT" dirty="0" err="1">
                 <a:latin typeface="Ubuntu Mono" panose="020B0509030602030204" pitchFamily="49" charset="0"/>
@@ -13001,7 +13182,10 @@
             </a:r>
           </a:p>
           <a:p>
-            <a:pPr rtl="0"/>
+            <a:pPr marL="514350" indent="-514350" rtl="0">
+              <a:buFont typeface="+mj-lt"/>
+              <a:buAutoNum type="arabicPeriod"/>
+            </a:pPr>
             <a:r>
               <a:rPr lang="it-IT" dirty="0">
                 <a:latin typeface="Ubuntu Mono" panose="020B0509030602030204" pitchFamily="49" charset="0"/>
@@ -13021,7 +13205,7 @@
             <p:ph sz="half" idx="2"/>
             <p:extLst>
               <p:ext uri="{D42A27DB-BD31-4B8C-83A1-F6EECF244321}">
-                <p14:modId xmlns:p14="http://schemas.microsoft.com/office/powerpoint/2010/main" val="3555317401"/>
+                <p14:modId xmlns:p14="http://schemas.microsoft.com/office/powerpoint/2010/main" val="253101033"/>
               </p:ext>
             </p:extLst>
           </p:nvPr>
@@ -13710,6 +13894,14 @@
             </a:r>
           </a:p>
           <a:p>
+            <a:r>
+              <a:rPr lang="it-IT" sz="2000" dirty="0">
+                <a:latin typeface="Ubuntu Mono" panose="020B0509030602030204" pitchFamily="49" charset="0"/>
+              </a:rPr>
+              <a:t>MITRE: T1444</a:t>
+            </a:r>
+          </a:p>
+          <a:p>
             <a:endParaRPr lang="it-IT" dirty="0">
               <a:latin typeface="Ubuntu Mono" panose="020B0509030602030204" pitchFamily="49" charset="0"/>
             </a:endParaRPr>
@@ -13970,6 +14162,21 @@
               </a:rPr>
               <a:t>…)</a:t>
             </a:r>
+          </a:p>
+          <a:p>
+            <a:r>
+              <a:rPr lang="it-IT" sz="2000" dirty="0">
+                <a:latin typeface="Ubuntu Mono" panose="020B0509030602030204" pitchFamily="49" charset="0"/>
+              </a:rPr>
+              <a:t>MITRE: </a:t>
+            </a:r>
+            <a:r>
+              <a:rPr lang="it-IT" sz="2000" dirty="0"/>
+              <a:t>T1476</a:t>
+            </a:r>
+            <a:endParaRPr lang="it-IT" sz="2000" dirty="0">
+              <a:latin typeface="Ubuntu Mono" panose="020B0509030602030204" pitchFamily="49" charset="0"/>
+            </a:endParaRPr>
           </a:p>
         </p:txBody>
       </p:sp>

</xml_diff>